<commit_message>
Improvements on "03.1. Conditional Statements - Basics" slides
</commit_message>
<xml_diff>
--- a/Courses/Software-Sciences/Module-1-OOP-New/03.1-Conditional-Statements-Basics/03.1-Conditional-Statements-Basics.pptx
+++ b/Courses/Software-Sciences/Module-1-OOP-New/03.1-Conditional-Statements-Basics/03.1-Conditional-Statements-Basics.pptx
@@ -323,7 +323,7 @@
           <a:p>
             <a:fld id="{4E087215-0C8F-4762-A664-737A353EC9A4}" type="datetimeFigureOut">
               <a:rPr lang="bg-BG" smtClean="0"/>
-              <a:t>18.01.23 г.</a:t>
+              <a:t>2.02.23 г.</a:t>
             </a:fld>
             <a:endParaRPr lang="bg-BG" dirty="0"/>
           </a:p>
@@ -514,7 +514,7 @@
           <a:p>
             <a:fld id="{72D84649-876A-46C9-8472-14CB09C070D8}" type="datetimeFigureOut">
               <a:rPr lang="en-US" smtClean="0"/>
-              <a:t>1/18/23</a:t>
+              <a:t>2/2/23</a:t>
             </a:fld>
             <a:endParaRPr lang="en-US" dirty="0"/>
           </a:p>
@@ -1117,7 +1117,7 @@
           <a:bodyPr/>
           <a:lstStyle/>
           <a:p>
-            <a:endParaRPr lang="en-BG" dirty="0"/>
+            <a:endParaRPr lang="en-BG"/>
           </a:p>
         </p:txBody>
       </p:sp>
@@ -1160,20 +1160,19 @@
           <a:lstStyle/>
           <a:p>
             <a:r>
-              <a:rPr lang="en-US"/>
+              <a:rPr lang="en-US" dirty="0"/>
               <a:t>© SoftUni – </a:t>
             </a:r>
             <a:r>
-              <a:rPr lang="en-US" u="sng">
+              <a:rPr lang="en-US" u="sng" dirty="0">
                 <a:hlinkClick r:id="rId3"/>
               </a:rPr>
               <a:t>https://softuni.org</a:t>
             </a:r>
             <a:r>
-              <a:rPr lang="en-US"/>
+              <a:rPr lang="en-US" dirty="0"/>
               <a:t>. Copyrighted document. Unauthorized copy or reproduction is not permitted.</a:t>
             </a:r>
-            <a:endParaRPr lang="en-US" dirty="0"/>
           </a:p>
         </p:txBody>
       </p:sp>
@@ -1368,18 +1367,18 @@
           <a:bodyPr/>
           <a:lstStyle/>
           <a:p>
-            <a:endParaRPr lang="en-US" dirty="0"/>
+            <a:endParaRPr lang="en-BG"/>
           </a:p>
         </p:txBody>
       </p:sp>
       <p:sp>
         <p:nvSpPr>
-          <p:cNvPr id="5" name="Slide Number Placeholder 4"/>
+          <p:cNvPr id="4" name="Slide Number Placeholder 3"/>
           <p:cNvSpPr>
             <a:spLocks noGrp="1"/>
           </p:cNvSpPr>
           <p:nvPr>
-            <p:ph type="sldNum" sz="quarter" idx="11"/>
+            <p:ph type="sldNum" sz="quarter" idx="5"/>
           </p:nvPr>
         </p:nvSpPr>
         <p:spPr/>
@@ -1387,10 +1386,9 @@
           <a:bodyPr/>
           <a:lstStyle/>
           <a:p>
-            <a:fld id="{3EBA5BD7-F043-4D1B-AA17-CD412FC534DE}" type="slidenum">
+            <a:fld id="{2BF067CD-8E6B-4360-9AA8-C5DF2A48A6D1}" type="slidenum">
               <a:rPr lang="en-US" smtClean="0"/>
-              <a:pPr/>
-              <a:t>32</a:t>
+              <a:t>31</a:t>
             </a:fld>
             <a:endParaRPr lang="en-US" dirty="0"/>
           </a:p>
@@ -1398,13 +1396,7 @@
       </p:sp>
       <p:sp>
         <p:nvSpPr>
-          <p:cNvPr id="7" name="Footer Placeholder 7">
-            <a:extLst>
-              <a:ext uri="{FF2B5EF4-FFF2-40B4-BE49-F238E27FC236}">
-                <a16:creationId xmlns:a16="http://schemas.microsoft.com/office/drawing/2014/main" id="{BDC55C3C-DC72-46EC-BF3D-CC472E387871}"/>
-              </a:ext>
-            </a:extLst>
-          </p:cNvPr>
+          <p:cNvPr id="5" name="Footer Placeholder 4"/>
           <p:cNvSpPr>
             <a:spLocks noGrp="1"/>
           </p:cNvSpPr>
@@ -1412,22 +1404,10 @@
             <p:ph type="ftr" sz="quarter" idx="4"/>
           </p:nvPr>
         </p:nvSpPr>
-        <p:spPr>
-          <a:xfrm>
-            <a:off x="-1" y="8847000"/>
-            <a:ext cx="6488999" cy="297000"/>
-          </a:xfrm>
-          <a:prstGeom prst="rect">
-            <a:avLst/>
-          </a:prstGeom>
-        </p:spPr>
+        <p:spPr/>
         <p:txBody>
-          <a:bodyPr vert="horz" lIns="91440" tIns="45720" rIns="91440" bIns="45720" rtlCol="0" anchor="b"/>
-          <a:lstStyle>
-            <a:lvl1pPr algn="l">
-              <a:defRPr sz="1100"/>
-            </a:lvl1pPr>
-          </a:lstStyle>
+          <a:bodyPr/>
+          <a:lstStyle/>
           <a:p>
             <a:r>
               <a:rPr lang="en-US" dirty="0"/>
@@ -1449,7 +1429,7 @@
     </p:spTree>
     <p:extLst>
       <p:ext uri="{BB962C8B-B14F-4D97-AF65-F5344CB8AC3E}">
-        <p14:creationId xmlns:p14="http://schemas.microsoft.com/office/powerpoint/2010/main" val="3019087334"/>
+        <p14:creationId xmlns:p14="http://schemas.microsoft.com/office/powerpoint/2010/main" val="2688311416"/>
       </p:ext>
     </p:extLst>
   </p:cSld>
@@ -1509,129 +1489,23 @@
       </p:sp>
       <p:sp>
         <p:nvSpPr>
-          <p:cNvPr id="7" name="Slide Number Placeholder 5">
-            <a:extLst>
-              <a:ext uri="{FF2B5EF4-FFF2-40B4-BE49-F238E27FC236}">
-                <a16:creationId xmlns:a16="http://schemas.microsoft.com/office/drawing/2014/main" id="{5049B984-F964-47FF-8179-0A3007CE21CD}"/>
-              </a:ext>
-            </a:extLst>
-          </p:cNvPr>
-          <p:cNvSpPr txBox="1">
-            <a:spLocks/>
+          <p:cNvPr id="5" name="Slide Number Placeholder 4"/>
+          <p:cNvSpPr>
+            <a:spLocks noGrp="1"/>
           </p:cNvSpPr>
-          <p:nvPr/>
+          <p:nvPr>
+            <p:ph type="sldNum" sz="quarter" idx="11"/>
+          </p:nvPr>
         </p:nvSpPr>
-        <p:spPr>
-          <a:xfrm>
-            <a:off x="6488999" y="8847000"/>
-            <a:ext cx="367414" cy="297000"/>
-          </a:xfrm>
-          <a:prstGeom prst="rect">
-            <a:avLst/>
-          </a:prstGeom>
-        </p:spPr>
+        <p:spPr/>
         <p:txBody>
-          <a:bodyPr vert="horz" lIns="91440" tIns="45720" rIns="91440" bIns="45720" rtlCol="0" anchor="b"/>
-          <a:lstStyle>
-            <a:defPPr>
-              <a:defRPr lang="en-US"/>
-            </a:defPPr>
-            <a:lvl1pPr marL="0" algn="r" defTabSz="914400" rtl="0" eaLnBrk="1" latinLnBrk="0" hangingPunct="1">
-              <a:defRPr sz="1200" kern="1200">
-                <a:solidFill>
-                  <a:schemeClr val="tx1"/>
-                </a:solidFill>
-                <a:latin typeface="+mn-lt"/>
-                <a:ea typeface="+mn-ea"/>
-                <a:cs typeface="+mn-cs"/>
-              </a:defRPr>
-            </a:lvl1pPr>
-            <a:lvl2pPr marL="457200" algn="l" defTabSz="914400" rtl="0" eaLnBrk="1" latinLnBrk="0" hangingPunct="1">
-              <a:defRPr sz="1800" kern="1200">
-                <a:solidFill>
-                  <a:schemeClr val="tx1"/>
-                </a:solidFill>
-                <a:latin typeface="+mn-lt"/>
-                <a:ea typeface="+mn-ea"/>
-                <a:cs typeface="+mn-cs"/>
-              </a:defRPr>
-            </a:lvl2pPr>
-            <a:lvl3pPr marL="914400" algn="l" defTabSz="914400" rtl="0" eaLnBrk="1" latinLnBrk="0" hangingPunct="1">
-              <a:defRPr sz="1800" kern="1200">
-                <a:solidFill>
-                  <a:schemeClr val="tx1"/>
-                </a:solidFill>
-                <a:latin typeface="+mn-lt"/>
-                <a:ea typeface="+mn-ea"/>
-                <a:cs typeface="+mn-cs"/>
-              </a:defRPr>
-            </a:lvl3pPr>
-            <a:lvl4pPr marL="1371600" algn="l" defTabSz="914400" rtl="0" eaLnBrk="1" latinLnBrk="0" hangingPunct="1">
-              <a:defRPr sz="1800" kern="1200">
-                <a:solidFill>
-                  <a:schemeClr val="tx1"/>
-                </a:solidFill>
-                <a:latin typeface="+mn-lt"/>
-                <a:ea typeface="+mn-ea"/>
-                <a:cs typeface="+mn-cs"/>
-              </a:defRPr>
-            </a:lvl4pPr>
-            <a:lvl5pPr marL="1828800" algn="l" defTabSz="914400" rtl="0" eaLnBrk="1" latinLnBrk="0" hangingPunct="1">
-              <a:defRPr sz="1800" kern="1200">
-                <a:solidFill>
-                  <a:schemeClr val="tx1"/>
-                </a:solidFill>
-                <a:latin typeface="+mn-lt"/>
-                <a:ea typeface="+mn-ea"/>
-                <a:cs typeface="+mn-cs"/>
-              </a:defRPr>
-            </a:lvl5pPr>
-            <a:lvl6pPr marL="2286000" algn="l" defTabSz="914400" rtl="0" eaLnBrk="1" latinLnBrk="0" hangingPunct="1">
-              <a:defRPr sz="1800" kern="1200">
-                <a:solidFill>
-                  <a:schemeClr val="tx1"/>
-                </a:solidFill>
-                <a:latin typeface="+mn-lt"/>
-                <a:ea typeface="+mn-ea"/>
-                <a:cs typeface="+mn-cs"/>
-              </a:defRPr>
-            </a:lvl6pPr>
-            <a:lvl7pPr marL="2743200" algn="l" defTabSz="914400" rtl="0" eaLnBrk="1" latinLnBrk="0" hangingPunct="1">
-              <a:defRPr sz="1800" kern="1200">
-                <a:solidFill>
-                  <a:schemeClr val="tx1"/>
-                </a:solidFill>
-                <a:latin typeface="+mn-lt"/>
-                <a:ea typeface="+mn-ea"/>
-                <a:cs typeface="+mn-cs"/>
-              </a:defRPr>
-            </a:lvl7pPr>
-            <a:lvl8pPr marL="3200400" algn="l" defTabSz="914400" rtl="0" eaLnBrk="1" latinLnBrk="0" hangingPunct="1">
-              <a:defRPr sz="1800" kern="1200">
-                <a:solidFill>
-                  <a:schemeClr val="tx1"/>
-                </a:solidFill>
-                <a:latin typeface="+mn-lt"/>
-                <a:ea typeface="+mn-ea"/>
-                <a:cs typeface="+mn-cs"/>
-              </a:defRPr>
-            </a:lvl8pPr>
-            <a:lvl9pPr marL="3657600" algn="l" defTabSz="914400" rtl="0" eaLnBrk="1" latinLnBrk="0" hangingPunct="1">
-              <a:defRPr sz="1800" kern="1200">
-                <a:solidFill>
-                  <a:schemeClr val="tx1"/>
-                </a:solidFill>
-                <a:latin typeface="+mn-lt"/>
-                <a:ea typeface="+mn-ea"/>
-                <a:cs typeface="+mn-cs"/>
-              </a:defRPr>
-            </a:lvl9pPr>
-          </a:lstStyle>
+          <a:bodyPr/>
+          <a:lstStyle/>
           <a:p>
             <a:fld id="{3EBA5BD7-F043-4D1B-AA17-CD412FC534DE}" type="slidenum">
               <a:rPr lang="en-US" smtClean="0"/>
               <a:pPr/>
-              <a:t>33</a:t>
+              <a:t>32</a:t>
             </a:fld>
             <a:endParaRPr lang="en-US" dirty="0"/>
           </a:p>
@@ -1639,10 +1513,10 @@
       </p:sp>
       <p:sp>
         <p:nvSpPr>
-          <p:cNvPr id="6" name="Footer Placeholder 7">
+          <p:cNvPr id="7" name="Footer Placeholder 7">
             <a:extLst>
               <a:ext uri="{FF2B5EF4-FFF2-40B4-BE49-F238E27FC236}">
-                <a16:creationId xmlns:a16="http://schemas.microsoft.com/office/drawing/2014/main" id="{0540A631-5D32-45DE-AE80-2742FDC83E88}"/>
+                <a16:creationId xmlns:a16="http://schemas.microsoft.com/office/drawing/2014/main" id="{BDC55C3C-DC72-46EC-BF3D-CC472E387871}"/>
               </a:ext>
             </a:extLst>
           </p:cNvPr>
@@ -1690,7 +1564,7 @@
     </p:spTree>
     <p:extLst>
       <p:ext uri="{BB962C8B-B14F-4D97-AF65-F5344CB8AC3E}">
-        <p14:creationId xmlns:p14="http://schemas.microsoft.com/office/powerpoint/2010/main" val="3397623632"/>
+        <p14:creationId xmlns:p14="http://schemas.microsoft.com/office/powerpoint/2010/main" val="3019087334"/>
       </p:ext>
     </p:extLst>
   </p:cSld>
@@ -1750,6 +1624,247 @@
       </p:sp>
       <p:sp>
         <p:nvSpPr>
+          <p:cNvPr id="7" name="Slide Number Placeholder 5">
+            <a:extLst>
+              <a:ext uri="{FF2B5EF4-FFF2-40B4-BE49-F238E27FC236}">
+                <a16:creationId xmlns:a16="http://schemas.microsoft.com/office/drawing/2014/main" id="{5049B984-F964-47FF-8179-0A3007CE21CD}"/>
+              </a:ext>
+            </a:extLst>
+          </p:cNvPr>
+          <p:cNvSpPr txBox="1">
+            <a:spLocks/>
+          </p:cNvSpPr>
+          <p:nvPr/>
+        </p:nvSpPr>
+        <p:spPr>
+          <a:xfrm>
+            <a:off x="6488999" y="8847000"/>
+            <a:ext cx="367414" cy="297000"/>
+          </a:xfrm>
+          <a:prstGeom prst="rect">
+            <a:avLst/>
+          </a:prstGeom>
+        </p:spPr>
+        <p:txBody>
+          <a:bodyPr vert="horz" lIns="91440" tIns="45720" rIns="91440" bIns="45720" rtlCol="0" anchor="b"/>
+          <a:lstStyle>
+            <a:defPPr>
+              <a:defRPr lang="en-US"/>
+            </a:defPPr>
+            <a:lvl1pPr marL="0" algn="r" defTabSz="914400" rtl="0" eaLnBrk="1" latinLnBrk="0" hangingPunct="1">
+              <a:defRPr sz="1200" kern="1200">
+                <a:solidFill>
+                  <a:schemeClr val="tx1"/>
+                </a:solidFill>
+                <a:latin typeface="+mn-lt"/>
+                <a:ea typeface="+mn-ea"/>
+                <a:cs typeface="+mn-cs"/>
+              </a:defRPr>
+            </a:lvl1pPr>
+            <a:lvl2pPr marL="457200" algn="l" defTabSz="914400" rtl="0" eaLnBrk="1" latinLnBrk="0" hangingPunct="1">
+              <a:defRPr sz="1800" kern="1200">
+                <a:solidFill>
+                  <a:schemeClr val="tx1"/>
+                </a:solidFill>
+                <a:latin typeface="+mn-lt"/>
+                <a:ea typeface="+mn-ea"/>
+                <a:cs typeface="+mn-cs"/>
+              </a:defRPr>
+            </a:lvl2pPr>
+            <a:lvl3pPr marL="914400" algn="l" defTabSz="914400" rtl="0" eaLnBrk="1" latinLnBrk="0" hangingPunct="1">
+              <a:defRPr sz="1800" kern="1200">
+                <a:solidFill>
+                  <a:schemeClr val="tx1"/>
+                </a:solidFill>
+                <a:latin typeface="+mn-lt"/>
+                <a:ea typeface="+mn-ea"/>
+                <a:cs typeface="+mn-cs"/>
+              </a:defRPr>
+            </a:lvl3pPr>
+            <a:lvl4pPr marL="1371600" algn="l" defTabSz="914400" rtl="0" eaLnBrk="1" latinLnBrk="0" hangingPunct="1">
+              <a:defRPr sz="1800" kern="1200">
+                <a:solidFill>
+                  <a:schemeClr val="tx1"/>
+                </a:solidFill>
+                <a:latin typeface="+mn-lt"/>
+                <a:ea typeface="+mn-ea"/>
+                <a:cs typeface="+mn-cs"/>
+              </a:defRPr>
+            </a:lvl4pPr>
+            <a:lvl5pPr marL="1828800" algn="l" defTabSz="914400" rtl="0" eaLnBrk="1" latinLnBrk="0" hangingPunct="1">
+              <a:defRPr sz="1800" kern="1200">
+                <a:solidFill>
+                  <a:schemeClr val="tx1"/>
+                </a:solidFill>
+                <a:latin typeface="+mn-lt"/>
+                <a:ea typeface="+mn-ea"/>
+                <a:cs typeface="+mn-cs"/>
+              </a:defRPr>
+            </a:lvl5pPr>
+            <a:lvl6pPr marL="2286000" algn="l" defTabSz="914400" rtl="0" eaLnBrk="1" latinLnBrk="0" hangingPunct="1">
+              <a:defRPr sz="1800" kern="1200">
+                <a:solidFill>
+                  <a:schemeClr val="tx1"/>
+                </a:solidFill>
+                <a:latin typeface="+mn-lt"/>
+                <a:ea typeface="+mn-ea"/>
+                <a:cs typeface="+mn-cs"/>
+              </a:defRPr>
+            </a:lvl6pPr>
+            <a:lvl7pPr marL="2743200" algn="l" defTabSz="914400" rtl="0" eaLnBrk="1" latinLnBrk="0" hangingPunct="1">
+              <a:defRPr sz="1800" kern="1200">
+                <a:solidFill>
+                  <a:schemeClr val="tx1"/>
+                </a:solidFill>
+                <a:latin typeface="+mn-lt"/>
+                <a:ea typeface="+mn-ea"/>
+                <a:cs typeface="+mn-cs"/>
+              </a:defRPr>
+            </a:lvl7pPr>
+            <a:lvl8pPr marL="3200400" algn="l" defTabSz="914400" rtl="0" eaLnBrk="1" latinLnBrk="0" hangingPunct="1">
+              <a:defRPr sz="1800" kern="1200">
+                <a:solidFill>
+                  <a:schemeClr val="tx1"/>
+                </a:solidFill>
+                <a:latin typeface="+mn-lt"/>
+                <a:ea typeface="+mn-ea"/>
+                <a:cs typeface="+mn-cs"/>
+              </a:defRPr>
+            </a:lvl8pPr>
+            <a:lvl9pPr marL="3657600" algn="l" defTabSz="914400" rtl="0" eaLnBrk="1" latinLnBrk="0" hangingPunct="1">
+              <a:defRPr sz="1800" kern="1200">
+                <a:solidFill>
+                  <a:schemeClr val="tx1"/>
+                </a:solidFill>
+                <a:latin typeface="+mn-lt"/>
+                <a:ea typeface="+mn-ea"/>
+                <a:cs typeface="+mn-cs"/>
+              </a:defRPr>
+            </a:lvl9pPr>
+          </a:lstStyle>
+          <a:p>
+            <a:fld id="{3EBA5BD7-F043-4D1B-AA17-CD412FC534DE}" type="slidenum">
+              <a:rPr lang="en-US" smtClean="0"/>
+              <a:pPr/>
+              <a:t>33</a:t>
+            </a:fld>
+            <a:endParaRPr lang="en-US" dirty="0"/>
+          </a:p>
+        </p:txBody>
+      </p:sp>
+      <p:sp>
+        <p:nvSpPr>
+          <p:cNvPr id="6" name="Footer Placeholder 7">
+            <a:extLst>
+              <a:ext uri="{FF2B5EF4-FFF2-40B4-BE49-F238E27FC236}">
+                <a16:creationId xmlns:a16="http://schemas.microsoft.com/office/drawing/2014/main" id="{0540A631-5D32-45DE-AE80-2742FDC83E88}"/>
+              </a:ext>
+            </a:extLst>
+          </p:cNvPr>
+          <p:cNvSpPr>
+            <a:spLocks noGrp="1"/>
+          </p:cNvSpPr>
+          <p:nvPr>
+            <p:ph type="ftr" sz="quarter" idx="4"/>
+          </p:nvPr>
+        </p:nvSpPr>
+        <p:spPr>
+          <a:xfrm>
+            <a:off x="-1" y="8847000"/>
+            <a:ext cx="6488999" cy="297000"/>
+          </a:xfrm>
+          <a:prstGeom prst="rect">
+            <a:avLst/>
+          </a:prstGeom>
+        </p:spPr>
+        <p:txBody>
+          <a:bodyPr vert="horz" lIns="91440" tIns="45720" rIns="91440" bIns="45720" rtlCol="0" anchor="b"/>
+          <a:lstStyle>
+            <a:lvl1pPr algn="l">
+              <a:defRPr sz="1100"/>
+            </a:lvl1pPr>
+          </a:lstStyle>
+          <a:p>
+            <a:r>
+              <a:rPr lang="en-US" dirty="0"/>
+              <a:t>© SoftUni – </a:t>
+            </a:r>
+            <a:r>
+              <a:rPr lang="en-US" u="sng" dirty="0">
+                <a:hlinkClick r:id="rId3"/>
+              </a:rPr>
+              <a:t>https://softuni.org</a:t>
+            </a:r>
+            <a:r>
+              <a:rPr lang="en-US" dirty="0"/>
+              <a:t>. Copyrighted document. Unauthorized copy or reproduction is not permitted.</a:t>
+            </a:r>
+          </a:p>
+        </p:txBody>
+      </p:sp>
+    </p:spTree>
+    <p:extLst>
+      <p:ext uri="{BB962C8B-B14F-4D97-AF65-F5344CB8AC3E}">
+        <p14:creationId xmlns:p14="http://schemas.microsoft.com/office/powerpoint/2010/main" val="3397623632"/>
+      </p:ext>
+    </p:extLst>
+  </p:cSld>
+  <p:clrMapOvr>
+    <a:masterClrMapping/>
+  </p:clrMapOvr>
+</p:notes>
+</file>
+
+<file path=ppt/notesSlides/notesSlide8.xml><?xml version="1.0" encoding="utf-8"?>
+<p:notes xmlns:a="http://schemas.openxmlformats.org/drawingml/2006/main" xmlns:r="http://schemas.openxmlformats.org/officeDocument/2006/relationships" xmlns:p="http://schemas.openxmlformats.org/presentationml/2006/main">
+  <p:cSld>
+    <p:spTree>
+      <p:nvGrpSpPr>
+        <p:cNvPr id="1" name=""/>
+        <p:cNvGrpSpPr/>
+        <p:nvPr/>
+      </p:nvGrpSpPr>
+      <p:grpSpPr>
+        <a:xfrm>
+          <a:off x="0" y="0"/>
+          <a:ext cx="0" cy="0"/>
+          <a:chOff x="0" y="0"/>
+          <a:chExt cx="0" cy="0"/>
+        </a:xfrm>
+      </p:grpSpPr>
+      <p:sp>
+        <p:nvSpPr>
+          <p:cNvPr id="2" name="Slide Image Placeholder 1"/>
+          <p:cNvSpPr>
+            <a:spLocks noGrp="1" noRot="1" noChangeAspect="1"/>
+          </p:cNvSpPr>
+          <p:nvPr>
+            <p:ph type="sldImg"/>
+          </p:nvPr>
+        </p:nvSpPr>
+        <p:spPr/>
+      </p:sp>
+      <p:sp>
+        <p:nvSpPr>
+          <p:cNvPr id="3" name="Notes Placeholder 2"/>
+          <p:cNvSpPr>
+            <a:spLocks noGrp="1"/>
+          </p:cNvSpPr>
+          <p:nvPr>
+            <p:ph type="body" idx="1"/>
+          </p:nvPr>
+        </p:nvSpPr>
+        <p:spPr/>
+        <p:txBody>
+          <a:bodyPr/>
+          <a:lstStyle/>
+          <a:p>
+            <a:endParaRPr lang="en-US" dirty="0"/>
+          </a:p>
+        </p:txBody>
+      </p:sp>
+      <p:sp>
+        <p:nvSpPr>
           <p:cNvPr id="6" name="Slide Number Placeholder 5">
             <a:extLst>
               <a:ext uri="{FF2B5EF4-FFF2-40B4-BE49-F238E27FC236}">
@@ -1941,7 +2056,7 @@
 </p:notes>
 </file>
 
-<file path=ppt/notesSlides/notesSlide8.xml><?xml version="1.0" encoding="utf-8"?>
+<file path=ppt/notesSlides/notesSlide9.xml><?xml version="1.0" encoding="utf-8"?>
 <p:notes xmlns:a="http://schemas.openxmlformats.org/drawingml/2006/main" xmlns:r="http://schemas.openxmlformats.org/officeDocument/2006/relationships" xmlns:p="http://schemas.openxmlformats.org/presentationml/2006/main">
   <p:cSld>
     <p:spTree>
@@ -11581,14 +11696,17 @@
               <a:t>Judge: </a:t>
             </a:r>
             <a:r>
-              <a:rPr lang="en-US" sz="1999" dirty="0">
+              <a:rPr lang="en-US" sz="1999" u="sng" dirty="0">
+                <a:solidFill>
+                  <a:schemeClr val="bg1"/>
+                </a:solidFill>
                 <a:hlinkClick r:id="rId2"/>
               </a:rPr>
-              <a:t>https://judge.softuni.bg/Contests/Practice/Index/3155#0</a:t>
-            </a:r>
-            <a:endParaRPr lang="en-US" sz="1999" dirty="0">
+              <a:t>https://judge.softuni.org/Contests/Practice/Index/3895#0</a:t>
+            </a:r>
+            <a:endParaRPr lang="en-US" sz="1999" u="sng" dirty="0">
               <a:solidFill>
-                <a:prstClr val="white"/>
+                <a:schemeClr val="bg1"/>
               </a:solidFill>
             </a:endParaRPr>
           </a:p>
@@ -12577,7 +12695,26 @@
                   <a:srgbClr val="FFFFFF"/>
                 </a:solidFill>
               </a:rPr>
-              <a:t>Код за изпълнение при невярност на условието</a:t>
+              <a:t>Код за изпълнение при </a:t>
+            </a:r>
+            <a:r>
+              <a:rPr lang="bg-BG" sz="2800" b="1" dirty="0">
+                <a:solidFill>
+                  <a:schemeClr val="bg1">
+                    <a:lumMod val="60000"/>
+                    <a:lumOff val="40000"/>
+                  </a:schemeClr>
+                </a:solidFill>
+              </a:rPr>
+              <a:t>невярност</a:t>
+            </a:r>
+            <a:r>
+              <a:rPr lang="bg-BG" sz="2800" b="1" dirty="0">
+                <a:solidFill>
+                  <a:srgbClr val="FFFFFF"/>
+                </a:solidFill>
+              </a:rPr>
+              <a:t> на условието</a:t>
             </a:r>
           </a:p>
         </p:txBody>
@@ -14759,7 +14896,7 @@
         <p:spPr bwMode="auto">
           <a:xfrm>
             <a:off x="5349409" y="5162941"/>
-            <a:ext cx="4750549" cy="1055333"/>
+            <a:ext cx="4886591" cy="1055333"/>
           </a:xfrm>
           <a:prstGeom prst="wedgeRoundRectCallout">
             <a:avLst>
@@ -15468,8 +15605,8 @@
         </p:nvSpPr>
         <p:spPr bwMode="auto">
           <a:xfrm>
-            <a:off x="373918" y="4193804"/>
-            <a:ext cx="444486" cy="1138476"/>
+            <a:off x="683416" y="4638045"/>
+            <a:ext cx="585000" cy="1138517"/>
           </a:xfrm>
           <a:prstGeom prst="rect">
             <a:avLst/>
@@ -15548,8 +15685,8 @@
         </p:nvSpPr>
         <p:spPr>
           <a:xfrm>
-            <a:off x="1218265" y="4588222"/>
-            <a:ext cx="444486" cy="349639"/>
+            <a:off x="1527763" y="5032463"/>
+            <a:ext cx="585000" cy="425009"/>
           </a:xfrm>
           <a:prstGeom prst="rightArrow">
             <a:avLst/>
@@ -15596,8 +15733,8 @@
         </p:nvSpPr>
         <p:spPr bwMode="auto">
           <a:xfrm>
-            <a:off x="2028054" y="4503902"/>
-            <a:ext cx="444486" cy="518278"/>
+            <a:off x="2337552" y="5004001"/>
+            <a:ext cx="585000" cy="518283"/>
           </a:xfrm>
           <a:prstGeom prst="rect">
             <a:avLst/>
@@ -15664,8 +15801,8 @@
         </p:nvSpPr>
         <p:spPr bwMode="auto">
           <a:xfrm>
-            <a:off x="4042366" y="4193802"/>
-            <a:ext cx="444486" cy="1138476"/>
+            <a:off x="4351864" y="4760729"/>
+            <a:ext cx="585000" cy="1138517"/>
           </a:xfrm>
           <a:prstGeom prst="rect">
             <a:avLst/>
@@ -15747,8 +15884,8 @@
         </p:nvSpPr>
         <p:spPr>
           <a:xfrm>
-            <a:off x="4886713" y="4588221"/>
-            <a:ext cx="444486" cy="349639"/>
+            <a:off x="5196211" y="5032462"/>
+            <a:ext cx="585000" cy="425009"/>
           </a:xfrm>
           <a:prstGeom prst="rightArrow">
             <a:avLst/>
@@ -15795,8 +15932,8 @@
         </p:nvSpPr>
         <p:spPr bwMode="auto">
           <a:xfrm>
-            <a:off x="5696502" y="4503901"/>
-            <a:ext cx="444486" cy="518278"/>
+            <a:off x="6006000" y="5004000"/>
+            <a:ext cx="585000" cy="518283"/>
           </a:xfrm>
           <a:prstGeom prst="rect">
             <a:avLst/>
@@ -16879,14 +17016,17 @@
               <a:t>Judge: </a:t>
             </a:r>
             <a:r>
-              <a:rPr lang="en-US" sz="1999" dirty="0">
+              <a:rPr lang="en-US" sz="1999" u="sng" dirty="0">
+                <a:solidFill>
+                  <a:schemeClr val="bg1"/>
+                </a:solidFill>
                 <a:hlinkClick r:id="rId2"/>
               </a:rPr>
-              <a:t>https://judge.softuni.bg/Contests/Practice/Index/3155#1</a:t>
-            </a:r>
-            <a:endParaRPr lang="en-US" sz="1999" dirty="0">
+              <a:t>https://judge.softuni.org/Contests/Practice/Index/3895#1</a:t>
+            </a:r>
+            <a:endParaRPr lang="en-US" sz="1999" u="sng" dirty="0">
               <a:solidFill>
-                <a:prstClr val="white"/>
+                <a:schemeClr val="bg1"/>
               </a:solidFill>
             </a:endParaRPr>
           </a:p>
@@ -17508,7 +17648,7 @@
         </p:nvSpPr>
         <p:spPr bwMode="auto">
           <a:xfrm>
-            <a:off x="1750119" y="4868625"/>
+            <a:off x="4273083" y="4720670"/>
             <a:ext cx="696901" cy="523084"/>
           </a:xfrm>
           <a:prstGeom prst="rect">
@@ -17571,8 +17711,8 @@
         </p:nvSpPr>
         <p:spPr>
           <a:xfrm>
-            <a:off x="3087948" y="5015897"/>
-            <a:ext cx="308757" cy="228540"/>
+            <a:off x="5468964" y="4734000"/>
+            <a:ext cx="443052" cy="375812"/>
           </a:xfrm>
           <a:prstGeom prst="rightArrow">
             <a:avLst/>
@@ -17619,7 +17759,7 @@
         </p:nvSpPr>
         <p:spPr bwMode="auto">
           <a:xfrm>
-            <a:off x="4050040" y="4868625"/>
+            <a:off x="6411000" y="4734000"/>
             <a:ext cx="1281161" cy="523084"/>
           </a:xfrm>
           <a:prstGeom prst="rect">
@@ -17690,7 +17830,7 @@
         </p:nvSpPr>
         <p:spPr bwMode="auto">
           <a:xfrm>
-            <a:off x="1750116" y="5812412"/>
+            <a:off x="4273080" y="5664457"/>
             <a:ext cx="696900" cy="523084"/>
           </a:xfrm>
           <a:prstGeom prst="rect">
@@ -17753,8 +17893,8 @@
         </p:nvSpPr>
         <p:spPr>
           <a:xfrm>
-            <a:off x="3087948" y="5973203"/>
-            <a:ext cx="308757" cy="228540"/>
+            <a:off x="5468964" y="5691306"/>
+            <a:ext cx="443052" cy="375812"/>
           </a:xfrm>
           <a:prstGeom prst="rightArrow">
             <a:avLst/>
@@ -17801,7 +17941,7 @@
         </p:nvSpPr>
         <p:spPr bwMode="auto">
           <a:xfrm>
-            <a:off x="4050036" y="5825931"/>
+            <a:off x="6410996" y="5691306"/>
             <a:ext cx="1281162" cy="523084"/>
           </a:xfrm>
           <a:prstGeom prst="rect">
@@ -18599,7 +18739,7 @@
         </p:nvSpPr>
         <p:spPr>
           <a:xfrm>
-            <a:off x="710842" y="6381328"/>
+            <a:off x="730156" y="6355444"/>
             <a:ext cx="10725329" cy="400006"/>
           </a:xfrm>
           <a:prstGeom prst="rect">
@@ -18634,14 +18774,17 @@
               <a:t>Judge: </a:t>
             </a:r>
             <a:r>
-              <a:rPr lang="en-US" sz="1999" dirty="0">
+              <a:rPr lang="en-US" sz="1999" u="sng" dirty="0">
+                <a:solidFill>
+                  <a:schemeClr val="bg1"/>
+                </a:solidFill>
                 <a:hlinkClick r:id="rId2"/>
               </a:rPr>
-              <a:t>https://judge.softuni.bg/Contests/Practice/Index/3155#2</a:t>
-            </a:r>
-            <a:endParaRPr lang="en-US" sz="1999" dirty="0">
+              <a:t>https://judge.softuni.org/Contests/Practice/Index/3895#2</a:t>
+            </a:r>
+            <a:endParaRPr lang="en-US" sz="1999" u="sng" dirty="0">
               <a:solidFill>
-                <a:prstClr val="white"/>
+                <a:schemeClr val="bg1"/>
               </a:solidFill>
             </a:endParaRPr>
           </a:p>
@@ -19262,7 +19405,7 @@
           <a:p>
             <a:r>
               <a:rPr lang="bg-BG" sz="3200" dirty="0"/>
-              <a:t>Условна конструкция</a:t>
+              <a:t>Условната конструкция</a:t>
             </a:r>
             <a:r>
               <a:rPr lang="en-US" sz="3200" dirty="0"/>
@@ -21187,7 +21330,7 @@
                             </p:stCondLst>
                             <p:childTnLst>
                               <p:par>
-                                <p:cTn id="5" presetID="1" presetClass="entr" presetSubtype="0" fill="hold" grpId="0" nodeType="clickEffect">
+                                <p:cTn id="5" presetID="1" presetClass="entr" presetSubtype="0" fill="hold" grpId="1" nodeType="clickEffect">
                                   <p:stCondLst>
                                     <p:cond delay="0"/>
                                   </p:stCondLst>
@@ -21200,7 +21343,226 @@
                                           </p:stCondLst>
                                         </p:cTn>
                                         <p:tgtEl>
-                                          <p:spTgt spid="9"/>
+                                          <p:spTgt spid="9">
+                                            <p:bg/>
+                                          </p:spTgt>
+                                        </p:tgtEl>
+                                        <p:attrNameLst>
+                                          <p:attrName>style.visibility</p:attrName>
+                                        </p:attrNameLst>
+                                      </p:cBhvr>
+                                      <p:to>
+                                        <p:strVal val="visible"/>
+                                      </p:to>
+                                    </p:set>
+                                  </p:childTnLst>
+                                </p:cTn>
+                              </p:par>
+                              <p:par>
+                                <p:cTn id="7" presetID="1" presetClass="entr" presetSubtype="0" fill="hold" grpId="1" nodeType="withEffect">
+                                  <p:stCondLst>
+                                    <p:cond delay="0"/>
+                                  </p:stCondLst>
+                                  <p:childTnLst>
+                                    <p:set>
+                                      <p:cBhvr>
+                                        <p:cTn id="8" dur="1" fill="hold">
+                                          <p:stCondLst>
+                                            <p:cond delay="0"/>
+                                          </p:stCondLst>
+                                        </p:cTn>
+                                        <p:tgtEl>
+                                          <p:spTgt spid="9">
+                                            <p:txEl>
+                                              <p:pRg st="0" end="0"/>
+                                            </p:txEl>
+                                          </p:spTgt>
+                                        </p:tgtEl>
+                                        <p:attrNameLst>
+                                          <p:attrName>style.visibility</p:attrName>
+                                        </p:attrNameLst>
+                                      </p:cBhvr>
+                                      <p:to>
+                                        <p:strVal val="visible"/>
+                                      </p:to>
+                                    </p:set>
+                                  </p:childTnLst>
+                                </p:cTn>
+                              </p:par>
+                              <p:par>
+                                <p:cTn id="9" presetID="1" presetClass="entr" presetSubtype="0" fill="hold" grpId="1" nodeType="withEffect">
+                                  <p:stCondLst>
+                                    <p:cond delay="0"/>
+                                  </p:stCondLst>
+                                  <p:childTnLst>
+                                    <p:set>
+                                      <p:cBhvr>
+                                        <p:cTn id="10" dur="1" fill="hold">
+                                          <p:stCondLst>
+                                            <p:cond delay="0"/>
+                                          </p:stCondLst>
+                                        </p:cTn>
+                                        <p:tgtEl>
+                                          <p:spTgt spid="9">
+                                            <p:txEl>
+                                              <p:pRg st="1" end="1"/>
+                                            </p:txEl>
+                                          </p:spTgt>
+                                        </p:tgtEl>
+                                        <p:attrNameLst>
+                                          <p:attrName>style.visibility</p:attrName>
+                                        </p:attrNameLst>
+                                      </p:cBhvr>
+                                      <p:to>
+                                        <p:strVal val="visible"/>
+                                      </p:to>
+                                    </p:set>
+                                  </p:childTnLst>
+                                </p:cTn>
+                              </p:par>
+                              <p:par>
+                                <p:cTn id="11" presetID="1" presetClass="entr" presetSubtype="0" fill="hold" grpId="1" nodeType="withEffect">
+                                  <p:stCondLst>
+                                    <p:cond delay="0"/>
+                                  </p:stCondLst>
+                                  <p:childTnLst>
+                                    <p:set>
+                                      <p:cBhvr>
+                                        <p:cTn id="12" dur="1" fill="hold">
+                                          <p:stCondLst>
+                                            <p:cond delay="0"/>
+                                          </p:stCondLst>
+                                        </p:cTn>
+                                        <p:tgtEl>
+                                          <p:spTgt spid="9">
+                                            <p:txEl>
+                                              <p:pRg st="2" end="2"/>
+                                            </p:txEl>
+                                          </p:spTgt>
+                                        </p:tgtEl>
+                                        <p:attrNameLst>
+                                          <p:attrName>style.visibility</p:attrName>
+                                        </p:attrNameLst>
+                                      </p:cBhvr>
+                                      <p:to>
+                                        <p:strVal val="visible"/>
+                                      </p:to>
+                                    </p:set>
+                                  </p:childTnLst>
+                                </p:cTn>
+                              </p:par>
+                              <p:par>
+                                <p:cTn id="13" presetID="1" presetClass="entr" presetSubtype="0" fill="hold" grpId="1" nodeType="withEffect">
+                                  <p:stCondLst>
+                                    <p:cond delay="0"/>
+                                  </p:stCondLst>
+                                  <p:childTnLst>
+                                    <p:set>
+                                      <p:cBhvr>
+                                        <p:cTn id="14" dur="1" fill="hold">
+                                          <p:stCondLst>
+                                            <p:cond delay="0"/>
+                                          </p:stCondLst>
+                                        </p:cTn>
+                                        <p:tgtEl>
+                                          <p:spTgt spid="9">
+                                            <p:txEl>
+                                              <p:pRg st="3" end="3"/>
+                                            </p:txEl>
+                                          </p:spTgt>
+                                        </p:tgtEl>
+                                        <p:attrNameLst>
+                                          <p:attrName>style.visibility</p:attrName>
+                                        </p:attrNameLst>
+                                      </p:cBhvr>
+                                      <p:to>
+                                        <p:strVal val="visible"/>
+                                      </p:to>
+                                    </p:set>
+                                  </p:childTnLst>
+                                </p:cTn>
+                              </p:par>
+                              <p:par>
+                                <p:cTn id="15" presetID="1" presetClass="entr" presetSubtype="0" fill="hold" grpId="1" nodeType="withEffect">
+                                  <p:stCondLst>
+                                    <p:cond delay="0"/>
+                                  </p:stCondLst>
+                                  <p:childTnLst>
+                                    <p:set>
+                                      <p:cBhvr>
+                                        <p:cTn id="16" dur="1" fill="hold">
+                                          <p:stCondLst>
+                                            <p:cond delay="0"/>
+                                          </p:stCondLst>
+                                        </p:cTn>
+                                        <p:tgtEl>
+                                          <p:spTgt spid="9">
+                                            <p:txEl>
+                                              <p:pRg st="4" end="4"/>
+                                            </p:txEl>
+                                          </p:spTgt>
+                                        </p:tgtEl>
+                                        <p:attrNameLst>
+                                          <p:attrName>style.visibility</p:attrName>
+                                        </p:attrNameLst>
+                                      </p:cBhvr>
+                                      <p:to>
+                                        <p:strVal val="visible"/>
+                                      </p:to>
+                                    </p:set>
+                                  </p:childTnLst>
+                                </p:cTn>
+                              </p:par>
+                              <p:par>
+                                <p:cTn id="17" presetID="1" presetClass="entr" presetSubtype="0" fill="hold" grpId="1" nodeType="withEffect">
+                                  <p:stCondLst>
+                                    <p:cond delay="0"/>
+                                  </p:stCondLst>
+                                  <p:childTnLst>
+                                    <p:set>
+                                      <p:cBhvr>
+                                        <p:cTn id="18" dur="1" fill="hold">
+                                          <p:stCondLst>
+                                            <p:cond delay="0"/>
+                                          </p:stCondLst>
+                                        </p:cTn>
+                                        <p:tgtEl>
+                                          <p:spTgt spid="9">
+                                            <p:txEl>
+                                              <p:pRg st="5" end="5"/>
+                                            </p:txEl>
+                                          </p:spTgt>
+                                        </p:tgtEl>
+                                        <p:attrNameLst>
+                                          <p:attrName>style.visibility</p:attrName>
+                                        </p:attrNameLst>
+                                      </p:cBhvr>
+                                      <p:to>
+                                        <p:strVal val="visible"/>
+                                      </p:to>
+                                    </p:set>
+                                  </p:childTnLst>
+                                </p:cTn>
+                              </p:par>
+                              <p:par>
+                                <p:cTn id="19" presetID="1" presetClass="entr" presetSubtype="0" fill="hold" grpId="1" nodeType="withEffect">
+                                  <p:stCondLst>
+                                    <p:cond delay="0"/>
+                                  </p:stCondLst>
+                                  <p:childTnLst>
+                                    <p:set>
+                                      <p:cBhvr>
+                                        <p:cTn id="20" dur="1" fill="hold">
+                                          <p:stCondLst>
+                                            <p:cond delay="0"/>
+                                          </p:stCondLst>
+                                        </p:cTn>
+                                        <p:tgtEl>
+                                          <p:spTgt spid="9">
+                                            <p:txEl>
+                                              <p:pRg st="6" end="6"/>
+                                            </p:txEl>
+                                          </p:spTgt>
                                         </p:tgtEl>
                                         <p:attrNameLst>
                                           <p:attrName>style.visibility</p:attrName>
@@ -21220,26 +21582,26 @@
                     </p:cTn>
                   </p:par>
                   <p:par>
-                    <p:cTn id="7" fill="hold">
+                    <p:cTn id="21" fill="hold">
                       <p:stCondLst>
                         <p:cond delay="indefinite"/>
                       </p:stCondLst>
                       <p:childTnLst>
                         <p:par>
-                          <p:cTn id="8" fill="hold">
+                          <p:cTn id="22" fill="hold">
                             <p:stCondLst>
                               <p:cond delay="0"/>
                             </p:stCondLst>
                             <p:childTnLst>
                               <p:par>
-                                <p:cTn id="9" presetID="1" presetClass="entr" presetSubtype="0" fill="hold" grpId="0" nodeType="clickEffect">
+                                <p:cTn id="23" presetID="1" presetClass="entr" presetSubtype="0" fill="hold" grpId="0" nodeType="clickEffect">
                                   <p:stCondLst>
                                     <p:cond delay="0"/>
                                   </p:stCondLst>
                                   <p:childTnLst>
                                     <p:set>
                                       <p:cBhvr>
-                                        <p:cTn id="10" dur="1" fill="hold">
+                                        <p:cTn id="24" dur="1" fill="hold">
                                           <p:stCondLst>
                                             <p:cond delay="0"/>
                                           </p:stCondLst>
@@ -21255,6 +21617,33 @@
                                         <p:strVal val="visible"/>
                                       </p:to>
                                     </p:set>
+                                  </p:childTnLst>
+                                </p:cTn>
+                              </p:par>
+                              <p:par>
+                                <p:cTn id="25" presetID="3" presetClass="emph" presetSubtype="2" fill="hold" nodeType="withEffect">
+                                  <p:stCondLst>
+                                    <p:cond delay="0"/>
+                                  </p:stCondLst>
+                                  <p:childTnLst>
+                                    <p:animClr clrSpc="rgb" dir="cw">
+                                      <p:cBhvr override="childStyle">
+                                        <p:cTn id="26" dur="500" fill="hold"/>
+                                        <p:tgtEl>
+                                          <p:spTgt spid="9">
+                                            <p:txEl>
+                                              <p:pRg st="2" end="2"/>
+                                            </p:txEl>
+                                          </p:spTgt>
+                                        </p:tgtEl>
+                                        <p:attrNameLst>
+                                          <p:attrName>style.color</p:attrName>
+                                        </p:attrNameLst>
+                                      </p:cBhvr>
+                                      <p:to>
+                                        <a:schemeClr val="bg1"/>
+                                      </p:to>
+                                    </p:animClr>
                                   </p:childTnLst>
                                 </p:cTn>
                               </p:par>
@@ -21286,7 +21675,7 @@
       </p:par>
     </p:tnLst>
     <p:bldLst>
-      <p:bldP spid="9" grpId="0" animBg="1"/>
+      <p:bldP spid="9" grpId="1" uiExpand="1" build="allAtOnce" animBg="1"/>
       <p:bldP spid="15" grpId="0" animBg="1"/>
     </p:bldLst>
   </p:timing>
@@ -23084,7 +23473,7 @@
           <a:p>
             <a:r>
               <a:rPr lang="bg-BG" dirty="0"/>
-              <a:t>Ден от седмицата – условие</a:t>
+              <a:t>Задача: Ден от седмицата</a:t>
             </a:r>
           </a:p>
         </p:txBody>
@@ -23103,7 +23492,7 @@
         </p:nvGrpSpPr>
         <p:grpSpPr>
           <a:xfrm>
-            <a:off x="1164029" y="5131216"/>
+            <a:off x="2799298" y="5523184"/>
             <a:ext cx="2578233" cy="547198"/>
             <a:chOff x="1444113" y="4670269"/>
             <a:chExt cx="2578905" cy="547341"/>
@@ -23312,7 +23701,7 @@
         </p:nvGrpSpPr>
         <p:grpSpPr>
           <a:xfrm>
-            <a:off x="4775731" y="5107032"/>
+            <a:off x="6411000" y="5499000"/>
             <a:ext cx="2873030" cy="571383"/>
             <a:chOff x="1438962" y="5661344"/>
             <a:chExt cx="2873778" cy="571532"/>
@@ -23850,7 +24239,7 @@
             </a:pPr>
             <a:r>
               <a:rPr lang="bg-BG" dirty="0"/>
-              <a:t>Ден от седмицата – решение</a:t>
+              <a:t>Решение: Ден от седмицата</a:t>
             </a:r>
           </a:p>
         </p:txBody>
@@ -24279,7 +24668,7 @@
         </p:nvSpPr>
         <p:spPr>
           <a:xfrm>
-            <a:off x="346649" y="6309320"/>
+            <a:off x="346647" y="6403994"/>
             <a:ext cx="11498705" cy="400006"/>
           </a:xfrm>
           <a:prstGeom prst="rect">
@@ -24408,14 +24797,17 @@
               <a:t>Judge: </a:t>
             </a:r>
             <a:r>
-              <a:rPr lang="en-US" sz="1999" dirty="0">
+              <a:rPr lang="en-US" sz="1999" u="sng" dirty="0">
+                <a:solidFill>
+                  <a:schemeClr val="bg1"/>
+                </a:solidFill>
                 <a:hlinkClick r:id="rId2"/>
               </a:rPr>
-              <a:t>https://judge.softuni.bg/Contests/Practice/Index/3155#6</a:t>
-            </a:r>
-            <a:endParaRPr lang="en-US" sz="1999" dirty="0">
+              <a:t>https://judge.softuni.org/Contests/Practice/Index/3895#5</a:t>
+            </a:r>
+            <a:endParaRPr lang="en-US" sz="1999" u="sng" dirty="0">
               <a:solidFill>
-                <a:prstClr val="white"/>
+                <a:schemeClr val="bg1"/>
               </a:solidFill>
             </a:endParaRPr>
           </a:p>
@@ -25728,7 +26120,18 @@
                   <a:srgbClr val="FFFFFF"/>
                 </a:solidFill>
               </a:rPr>
-              <a:t>Кодът ще се изпълни ако някое от трите условия в серията е вярно</a:t>
+              <a:t>Кодът ще се изпълни ако някое от трите условия в серията е </a:t>
+            </a:r>
+            <a:r>
+              <a:rPr lang="bg-BG" sz="2800" b="1" dirty="0">
+                <a:solidFill>
+                  <a:schemeClr val="bg1">
+                    <a:lumMod val="60000"/>
+                    <a:lumOff val="40000"/>
+                  </a:schemeClr>
+                </a:solidFill>
+              </a:rPr>
+              <a:t>вярно</a:t>
             </a:r>
           </a:p>
         </p:txBody>
@@ -26131,7 +26534,7 @@
           <a:p>
             <a:r>
               <a:rPr lang="ru-RU" dirty="0"/>
-              <a:t>Почивен или работен ден – условие</a:t>
+              <a:t>Задача: Почивен или работен ден</a:t>
             </a:r>
             <a:endParaRPr lang="bg-BG" dirty="0">
               <a:latin typeface="Consolas" pitchFamily="49" charset="0"/>
@@ -26154,7 +26557,7 @@
         </p:nvGrpSpPr>
         <p:grpSpPr>
           <a:xfrm>
-            <a:off x="673304" y="5559089"/>
+            <a:off x="1101000" y="5814000"/>
             <a:ext cx="4812352" cy="560831"/>
             <a:chOff x="1377621" y="4649440"/>
             <a:chExt cx="2395572" cy="560977"/>
@@ -26370,7 +26773,7 @@
         </p:nvGrpSpPr>
         <p:grpSpPr>
           <a:xfrm>
-            <a:off x="6057911" y="5559089"/>
+            <a:off x="6485607" y="5814000"/>
             <a:ext cx="4581533" cy="560831"/>
             <a:chOff x="1493111" y="5657514"/>
             <a:chExt cx="2266336" cy="560977"/>
@@ -26973,7 +27376,7 @@
           <a:p>
             <a:r>
               <a:rPr lang="ru-RU" dirty="0"/>
-              <a:t>Почивен или работен ден – решение</a:t>
+              <a:t>Решение: Почивен или работен ден</a:t>
             </a:r>
             <a:endParaRPr lang="bg-BG" dirty="0">
               <a:latin typeface="Consolas" panose="020B0609020204030204" pitchFamily="49" charset="0"/>
@@ -27515,14 +27918,23 @@
               <a:t>Judge: </a:t>
             </a:r>
             <a:r>
-              <a:rPr lang="en-US" sz="1999" dirty="0">
+              <a:rPr lang="en-US" sz="1999" u="sng" dirty="0">
+                <a:solidFill>
+                  <a:schemeClr val="bg1">
+                    <a:lumMod val="60000"/>
+                    <a:lumOff val="40000"/>
+                  </a:schemeClr>
+                </a:solidFill>
                 <a:hlinkClick r:id="rId2"/>
               </a:rPr>
-              <a:t>https://judge.softuni.bg/Contests/Practice/Index/3155#7</a:t>
-            </a:r>
-            <a:endParaRPr lang="en-US" sz="1999" dirty="0">
+              <a:t>https://judge.softuni.org/Contests/Practice/Index/3895#6</a:t>
+            </a:r>
+            <a:endParaRPr lang="en-US" sz="1999" u="sng" dirty="0">
               <a:solidFill>
-                <a:prstClr val="white"/>
+                <a:schemeClr val="bg1">
+                  <a:lumMod val="60000"/>
+                  <a:lumOff val="40000"/>
+                </a:schemeClr>
               </a:solidFill>
             </a:endParaRPr>
           </a:p>
@@ -28513,7 +28925,7 @@
           <a:p>
             <a:r>
               <a:rPr lang="bg-BG" dirty="0"/>
-              <a:t>Плод или зеленчук – условие</a:t>
+              <a:t>Задача: Плод или зеленчук</a:t>
             </a:r>
             <a:endParaRPr lang="en-US" dirty="0"/>
           </a:p>
@@ -29514,7 +29926,7 @@
           <a:p>
             <a:r>
               <a:rPr lang="bg-BG" dirty="0"/>
-              <a:t>Плод или зеленчук – решение</a:t>
+              <a:t>Решение: Плод или зеленчук</a:t>
             </a:r>
             <a:endParaRPr lang="en-US" dirty="0"/>
           </a:p>
@@ -29978,14 +30390,23 @@
               <a:t>Judge: </a:t>
             </a:r>
             <a:r>
-              <a:rPr lang="en-US" sz="1999" dirty="0">
-                <a:hlinkClick r:id="rId2"/>
-              </a:rPr>
-              <a:t>https://judge.softuni.bg/Contests/Practice/Index/3155#14</a:t>
-            </a:r>
-            <a:endParaRPr lang="en-US" sz="1999" dirty="0">
+              <a:rPr lang="en-US" sz="1999" u="sng" dirty="0">
+                <a:solidFill>
+                  <a:schemeClr val="bg1">
+                    <a:lumMod val="60000"/>
+                    <a:lumOff val="40000"/>
+                  </a:schemeClr>
+                </a:solidFill>
+                <a:hlinkClick r:id="rId3"/>
+              </a:rPr>
+              <a:t>https://judge.softuni.org/Contests/Practice/Index/3895#7</a:t>
+            </a:r>
+            <a:endParaRPr lang="en-US" sz="1999" u="sng" dirty="0">
               <a:solidFill>
-                <a:prstClr val="white"/>
+                <a:schemeClr val="bg1">
+                  <a:lumMod val="60000"/>
+                  <a:lumOff val="40000"/>
+                </a:schemeClr>
               </a:solidFill>
             </a:endParaRPr>
           </a:p>
@@ -31224,7 +31645,7 @@
                   <a:schemeClr val="bg2"/>
                 </a:solidFill>
               </a:rPr>
-              <a:t>Условна конструкция – </a:t>
+              <a:t>Условната конструкция </a:t>
             </a:r>
             <a:r>
               <a:rPr lang="en-US" sz="3400" b="1" dirty="0">
@@ -34856,7 +35277,7 @@
         </p:nvSpPr>
         <p:spPr>
           <a:xfrm>
-            <a:off x="6271435" y="3536308"/>
+            <a:off x="6271435" y="3653921"/>
             <a:ext cx="1633197" cy="461665"/>
           </a:xfrm>
           <a:prstGeom prst="rect">
@@ -34955,7 +35376,7 @@
         </p:nvSpPr>
         <p:spPr>
           <a:xfrm>
-            <a:off x="6271434" y="3997973"/>
+            <a:off x="6271434" y="4115586"/>
             <a:ext cx="1633197" cy="461665"/>
           </a:xfrm>
           <a:prstGeom prst="rect">
@@ -35046,7 +35467,7 @@
         </p:nvSpPr>
         <p:spPr>
           <a:xfrm>
-            <a:off x="6258358" y="5026455"/>
+            <a:off x="6258358" y="5144068"/>
             <a:ext cx="1819778" cy="461665"/>
           </a:xfrm>
           <a:prstGeom prst="rect">
@@ -35137,7 +35558,7 @@
         </p:nvSpPr>
         <p:spPr>
           <a:xfrm>
-            <a:off x="6270917" y="4501693"/>
+            <a:off x="6270917" y="4619306"/>
             <a:ext cx="1819778" cy="461665"/>
           </a:xfrm>
           <a:prstGeom prst="rect">
@@ -35228,7 +35649,7 @@
         </p:nvSpPr>
         <p:spPr>
           <a:xfrm>
-            <a:off x="6258358" y="5466057"/>
+            <a:off x="6258358" y="5583670"/>
             <a:ext cx="1819778" cy="461665"/>
           </a:xfrm>
           <a:prstGeom prst="rect">
@@ -35319,7 +35740,7 @@
         </p:nvSpPr>
         <p:spPr>
           <a:xfrm>
-            <a:off x="6263445" y="5927722"/>
+            <a:off x="6263445" y="6045335"/>
             <a:ext cx="1819778" cy="461665"/>
           </a:xfrm>
           <a:prstGeom prst="rect">
@@ -35722,7 +36143,15 @@
             <a:pPr marL="457063" indent="-457063"/>
             <a:r>
               <a:rPr lang="en-US" sz="3599" dirty="0"/>
-              <a:t>В програмирането можем да сравняваме стойности</a:t>
+              <a:t>В програмирането </a:t>
+            </a:r>
+            <a:r>
+              <a:rPr lang="bg-BG" sz="3599" dirty="0"/>
+              <a:t>можем</a:t>
+            </a:r>
+            <a:r>
+              <a:rPr lang="en-US" sz="3599" dirty="0"/>
+              <a:t> да сравняваме стойности</a:t>
             </a:r>
           </a:p>
           <a:p>
@@ -35772,7 +36201,7 @@
         </p:nvSpPr>
         <p:spPr>
           <a:xfrm>
-            <a:off x="876000" y="2559273"/>
+            <a:off x="876000" y="2676886"/>
             <a:ext cx="5407475" cy="3890910"/>
           </a:xfrm>
           <a:prstGeom prst="rect">
@@ -36186,9 +36615,9 @@
                                           </p:stCondLst>
                                         </p:cTn>
                                         <p:tgtEl>
-                                          <p:spTgt spid="24">
+                                          <p:spTgt spid="23">
                                             <p:txEl>
-                                              <p:pRg st="2" end="2"/>
+                                              <p:pRg st="1" end="1"/>
                                             </p:txEl>
                                           </p:spTgt>
                                         </p:tgtEl>
@@ -36235,7 +36664,9 @@
                                           </p:stCondLst>
                                         </p:cTn>
                                         <p:tgtEl>
-                                          <p:spTgt spid="16"/>
+                                          <p:spTgt spid="24">
+                                            <p:bg/>
+                                          </p:spTgt>
                                         </p:tgtEl>
                                         <p:attrNameLst>
                                           <p:attrName>style.visibility</p:attrName>
@@ -36248,26 +36679,39 @@
                                   </p:childTnLst>
                                 </p:cTn>
                               </p:par>
-                            </p:childTnLst>
-                          </p:cTn>
-                        </p:par>
-                      </p:childTnLst>
-                    </p:cTn>
-                  </p:par>
-                  <p:par>
-                    <p:cTn id="11" fill="hold">
-                      <p:stCondLst>
-                        <p:cond delay="indefinite"/>
-                      </p:stCondLst>
-                      <p:childTnLst>
-                        <p:par>
-                          <p:cTn id="12" fill="hold">
-                            <p:stCondLst>
-                              <p:cond delay="0"/>
-                            </p:stCondLst>
-                            <p:childTnLst>
                               <p:par>
-                                <p:cTn id="13" presetID="1" presetClass="entr" presetSubtype="0" fill="hold" nodeType="clickEffect">
+                                <p:cTn id="11" presetID="1" presetClass="entr" presetSubtype="0" fill="hold" grpId="0" nodeType="withEffect">
+                                  <p:stCondLst>
+                                    <p:cond delay="0"/>
+                                  </p:stCondLst>
+                                  <p:childTnLst>
+                                    <p:set>
+                                      <p:cBhvr>
+                                        <p:cTn id="12" dur="1" fill="hold">
+                                          <p:stCondLst>
+                                            <p:cond delay="0"/>
+                                          </p:stCondLst>
+                                        </p:cTn>
+                                        <p:tgtEl>
+                                          <p:spTgt spid="24">
+                                            <p:txEl>
+                                              <p:pRg st="0" end="0"/>
+                                            </p:txEl>
+                                          </p:spTgt>
+                                        </p:tgtEl>
+                                        <p:attrNameLst>
+                                          <p:attrName>style.visibility</p:attrName>
+                                        </p:attrNameLst>
+                                      </p:cBhvr>
+                                      <p:to>
+                                        <p:strVal val="visible"/>
+                                      </p:to>
+                                    </p:set>
+                                  </p:childTnLst>
+                                </p:cTn>
+                              </p:par>
+                              <p:par>
+                                <p:cTn id="13" presetID="1" presetClass="entr" presetSubtype="0" fill="hold" grpId="0" nodeType="withEffect">
                                   <p:stCondLst>
                                     <p:cond delay="0"/>
                                   </p:stCondLst>
@@ -36282,7 +36726,7 @@
                                         <p:tgtEl>
                                           <p:spTgt spid="24">
                                             <p:txEl>
-                                              <p:pRg st="3" end="3"/>
+                                              <p:pRg st="1" end="1"/>
                                             </p:txEl>
                                           </p:spTgt>
                                         </p:tgtEl>
@@ -36316,7 +36760,7 @@
                             </p:stCondLst>
                             <p:childTnLst>
                               <p:par>
-                                <p:cTn id="17" presetID="1" presetClass="entr" presetSubtype="0" fill="hold" grpId="0" nodeType="clickEffect">
+                                <p:cTn id="17" presetID="1" presetClass="entr" presetSubtype="0" fill="hold" nodeType="clickEffect">
                                   <p:stCondLst>
                                     <p:cond delay="0"/>
                                   </p:stCondLst>
@@ -36329,7 +36773,11 @@
                                           </p:stCondLst>
                                         </p:cTn>
                                         <p:tgtEl>
-                                          <p:spTgt spid="17"/>
+                                          <p:spTgt spid="24">
+                                            <p:txEl>
+                                              <p:pRg st="2" end="2"/>
+                                            </p:txEl>
+                                          </p:spTgt>
                                         </p:tgtEl>
                                         <p:attrNameLst>
                                           <p:attrName>style.visibility</p:attrName>
@@ -36361,7 +36809,7 @@
                             </p:stCondLst>
                             <p:childTnLst>
                               <p:par>
-                                <p:cTn id="21" presetID="1" presetClass="entr" presetSubtype="0" fill="hold" nodeType="clickEffect">
+                                <p:cTn id="21" presetID="1" presetClass="entr" presetSubtype="0" fill="hold" grpId="0" nodeType="clickEffect">
                                   <p:stCondLst>
                                     <p:cond delay="0"/>
                                   </p:stCondLst>
@@ -36374,11 +36822,7 @@
                                           </p:stCondLst>
                                         </p:cTn>
                                         <p:tgtEl>
-                                          <p:spTgt spid="24">
-                                            <p:txEl>
-                                              <p:pRg st="4" end="4"/>
-                                            </p:txEl>
-                                          </p:spTgt>
+                                          <p:spTgt spid="16"/>
                                         </p:tgtEl>
                                         <p:attrNameLst>
                                           <p:attrName>style.visibility</p:attrName>
@@ -36410,7 +36854,7 @@
                             </p:stCondLst>
                             <p:childTnLst>
                               <p:par>
-                                <p:cTn id="25" presetID="1" presetClass="entr" presetSubtype="0" fill="hold" grpId="0" nodeType="clickEffect">
+                                <p:cTn id="25" presetID="1" presetClass="entr" presetSubtype="0" fill="hold" nodeType="clickEffect">
                                   <p:stCondLst>
                                     <p:cond delay="0"/>
                                   </p:stCondLst>
@@ -36423,7 +36867,11 @@
                                           </p:stCondLst>
                                         </p:cTn>
                                         <p:tgtEl>
-                                          <p:spTgt spid="19"/>
+                                          <p:spTgt spid="24">
+                                            <p:txEl>
+                                              <p:pRg st="3" end="3"/>
+                                            </p:txEl>
+                                          </p:spTgt>
                                         </p:tgtEl>
                                         <p:attrNameLst>
                                           <p:attrName>style.visibility</p:attrName>
@@ -36455,7 +36903,7 @@
                             </p:stCondLst>
                             <p:childTnLst>
                               <p:par>
-                                <p:cTn id="29" presetID="1" presetClass="entr" presetSubtype="0" fill="hold" nodeType="clickEffect">
+                                <p:cTn id="29" presetID="1" presetClass="entr" presetSubtype="0" fill="hold" grpId="0" nodeType="clickEffect">
                                   <p:stCondLst>
                                     <p:cond delay="0"/>
                                   </p:stCondLst>
@@ -36468,11 +36916,7 @@
                                           </p:stCondLst>
                                         </p:cTn>
                                         <p:tgtEl>
-                                          <p:spTgt spid="24">
-                                            <p:txEl>
-                                              <p:pRg st="5" end="5"/>
-                                            </p:txEl>
-                                          </p:spTgt>
+                                          <p:spTgt spid="17"/>
                                         </p:tgtEl>
                                         <p:attrNameLst>
                                           <p:attrName>style.visibility</p:attrName>
@@ -36504,7 +36948,7 @@
                             </p:stCondLst>
                             <p:childTnLst>
                               <p:par>
-                                <p:cTn id="33" presetID="1" presetClass="entr" presetSubtype="0" fill="hold" grpId="0" nodeType="clickEffect">
+                                <p:cTn id="33" presetID="1" presetClass="entr" presetSubtype="0" fill="hold" nodeType="clickEffect">
                                   <p:stCondLst>
                                     <p:cond delay="0"/>
                                   </p:stCondLst>
@@ -36517,7 +36961,11 @@
                                           </p:stCondLst>
                                         </p:cTn>
                                         <p:tgtEl>
-                                          <p:spTgt spid="18"/>
+                                          <p:spTgt spid="24">
+                                            <p:txEl>
+                                              <p:pRg st="4" end="4"/>
+                                            </p:txEl>
+                                          </p:spTgt>
                                         </p:tgtEl>
                                         <p:attrNameLst>
                                           <p:attrName>style.visibility</p:attrName>
@@ -36549,7 +36997,7 @@
                             </p:stCondLst>
                             <p:childTnLst>
                               <p:par>
-                                <p:cTn id="37" presetID="1" presetClass="entr" presetSubtype="0" fill="hold" nodeType="clickEffect">
+                                <p:cTn id="37" presetID="1" presetClass="entr" presetSubtype="0" fill="hold" grpId="0" nodeType="clickEffect">
                                   <p:stCondLst>
                                     <p:cond delay="0"/>
                                   </p:stCondLst>
@@ -36562,11 +37010,7 @@
                                           </p:stCondLst>
                                         </p:cTn>
                                         <p:tgtEl>
-                                          <p:spTgt spid="24">
-                                            <p:txEl>
-                                              <p:pRg st="6" end="6"/>
-                                            </p:txEl>
-                                          </p:spTgt>
+                                          <p:spTgt spid="19"/>
                                         </p:tgtEl>
                                         <p:attrNameLst>
                                           <p:attrName>style.visibility</p:attrName>
@@ -36598,7 +37042,7 @@
                             </p:stCondLst>
                             <p:childTnLst>
                               <p:par>
-                                <p:cTn id="41" presetID="1" presetClass="entr" presetSubtype="0" fill="hold" grpId="0" nodeType="clickEffect">
+                                <p:cTn id="41" presetID="1" presetClass="entr" presetSubtype="0" fill="hold" nodeType="clickEffect">
                                   <p:stCondLst>
                                     <p:cond delay="0"/>
                                   </p:stCondLst>
@@ -36611,7 +37055,11 @@
                                           </p:stCondLst>
                                         </p:cTn>
                                         <p:tgtEl>
-                                          <p:spTgt spid="20"/>
+                                          <p:spTgt spid="24">
+                                            <p:txEl>
+                                              <p:pRg st="5" end="5"/>
+                                            </p:txEl>
+                                          </p:spTgt>
                                         </p:tgtEl>
                                         <p:attrNameLst>
                                           <p:attrName>style.visibility</p:attrName>
@@ -36643,7 +37091,7 @@
                             </p:stCondLst>
                             <p:childTnLst>
                               <p:par>
-                                <p:cTn id="45" presetID="1" presetClass="entr" presetSubtype="0" fill="hold" nodeType="clickEffect">
+                                <p:cTn id="45" presetID="1" presetClass="entr" presetSubtype="0" fill="hold" grpId="0" nodeType="clickEffect">
                                   <p:stCondLst>
                                     <p:cond delay="0"/>
                                   </p:stCondLst>
@@ -36656,11 +37104,7 @@
                                           </p:stCondLst>
                                         </p:cTn>
                                         <p:tgtEl>
-                                          <p:spTgt spid="24">
-                                            <p:txEl>
-                                              <p:pRg st="7" end="7"/>
-                                            </p:txEl>
-                                          </p:spTgt>
+                                          <p:spTgt spid="18"/>
                                         </p:tgtEl>
                                         <p:attrNameLst>
                                           <p:attrName>style.visibility</p:attrName>
@@ -36692,7 +37136,7 @@
                             </p:stCondLst>
                             <p:childTnLst>
                               <p:par>
-                                <p:cTn id="49" presetID="1" presetClass="entr" presetSubtype="0" fill="hold" grpId="0" nodeType="clickEffect">
+                                <p:cTn id="49" presetID="1" presetClass="entr" presetSubtype="0" fill="hold" nodeType="clickEffect">
                                   <p:stCondLst>
                                     <p:cond delay="0"/>
                                   </p:stCondLst>
@@ -36700,6 +37144,149 @@
                                     <p:set>
                                       <p:cBhvr>
                                         <p:cTn id="50" dur="1" fill="hold">
+                                          <p:stCondLst>
+                                            <p:cond delay="0"/>
+                                          </p:stCondLst>
+                                        </p:cTn>
+                                        <p:tgtEl>
+                                          <p:spTgt spid="24">
+                                            <p:txEl>
+                                              <p:pRg st="6" end="6"/>
+                                            </p:txEl>
+                                          </p:spTgt>
+                                        </p:tgtEl>
+                                        <p:attrNameLst>
+                                          <p:attrName>style.visibility</p:attrName>
+                                        </p:attrNameLst>
+                                      </p:cBhvr>
+                                      <p:to>
+                                        <p:strVal val="visible"/>
+                                      </p:to>
+                                    </p:set>
+                                  </p:childTnLst>
+                                </p:cTn>
+                              </p:par>
+                            </p:childTnLst>
+                          </p:cTn>
+                        </p:par>
+                      </p:childTnLst>
+                    </p:cTn>
+                  </p:par>
+                  <p:par>
+                    <p:cTn id="51" fill="hold">
+                      <p:stCondLst>
+                        <p:cond delay="indefinite"/>
+                      </p:stCondLst>
+                      <p:childTnLst>
+                        <p:par>
+                          <p:cTn id="52" fill="hold">
+                            <p:stCondLst>
+                              <p:cond delay="0"/>
+                            </p:stCondLst>
+                            <p:childTnLst>
+                              <p:par>
+                                <p:cTn id="53" presetID="1" presetClass="entr" presetSubtype="0" fill="hold" grpId="0" nodeType="clickEffect">
+                                  <p:stCondLst>
+                                    <p:cond delay="0"/>
+                                  </p:stCondLst>
+                                  <p:childTnLst>
+                                    <p:set>
+                                      <p:cBhvr>
+                                        <p:cTn id="54" dur="1" fill="hold">
+                                          <p:stCondLst>
+                                            <p:cond delay="0"/>
+                                          </p:stCondLst>
+                                        </p:cTn>
+                                        <p:tgtEl>
+                                          <p:spTgt spid="20"/>
+                                        </p:tgtEl>
+                                        <p:attrNameLst>
+                                          <p:attrName>style.visibility</p:attrName>
+                                        </p:attrNameLst>
+                                      </p:cBhvr>
+                                      <p:to>
+                                        <p:strVal val="visible"/>
+                                      </p:to>
+                                    </p:set>
+                                  </p:childTnLst>
+                                </p:cTn>
+                              </p:par>
+                            </p:childTnLst>
+                          </p:cTn>
+                        </p:par>
+                      </p:childTnLst>
+                    </p:cTn>
+                  </p:par>
+                  <p:par>
+                    <p:cTn id="55" fill="hold">
+                      <p:stCondLst>
+                        <p:cond delay="indefinite"/>
+                      </p:stCondLst>
+                      <p:childTnLst>
+                        <p:par>
+                          <p:cTn id="56" fill="hold">
+                            <p:stCondLst>
+                              <p:cond delay="0"/>
+                            </p:stCondLst>
+                            <p:childTnLst>
+                              <p:par>
+                                <p:cTn id="57" presetID="1" presetClass="entr" presetSubtype="0" fill="hold" nodeType="clickEffect">
+                                  <p:stCondLst>
+                                    <p:cond delay="0"/>
+                                  </p:stCondLst>
+                                  <p:childTnLst>
+                                    <p:set>
+                                      <p:cBhvr>
+                                        <p:cTn id="58" dur="1" fill="hold">
+                                          <p:stCondLst>
+                                            <p:cond delay="0"/>
+                                          </p:stCondLst>
+                                        </p:cTn>
+                                        <p:tgtEl>
+                                          <p:spTgt spid="24">
+                                            <p:txEl>
+                                              <p:pRg st="7" end="7"/>
+                                            </p:txEl>
+                                          </p:spTgt>
+                                        </p:tgtEl>
+                                        <p:attrNameLst>
+                                          <p:attrName>style.visibility</p:attrName>
+                                        </p:attrNameLst>
+                                      </p:cBhvr>
+                                      <p:to>
+                                        <p:strVal val="visible"/>
+                                      </p:to>
+                                    </p:set>
+                                  </p:childTnLst>
+                                </p:cTn>
+                              </p:par>
+                            </p:childTnLst>
+                          </p:cTn>
+                        </p:par>
+                      </p:childTnLst>
+                    </p:cTn>
+                  </p:par>
+                  <p:par>
+                    <p:cTn id="59" fill="hold">
+                      <p:stCondLst>
+                        <p:cond delay="indefinite"/>
+                      </p:stCondLst>
+                      <p:childTnLst>
+                        <p:par>
+                          <p:cTn id="60" fill="hold">
+                            <p:stCondLst>
+                              <p:cond delay="0"/>
+                            </p:stCondLst>
+                            <p:childTnLst>
+                              <p:par>
+                                <p:cTn id="61" presetID="1" presetClass="entr" presetSubtype="0" fill="hold" grpId="0" nodeType="clickEffect">
+                                  <p:stCondLst>
+                                    <p:cond delay="0"/>
+                                  </p:stCondLst>
+                                  <p:childTnLst>
+                                    <p:set>
+                                      <p:cBhvr>
+                                        <p:cTn id="62" dur="1" fill="hold">
                                           <p:stCondLst>
                                             <p:cond delay="0"/>
                                           </p:stCondLst>
@@ -36752,6 +37339,7 @@
       <p:bldP spid="19" grpId="0"/>
       <p:bldP spid="20" grpId="0"/>
       <p:bldP spid="21" grpId="0"/>
+      <p:bldP spid="24" grpId="0" uiExpand="1" build="allAtOnce" animBg="1"/>
     </p:bldLst>
   </p:timing>
 </p:sld>

</xml_diff>

<commit_message>
Minor fixes for "03.1. Conditional Statements - Basics"
</commit_message>
<xml_diff>
--- a/Courses/Software-Sciences/Module-1-OOP-New/03.1-Conditional-Statements-Basics/03.1-Conditional-Statements-Basics.pptx
+++ b/Courses/Software-Sciences/Module-1-OOP-New/03.1-Conditional-Statements-Basics/03.1-Conditional-Statements-Basics.pptx
@@ -323,7 +323,7 @@
           <a:p>
             <a:fld id="{4E087215-0C8F-4762-A664-737A353EC9A4}" type="datetimeFigureOut">
               <a:rPr lang="bg-BG" smtClean="0"/>
-              <a:t>2.02.23 г.</a:t>
+              <a:t>6.02.23 г.</a:t>
             </a:fld>
             <a:endParaRPr lang="bg-BG" dirty="0"/>
           </a:p>
@@ -514,7 +514,7 @@
           <a:p>
             <a:fld id="{72D84649-876A-46C9-8472-14CB09C070D8}" type="datetimeFigureOut">
               <a:rPr lang="en-US" smtClean="0"/>
-              <a:t>2/2/23</a:t>
+              <a:t>2/6/23</a:t>
             </a:fld>
             <a:endParaRPr lang="en-US" dirty="0"/>
           </a:p>
@@ -10252,7 +10252,7 @@
           <a:p>
             <a:r>
               <a:rPr lang="bg-BG" dirty="0"/>
-              <a:t>Отлична оценка – условие</a:t>
+              <a:t>Задача: Отлична оценка</a:t>
             </a:r>
             <a:endParaRPr lang="en-US" dirty="0"/>
           </a:p>
@@ -10274,7 +10274,7 @@
         </p:nvSpPr>
         <p:spPr bwMode="auto">
           <a:xfrm>
-            <a:off x="1687150" y="5835142"/>
+            <a:off x="3576000" y="5954370"/>
             <a:ext cx="1023057" cy="523084"/>
           </a:xfrm>
           <a:prstGeom prst="rect">
@@ -10345,7 +10345,7 @@
         </p:nvSpPr>
         <p:spPr bwMode="auto">
           <a:xfrm>
-            <a:off x="4004923" y="5875143"/>
+            <a:off x="5893773" y="5994371"/>
             <a:ext cx="2307212" cy="523084"/>
           </a:xfrm>
           <a:prstGeom prst="rect">
@@ -10407,7 +10407,7 @@
         </p:nvSpPr>
         <p:spPr bwMode="auto">
           <a:xfrm>
-            <a:off x="1687150" y="5046200"/>
+            <a:off x="3576000" y="5165428"/>
             <a:ext cx="1023057" cy="523084"/>
           </a:xfrm>
           <a:prstGeom prst="rect">
@@ -10470,7 +10470,7 @@
         </p:nvSpPr>
         <p:spPr>
           <a:xfrm>
-            <a:off x="3197134" y="5165936"/>
+            <a:off x="5085984" y="5285164"/>
             <a:ext cx="380901" cy="314143"/>
           </a:xfrm>
           <a:prstGeom prst="rightArrow">
@@ -10518,7 +10518,7 @@
         </p:nvSpPr>
         <p:spPr bwMode="auto">
           <a:xfrm>
-            <a:off x="4004923" y="5046200"/>
+            <a:off x="5893773" y="5165428"/>
             <a:ext cx="2307212" cy="523084"/>
           </a:xfrm>
           <a:prstGeom prst="rect">
@@ -10581,7 +10581,7 @@
         </p:nvSpPr>
         <p:spPr>
           <a:xfrm>
-            <a:off x="3197134" y="5939614"/>
+            <a:off x="5085984" y="6058842"/>
             <a:ext cx="380901" cy="314143"/>
           </a:xfrm>
           <a:prstGeom prst="rightArrow">
@@ -14350,7 +14350,7 @@
                                   <p:childTnLst>
                                     <p:animClr clrSpc="rgb" dir="cw">
                                       <p:cBhvr override="childStyle">
-                                        <p:cTn id="36" dur="2000" fill="hold"/>
+                                        <p:cTn id="36" dur="500" fill="hold"/>
                                         <p:tgtEl>
                                           <p:spTgt spid="8">
                                             <p:txEl>
@@ -14377,7 +14377,7 @@
                                   <p:childTnLst>
                                     <p:animClr clrSpc="rgb" dir="cw">
                                       <p:cBhvr override="childStyle">
-                                        <p:cTn id="38" dur="2000" fill="hold"/>
+                                        <p:cTn id="38" dur="500" fill="hold"/>
                                         <p:tgtEl>
                                           <p:spTgt spid="8">
                                             <p:txEl>
@@ -14404,7 +14404,7 @@
                                   <p:childTnLst>
                                     <p:animClr clrSpc="rgb" dir="cw">
                                       <p:cBhvr override="childStyle">
-                                        <p:cTn id="40" dur="2000" fill="hold"/>
+                                        <p:cTn id="40" dur="500" fill="hold"/>
                                         <p:tgtEl>
                                           <p:spTgt spid="8">
                                             <p:txEl>
@@ -14431,7 +14431,7 @@
                                   <p:childTnLst>
                                     <p:animClr clrSpc="rgb" dir="cw">
                                       <p:cBhvr override="childStyle">
-                                        <p:cTn id="42" dur="2000" fill="hold"/>
+                                        <p:cTn id="42" dur="500" fill="hold"/>
                                         <p:tgtEl>
                                           <p:spTgt spid="8">
                                             <p:txEl>
@@ -14951,7 +14951,26 @@
                   <a:srgbClr val="FFFFFF"/>
                 </a:solidFill>
               </a:rPr>
-              <a:t>Изпълнява се винаги – не е част от </a:t>
+              <a:t>Изпълнява се винаги – </a:t>
+            </a:r>
+            <a:r>
+              <a:rPr lang="bg-BG" sz="2800" b="1" dirty="0">
+                <a:solidFill>
+                  <a:schemeClr val="bg1">
+                    <a:lumMod val="60000"/>
+                    <a:lumOff val="40000"/>
+                  </a:schemeClr>
+                </a:solidFill>
+              </a:rPr>
+              <a:t>не е</a:t>
+            </a:r>
+            <a:r>
+              <a:rPr lang="bg-BG" sz="2800" b="1" dirty="0">
+                <a:solidFill>
+                  <a:srgbClr val="FFFFFF"/>
+                </a:solidFill>
+              </a:rPr>
+              <a:t> част от </a:t>
             </a:r>
             <a:r>
               <a:rPr lang="en-US" sz="2800" b="1" dirty="0">
@@ -15575,15 +15594,7 @@
           <a:p>
             <a:r>
               <a:rPr lang="bg-BG" dirty="0"/>
-              <a:t>По-голямото число</a:t>
-            </a:r>
-            <a:r>
-              <a:rPr lang="en-US" dirty="0"/>
-              <a:t> – </a:t>
-            </a:r>
-            <a:r>
-              <a:rPr lang="bg-BG" dirty="0"/>
-              <a:t>условие</a:t>
+              <a:t>Задача: По-голямото число</a:t>
             </a:r>
             <a:endParaRPr lang="en-US" dirty="0"/>
           </a:p>
@@ -15605,7 +15616,7 @@
         </p:nvSpPr>
         <p:spPr bwMode="auto">
           <a:xfrm>
-            <a:off x="683416" y="4638045"/>
+            <a:off x="1988416" y="4593045"/>
             <a:ext cx="585000" cy="1138517"/>
           </a:xfrm>
           <a:prstGeom prst="rect">
@@ -15685,7 +15696,7 @@
         </p:nvSpPr>
         <p:spPr>
           <a:xfrm>
-            <a:off x="1527763" y="5032463"/>
+            <a:off x="2832763" y="4987463"/>
             <a:ext cx="585000" cy="425009"/>
           </a:xfrm>
           <a:prstGeom prst="rightArrow">
@@ -15733,7 +15744,7 @@
         </p:nvSpPr>
         <p:spPr bwMode="auto">
           <a:xfrm>
-            <a:off x="2337552" y="5004001"/>
+            <a:off x="3642552" y="4959001"/>
             <a:ext cx="585000" cy="518283"/>
           </a:xfrm>
           <a:prstGeom prst="rect">
@@ -15801,7 +15812,7 @@
         </p:nvSpPr>
         <p:spPr bwMode="auto">
           <a:xfrm>
-            <a:off x="4351864" y="4760729"/>
+            <a:off x="5656864" y="4593045"/>
             <a:ext cx="585000" cy="1138517"/>
           </a:xfrm>
           <a:prstGeom prst="rect">
@@ -15884,7 +15895,7 @@
         </p:nvSpPr>
         <p:spPr>
           <a:xfrm>
-            <a:off x="5196211" y="5032462"/>
+            <a:off x="6501211" y="4949798"/>
             <a:ext cx="585000" cy="425009"/>
           </a:xfrm>
           <a:prstGeom prst="rightArrow">
@@ -15932,7 +15943,7 @@
         </p:nvSpPr>
         <p:spPr bwMode="auto">
           <a:xfrm>
-            <a:off x="6006000" y="5004000"/>
+            <a:off x="7345558" y="4903160"/>
             <a:ext cx="585000" cy="518283"/>
           </a:xfrm>
           <a:prstGeom prst="rect">
@@ -17626,7 +17637,7 @@
           <a:p>
             <a:r>
               <a:rPr lang="bg-BG" dirty="0"/>
-              <a:t>Четно или нечетно число – условие</a:t>
+              <a:t>Задача: Четно или нечетно число</a:t>
             </a:r>
             <a:endParaRPr lang="en-US" dirty="0"/>
           </a:p>
@@ -17648,7 +17659,7 @@
         </p:nvSpPr>
         <p:spPr bwMode="auto">
           <a:xfrm>
-            <a:off x="4273083" y="4720670"/>
+            <a:off x="4296000" y="4824000"/>
             <a:ext cx="696901" cy="523084"/>
           </a:xfrm>
           <a:prstGeom prst="rect">
@@ -17711,7 +17722,7 @@
         </p:nvSpPr>
         <p:spPr>
           <a:xfrm>
-            <a:off x="5468964" y="4734000"/>
+            <a:off x="5491881" y="4837330"/>
             <a:ext cx="443052" cy="375812"/>
           </a:xfrm>
           <a:prstGeom prst="rightArrow">
@@ -17759,7 +17770,7 @@
         </p:nvSpPr>
         <p:spPr bwMode="auto">
           <a:xfrm>
-            <a:off x="6411000" y="4734000"/>
+            <a:off x="6433917" y="4837330"/>
             <a:ext cx="1281161" cy="523084"/>
           </a:xfrm>
           <a:prstGeom prst="rect">
@@ -17830,7 +17841,7 @@
         </p:nvSpPr>
         <p:spPr bwMode="auto">
           <a:xfrm>
-            <a:off x="4273080" y="5664457"/>
+            <a:off x="4295997" y="5767787"/>
             <a:ext cx="696900" cy="523084"/>
           </a:xfrm>
           <a:prstGeom prst="rect">
@@ -17893,7 +17904,7 @@
         </p:nvSpPr>
         <p:spPr>
           <a:xfrm>
-            <a:off x="5468964" y="5691306"/>
+            <a:off x="5491881" y="5794636"/>
             <a:ext cx="443052" cy="375812"/>
           </a:xfrm>
           <a:prstGeom prst="rightArrow">
@@ -17941,7 +17952,7 @@
         </p:nvSpPr>
         <p:spPr bwMode="auto">
           <a:xfrm>
-            <a:off x="6410996" y="5691306"/>
+            <a:off x="6433913" y="5794636"/>
             <a:ext cx="1281162" cy="523084"/>
           </a:xfrm>
           <a:prstGeom prst="rect">
@@ -19968,7 +19979,7 @@
             </a:pPr>
             <a:r>
               <a:rPr lang="bg-BG" sz="3199" dirty="0"/>
-              <a:t>При истинност на едно условие, </a:t>
+              <a:t>При истинност на едно условие </a:t>
             </a:r>
             <a:r>
               <a:rPr lang="bg-BG" sz="3199" b="1" dirty="0">
@@ -21155,7 +21166,7 @@
             </a:r>
             <a:r>
               <a:rPr lang="bg-BG" sz="3599" dirty="0"/>
-              <a:t>че е вярно и приключва</a:t>
+              <a:t>че е вярно, и приключва</a:t>
             </a:r>
             <a:endParaRPr lang="en-US" sz="3599" dirty="0"/>
           </a:p>
@@ -26120,7 +26131,7 @@
                   <a:srgbClr val="FFFFFF"/>
                 </a:solidFill>
               </a:rPr>
-              <a:t>Кодът ще се изпълни ако някое от трите условия в серията е </a:t>
+              <a:t>Кодът ще се изпълни, ако някое от трите условия в серията е </a:t>
             </a:r>
             <a:r>
               <a:rPr lang="bg-BG" sz="2800" b="1" dirty="0">
@@ -26557,7 +26568,7 @@
         </p:nvGrpSpPr>
         <p:grpSpPr>
           <a:xfrm>
-            <a:off x="1101000" y="5814000"/>
+            <a:off x="1101000" y="5724000"/>
             <a:ext cx="4812352" cy="560831"/>
             <a:chOff x="1377621" y="4649440"/>
             <a:chExt cx="2395572" cy="560977"/>
@@ -26773,7 +26784,7 @@
         </p:nvGrpSpPr>
         <p:grpSpPr>
           <a:xfrm>
-            <a:off x="6485607" y="5814000"/>
+            <a:off x="6485607" y="5724000"/>
             <a:ext cx="4581533" cy="560831"/>
             <a:chOff x="1493111" y="5657514"/>
             <a:chExt cx="2266336" cy="560977"/>
@@ -28945,7 +28956,7 @@
         </p:nvGrpSpPr>
         <p:grpSpPr>
           <a:xfrm>
-            <a:off x="559853" y="5726771"/>
+            <a:off x="426000" y="5947058"/>
             <a:ext cx="2942797" cy="523084"/>
             <a:chOff x="295936" y="5821489"/>
             <a:chExt cx="2943564" cy="523220"/>
@@ -29124,7 +29135,7 @@
         </p:nvGrpSpPr>
         <p:grpSpPr>
           <a:xfrm>
-            <a:off x="8404273" y="5661248"/>
+            <a:off x="8270420" y="5881535"/>
             <a:ext cx="3457318" cy="523084"/>
             <a:chOff x="8418549" y="5766487"/>
             <a:chExt cx="3458219" cy="523220"/>
@@ -29303,7 +29314,7 @@
         </p:nvGrpSpPr>
         <p:grpSpPr>
           <a:xfrm>
-            <a:off x="3886776" y="5693613"/>
+            <a:off x="3752923" y="5913900"/>
             <a:ext cx="4098468" cy="540062"/>
             <a:chOff x="3899876" y="5781875"/>
             <a:chExt cx="4099536" cy="540203"/>
@@ -38405,7 +38416,7 @@
         <p:spPr bwMode="auto">
           <a:xfrm>
             <a:off x="7265924" y="4463731"/>
-            <a:ext cx="3057387" cy="1055333"/>
+            <a:ext cx="3150076" cy="1055333"/>
           </a:xfrm>
           <a:prstGeom prst="wedgeRoundRectCallout">
             <a:avLst>
@@ -39147,7 +39158,27 @@
             <a:pPr marL="457063" indent="-457063"/>
             <a:r>
               <a:rPr lang="en-US" dirty="0"/>
-              <a:t>Може да се създаде и с условие, което се свежда до true или false</a:t>
+              <a:t>Може да се създаде и с условие, което се свежда до </a:t>
+            </a:r>
+            <a:r>
+              <a:rPr lang="en-US" b="1" dirty="0">
+                <a:solidFill>
+                  <a:schemeClr val="bg1"/>
+                </a:solidFill>
+              </a:rPr>
+              <a:t>true</a:t>
+            </a:r>
+            <a:r>
+              <a:rPr lang="en-US" dirty="0"/>
+              <a:t> или </a:t>
+            </a:r>
+            <a:r>
+              <a:rPr lang="en-US" b="1" dirty="0">
+                <a:solidFill>
+                  <a:schemeClr val="bg1"/>
+                </a:solidFill>
+              </a:rPr>
+              <a:t>false</a:t>
             </a:r>
           </a:p>
           <a:p>
@@ -39172,8 +39203,8 @@
         </p:nvSpPr>
         <p:spPr>
           <a:xfrm>
-            <a:off x="3991209" y="3429000"/>
-            <a:ext cx="4206407" cy="665861"/>
+            <a:off x="3576971" y="3429000"/>
+            <a:ext cx="5034882" cy="665861"/>
           </a:xfrm>
           <a:prstGeom prst="rect">
             <a:avLst/>

</xml_diff>

<commit_message>
Added TODOs for the Conditional Statements exercises; Added slides
</commit_message>
<xml_diff>
--- a/Courses/Software-Sciences/Module-1-OOP-New/03.1-Conditional-Statements-Basics/03.1-Conditional-Statements-Basics.pptx
+++ b/Courses/Software-Sciences/Module-1-OOP-New/03.1-Conditional-Statements-Basics/03.1-Conditional-Statements-Basics.pptx
@@ -5,10 +5,10 @@
     <p:sldMasterId id="2147483675" r:id="rId2"/>
   </p:sldMasterIdLst>
   <p:notesMasterIdLst>
-    <p:notesMasterId r:id="rId38"/>
+    <p:notesMasterId r:id="rId40"/>
   </p:notesMasterIdLst>
   <p:handoutMasterIdLst>
-    <p:handoutMasterId r:id="rId39"/>
+    <p:handoutMasterId r:id="rId41"/>
   </p:handoutMasterIdLst>
   <p:sldIdLst>
     <p:sldId id="274" r:id="rId3"/>
@@ -42,10 +42,12 @@
     <p:sldId id="622" r:id="rId31"/>
     <p:sldId id="623" r:id="rId32"/>
     <p:sldId id="624" r:id="rId33"/>
-    <p:sldId id="577" r:id="rId34"/>
-    <p:sldId id="504" r:id="rId35"/>
-    <p:sldId id="505" r:id="rId36"/>
-    <p:sldId id="506" r:id="rId37"/>
+    <p:sldId id="625" r:id="rId34"/>
+    <p:sldId id="626" r:id="rId35"/>
+    <p:sldId id="577" r:id="rId36"/>
+    <p:sldId id="504" r:id="rId37"/>
+    <p:sldId id="505" r:id="rId38"/>
+    <p:sldId id="506" r:id="rId39"/>
   </p:sldIdLst>
   <p:sldSz cx="12192000" cy="6858000"/>
   <p:notesSz cx="6858000" cy="9144000"/>
@@ -198,6 +200,12 @@
             <p14:sldId id="624"/>
           </p14:sldIdLst>
         </p14:section>
+        <p14:section name="Вложени условни конструкции" id="{A2A3C374-4AC4-4070-A207-C49EDDB9073E}">
+          <p14:sldIdLst>
+            <p14:sldId id="625"/>
+            <p14:sldId id="626"/>
+          </p14:sldIdLst>
+        </p14:section>
         <p14:section name="Обобщение" id="{AF8DF84A-0515-4E34-ADFD-EC257BB9552E}">
           <p14:sldIdLst>
             <p14:sldId id="577"/>
@@ -323,7 +331,7 @@
           <a:p>
             <a:fld id="{4E087215-0C8F-4762-A664-737A353EC9A4}" type="datetimeFigureOut">
               <a:rPr lang="bg-BG" smtClean="0"/>
-              <a:t>6.02.23 г.</a:t>
+              <a:t>9.2.2023 г.</a:t>
             </a:fld>
             <a:endParaRPr lang="bg-BG" dirty="0"/>
           </a:p>
@@ -514,7 +522,7 @@
           <a:p>
             <a:fld id="{72D84649-876A-46C9-8472-14CB09C070D8}" type="datetimeFigureOut">
               <a:rPr lang="en-US" smtClean="0"/>
-              <a:t>2/6/23</a:t>
+              <a:t>9-Feb-23</a:t>
             </a:fld>
             <a:endParaRPr lang="en-US" dirty="0"/>
           </a:p>
@@ -1505,7 +1513,7 @@
             <a:fld id="{3EBA5BD7-F043-4D1B-AA17-CD412FC534DE}" type="slidenum">
               <a:rPr lang="en-US" smtClean="0"/>
               <a:pPr/>
-              <a:t>32</a:t>
+              <a:t>34</a:t>
             </a:fld>
             <a:endParaRPr lang="en-US" dirty="0"/>
           </a:p>
@@ -1746,7 +1754,7 @@
             <a:fld id="{3EBA5BD7-F043-4D1B-AA17-CD412FC534DE}" type="slidenum">
               <a:rPr lang="en-US" smtClean="0"/>
               <a:pPr/>
-              <a:t>33</a:t>
+              <a:t>35</a:t>
             </a:fld>
             <a:endParaRPr lang="en-US" dirty="0"/>
           </a:p>
@@ -1987,7 +1995,7 @@
             <a:fld id="{3EBA5BD7-F043-4D1B-AA17-CD412FC534DE}" type="slidenum">
               <a:rPr lang="en-US" smtClean="0"/>
               <a:pPr/>
-              <a:t>34</a:t>
+              <a:t>36</a:t>
             </a:fld>
             <a:endParaRPr lang="en-US" dirty="0"/>
           </a:p>
@@ -2228,7 +2236,7 @@
             <a:fld id="{3EBA5BD7-F043-4D1B-AA17-CD412FC534DE}" type="slidenum">
               <a:rPr lang="en-US" smtClean="0"/>
               <a:pPr/>
-              <a:t>35</a:t>
+              <a:t>37</a:t>
             </a:fld>
             <a:endParaRPr lang="en-US" dirty="0"/>
           </a:p>
@@ -9390,8 +9398,8 @@
           </a:xfrm>
           <a:prstGeom prst="wedgeRoundRectCallout">
             <a:avLst>
-              <a:gd name="adj1" fmla="val 58384"/>
-              <a:gd name="adj2" fmla="val 57631"/>
+              <a:gd name="adj1" fmla="val 70053"/>
+              <a:gd name="adj2" fmla="val 68586"/>
               <a:gd name="adj3" fmla="val 16667"/>
             </a:avLst>
           </a:prstGeom>
@@ -9496,8 +9504,8 @@
           </a:xfrm>
           <a:prstGeom prst="wedgeRoundRectCallout">
             <a:avLst>
-              <a:gd name="adj1" fmla="val -55711"/>
-              <a:gd name="adj2" fmla="val 52479"/>
+              <a:gd name="adj1" fmla="val -61563"/>
+              <a:gd name="adj2" fmla="val 58455"/>
               <a:gd name="adj3" fmla="val 16667"/>
             </a:avLst>
           </a:prstGeom>
@@ -11390,7 +11398,7 @@
         </p:nvSpPr>
         <p:spPr>
           <a:xfrm>
-            <a:off x="6466324" y="3274991"/>
+            <a:off x="6395263" y="3239892"/>
             <a:ext cx="985208" cy="603892"/>
           </a:xfrm>
           <a:prstGeom prst="rect">
@@ -19431,6 +19439,17 @@
               <a:t>switch-case</a:t>
             </a:r>
           </a:p>
+          <a:p>
+            <a:r>
+              <a:rPr lang="bg-BG" sz="3200" dirty="0"/>
+              <a:t>Вложени условни конструкции</a:t>
+            </a:r>
+            <a:endParaRPr lang="en-US" sz="3200" b="1" dirty="0">
+              <a:solidFill>
+                <a:schemeClr val="bg1"/>
+              </a:solidFill>
+            </a:endParaRPr>
+          </a:p>
         </p:txBody>
       </p:sp>
       <p:sp>
@@ -19740,6 +19759,55 @@
                                           <p:spTgt spid="3">
                                             <p:txEl>
                                               <p:pRg st="3" end="3"/>
+                                            </p:txEl>
+                                          </p:spTgt>
+                                        </p:tgtEl>
+                                        <p:attrNameLst>
+                                          <p:attrName>style.visibility</p:attrName>
+                                        </p:attrNameLst>
+                                      </p:cBhvr>
+                                      <p:to>
+                                        <p:strVal val="visible"/>
+                                      </p:to>
+                                    </p:set>
+                                  </p:childTnLst>
+                                </p:cTn>
+                              </p:par>
+                            </p:childTnLst>
+                          </p:cTn>
+                        </p:par>
+                      </p:childTnLst>
+                    </p:cTn>
+                  </p:par>
+                  <p:par>
+                    <p:cTn id="15" fill="hold">
+                      <p:stCondLst>
+                        <p:cond delay="indefinite"/>
+                      </p:stCondLst>
+                      <p:childTnLst>
+                        <p:par>
+                          <p:cTn id="16" fill="hold">
+                            <p:stCondLst>
+                              <p:cond delay="0"/>
+                            </p:stCondLst>
+                            <p:childTnLst>
+                              <p:par>
+                                <p:cTn id="17" presetID="1" presetClass="entr" presetSubtype="0" fill="hold" nodeType="clickEffect">
+                                  <p:stCondLst>
+                                    <p:cond delay="0"/>
+                                  </p:stCondLst>
+                                  <p:childTnLst>
+                                    <p:set>
+                                      <p:cBhvr>
+                                        <p:cTn id="18" dur="1" fill="hold">
+                                          <p:stCondLst>
+                                            <p:cond delay="0"/>
+                                          </p:stCondLst>
+                                        </p:cTn>
+                                        <p:tgtEl>
+                                          <p:spTgt spid="3">
+                                            <p:txEl>
+                                              <p:pRg st="4" end="4"/>
                                             </p:txEl>
                                           </p:spTgt>
                                         </p:tgtEl>
@@ -21785,6 +21853,40 @@
       </p:sp>
       <p:sp>
         <p:nvSpPr>
+          <p:cNvPr id="3" name="Subtitle 2">
+            <a:extLst>
+              <a:ext uri="{FF2B5EF4-FFF2-40B4-BE49-F238E27FC236}">
+                <a16:creationId xmlns:a16="http://schemas.microsoft.com/office/drawing/2014/main" id="{157939DD-2211-D65D-AB11-13296A4E63DB}"/>
+              </a:ext>
+            </a:extLst>
+          </p:cNvPr>
+          <p:cNvSpPr>
+            <a:spLocks noGrp="1"/>
+          </p:cNvSpPr>
+          <p:nvPr>
+            <p:ph type="subTitle" sz="quarter" idx="11"/>
+          </p:nvPr>
+        </p:nvSpPr>
+        <p:spPr>
+          <a:xfrm>
+            <a:off x="381001" y="5630916"/>
+            <a:ext cx="11430000" cy="768084"/>
+          </a:xfrm>
+        </p:spPr>
+        <p:txBody>
+          <a:bodyPr/>
+          <a:lstStyle/>
+          <a:p>
+            <a:r>
+              <a:rPr lang="bg-BG" dirty="0"/>
+              <a:t>Серия от проверки за една и съща входна стойност</a:t>
+            </a:r>
+            <a:endParaRPr lang="en-US" dirty="0"/>
+          </a:p>
+        </p:txBody>
+      </p:sp>
+      <p:sp>
+        <p:nvSpPr>
           <p:cNvPr id="6" name="Title 5">
             <a:extLst>
               <a:ext uri="{FF2B5EF4-FFF2-40B4-BE49-F238E27FC236}">
@@ -21799,7 +21901,12 @@
             <p:ph type="title" sz="quarter" idx="10"/>
           </p:nvPr>
         </p:nvSpPr>
-        <p:spPr/>
+        <p:spPr>
+          <a:xfrm>
+            <a:off x="615109" y="4749825"/>
+            <a:ext cx="10961783" cy="768084"/>
+          </a:xfrm>
+        </p:spPr>
         <p:txBody>
           <a:bodyPr/>
           <a:lstStyle/>
@@ -21810,7 +21917,7 @@
             </a:r>
             <a:r>
               <a:rPr lang="en-GB" dirty="0"/>
-              <a:t>Switch-case</a:t>
+              <a:t>switch-case</a:t>
             </a:r>
           </a:p>
         </p:txBody>
@@ -21923,7 +22030,7 @@
             </a:r>
             <a:r>
               <a:rPr lang="en-GB" dirty="0"/>
-              <a:t>Switch-case</a:t>
+              <a:t>switch-case</a:t>
             </a:r>
             <a:endParaRPr lang="bg-BG" dirty="0">
               <a:latin typeface="Consolas" pitchFamily="49" charset="0"/>
@@ -24265,7 +24372,7 @@
         </p:nvSpPr>
         <p:spPr bwMode="auto">
           <a:xfrm>
-            <a:off x="2289974" y="1204938"/>
+            <a:off x="2289974" y="1276625"/>
             <a:ext cx="7535873" cy="5032375"/>
           </a:xfrm>
           <a:prstGeom prst="rect">
@@ -24679,7 +24786,7 @@
         </p:nvSpPr>
         <p:spPr>
           <a:xfrm>
-            <a:off x="346647" y="6403994"/>
+            <a:off x="346647" y="6372464"/>
             <a:ext cx="11498705" cy="400006"/>
           </a:xfrm>
           <a:prstGeom prst="rect">
@@ -25376,7 +25483,7 @@
             </a:r>
             <a:r>
               <a:rPr lang="en-US" dirty="0"/>
-              <a:t>Switch-case</a:t>
+              <a:t>switch-case</a:t>
             </a:r>
             <a:endParaRPr lang="bg-BG" dirty="0">
               <a:latin typeface="Consolas" panose="020B0609020204030204" pitchFamily="49" charset="0"/>
@@ -27626,7 +27733,19 @@
               <a:rPr lang="en-US" sz="2199" b="1" dirty="0">
                 <a:latin typeface="Consolas" panose="020B0609020204030204" pitchFamily="49" charset="0"/>
               </a:rPr>
-              <a:t>   break;</a:t>
+              <a:t>   </a:t>
+            </a:r>
+            <a:r>
+              <a:rPr lang="bg-BG" sz="2199" b="1" dirty="0">
+                <a:latin typeface="Consolas" panose="020B0609020204030204" pitchFamily="49" charset="0"/>
+              </a:rPr>
+              <a:t>  </a:t>
+            </a:r>
+            <a:r>
+              <a:rPr lang="en-US" sz="2199" b="1" dirty="0">
+                <a:latin typeface="Consolas" panose="020B0609020204030204" pitchFamily="49" charset="0"/>
+              </a:rPr>
+              <a:t>break;</a:t>
             </a:r>
           </a:p>
           <a:p>
@@ -27703,7 +27822,19 @@
               <a:rPr lang="en-US" sz="2199" b="1" dirty="0">
                 <a:latin typeface="Consolas" panose="020B0609020204030204" pitchFamily="49" charset="0"/>
               </a:rPr>
-              <a:t>   break;</a:t>
+              <a:t>   </a:t>
+            </a:r>
+            <a:r>
+              <a:rPr lang="bg-BG" sz="2199" b="1" dirty="0">
+                <a:latin typeface="Consolas" panose="020B0609020204030204" pitchFamily="49" charset="0"/>
+              </a:rPr>
+              <a:t>  </a:t>
+            </a:r>
+            <a:r>
+              <a:rPr lang="en-US" sz="2199" b="1" dirty="0">
+                <a:latin typeface="Consolas" panose="020B0609020204030204" pitchFamily="49" charset="0"/>
+              </a:rPr>
+              <a:t>break;</a:t>
             </a:r>
           </a:p>
           <a:p>
@@ -27745,7 +27876,7 @@
               <a:rPr lang="bg-BG" sz="2199" b="1" dirty="0">
                 <a:latin typeface="Consolas" panose="020B0609020204030204" pitchFamily="49" charset="0"/>
               </a:rPr>
-              <a:t>   </a:t>
+              <a:t>     </a:t>
             </a:r>
             <a:r>
               <a:rPr lang="en-US" sz="2199" b="1" dirty="0">
@@ -28709,7 +28840,12 @@
             <p:ph type="title" sz="quarter" idx="10"/>
           </p:nvPr>
         </p:nvSpPr>
-        <p:spPr/>
+        <p:spPr>
+          <a:xfrm>
+            <a:off x="615109" y="4789108"/>
+            <a:ext cx="10961783" cy="844892"/>
+          </a:xfrm>
+        </p:spPr>
         <p:txBody>
           <a:bodyPr/>
           <a:lstStyle/>
@@ -30990,6 +31126,1205 @@
           <a:chExt cx="0" cy="0"/>
         </a:xfrm>
       </p:grpSpPr>
+      <p:pic>
+        <p:nvPicPr>
+          <p:cNvPr id="4" name="Picture 3">
+            <a:extLst>
+              <a:ext uri="{FF2B5EF4-FFF2-40B4-BE49-F238E27FC236}">
+                <a16:creationId xmlns:a16="http://schemas.microsoft.com/office/drawing/2014/main" id="{67C65D0E-6366-4D88-BE15-FEC1EAD929EF}"/>
+              </a:ext>
+            </a:extLst>
+          </p:cNvPr>
+          <p:cNvPicPr>
+            <a:picLocks noChangeAspect="1"/>
+          </p:cNvPicPr>
+          <p:nvPr/>
+        </p:nvPicPr>
+        <p:blipFill>
+          <a:blip r:embed="rId2">
+            <a:extLst>
+              <a:ext uri="{28A0092B-C50C-407E-A947-70E740481C1C}">
+                <a14:useLocalDpi xmlns:a14="http://schemas.microsoft.com/office/drawing/2010/main" val="0"/>
+              </a:ext>
+            </a:extLst>
+          </a:blip>
+          <a:stretch>
+            <a:fillRect/>
+          </a:stretch>
+        </p:blipFill>
+        <p:spPr>
+          <a:xfrm>
+            <a:off x="3555750" y="1449000"/>
+            <a:ext cx="5083676" cy="2498756"/>
+          </a:xfrm>
+          <a:prstGeom prst="rect">
+            <a:avLst/>
+          </a:prstGeom>
+        </p:spPr>
+      </p:pic>
+      <p:sp>
+        <p:nvSpPr>
+          <p:cNvPr id="3" name="Subtitle 2">
+            <a:extLst>
+              <a:ext uri="{FF2B5EF4-FFF2-40B4-BE49-F238E27FC236}">
+                <a16:creationId xmlns:a16="http://schemas.microsoft.com/office/drawing/2014/main" id="{8EC4C7F7-44F9-3F42-C2E2-6A5142CAFCE9}"/>
+              </a:ext>
+            </a:extLst>
+          </p:cNvPr>
+          <p:cNvSpPr>
+            <a:spLocks noGrp="1"/>
+          </p:cNvSpPr>
+          <p:nvPr>
+            <p:ph type="subTitle" sz="quarter" idx="11"/>
+          </p:nvPr>
+        </p:nvSpPr>
+        <p:spPr/>
+        <p:txBody>
+          <a:bodyPr/>
+          <a:lstStyle/>
+          <a:p>
+            <a:r>
+              <a:rPr lang="en-US" dirty="0"/>
+              <a:t>If-else </a:t>
+            </a:r>
+            <a:r>
+              <a:rPr lang="bg-BG" dirty="0"/>
+              <a:t>проверка в тялото на друга </a:t>
+            </a:r>
+            <a:r>
+              <a:rPr lang="en-US" dirty="0"/>
+              <a:t>if-else </a:t>
+            </a:r>
+            <a:r>
+              <a:rPr lang="bg-BG" dirty="0"/>
+              <a:t>проверка</a:t>
+            </a:r>
+            <a:endParaRPr lang="en-US" dirty="0"/>
+          </a:p>
+        </p:txBody>
+      </p:sp>
+      <p:sp>
+        <p:nvSpPr>
+          <p:cNvPr id="6" name="Title 5">
+            <a:extLst>
+              <a:ext uri="{FF2B5EF4-FFF2-40B4-BE49-F238E27FC236}">
+                <a16:creationId xmlns:a16="http://schemas.microsoft.com/office/drawing/2014/main" id="{44BAE503-9AA3-4C44-B280-DA43F672257E}"/>
+              </a:ext>
+            </a:extLst>
+          </p:cNvPr>
+          <p:cNvSpPr>
+            <a:spLocks noGrp="1"/>
+          </p:cNvSpPr>
+          <p:nvPr>
+            <p:ph type="title" sz="quarter" idx="10"/>
+          </p:nvPr>
+        </p:nvSpPr>
+        <p:spPr/>
+        <p:txBody>
+          <a:bodyPr/>
+          <a:lstStyle/>
+          <a:p>
+            <a:r>
+              <a:rPr lang="bg-BG" dirty="0"/>
+              <a:t>Вложени условни конструкции</a:t>
+            </a:r>
+            <a:endParaRPr lang="en-GB" dirty="0"/>
+          </a:p>
+        </p:txBody>
+      </p:sp>
+    </p:spTree>
+    <p:extLst>
+      <p:ext uri="{BB962C8B-B14F-4D97-AF65-F5344CB8AC3E}">
+        <p14:creationId xmlns:p14="http://schemas.microsoft.com/office/powerpoint/2010/main" val="2569010342"/>
+      </p:ext>
+    </p:extLst>
+  </p:cSld>
+  <p:clrMapOvr>
+    <a:masterClrMapping/>
+  </p:clrMapOvr>
+  <mc:AlternateContent xmlns:mc="http://schemas.openxmlformats.org/markup-compatibility/2006" xmlns:p14="http://schemas.microsoft.com/office/powerpoint/2010/main">
+    <mc:Choice Requires="p14">
+      <p:transition p14:dur="0" advClick="0" advTm="5000"/>
+    </mc:Choice>
+    <mc:Fallback xmlns="">
+      <p:transition advClick="0" advTm="5000"/>
+    </mc:Fallback>
+  </mc:AlternateContent>
+</p:sld>
+</file>
+
+<file path=ppt/slides/slide33.xml><?xml version="1.0" encoding="utf-8"?>
+<p:sld xmlns:a="http://schemas.openxmlformats.org/drawingml/2006/main" xmlns:r="http://schemas.openxmlformats.org/officeDocument/2006/relationships" xmlns:p="http://schemas.openxmlformats.org/presentationml/2006/main">
+  <p:cSld>
+    <p:spTree>
+      <p:nvGrpSpPr>
+        <p:cNvPr id="1" name=""/>
+        <p:cNvGrpSpPr/>
+        <p:nvPr/>
+      </p:nvGrpSpPr>
+      <p:grpSpPr>
+        <a:xfrm>
+          <a:off x="0" y="0"/>
+          <a:ext cx="0" cy="0"/>
+          <a:chOff x="0" y="0"/>
+          <a:chExt cx="0" cy="0"/>
+        </a:xfrm>
+      </p:grpSpPr>
+      <p:sp>
+        <p:nvSpPr>
+          <p:cNvPr id="3" name="Content Placeholder 2"/>
+          <p:cNvSpPr>
+            <a:spLocks noGrp="1"/>
+          </p:cNvSpPr>
+          <p:nvPr>
+            <p:ph type="body" sz="quarter" idx="10"/>
+          </p:nvPr>
+        </p:nvSpPr>
+        <p:spPr>
+          <a:xfrm>
+            <a:off x="190406" y="1126734"/>
+            <a:ext cx="11818096" cy="5528766"/>
+          </a:xfrm>
+        </p:spPr>
+        <p:txBody>
+          <a:bodyPr>
+            <a:normAutofit/>
+          </a:bodyPr>
+          <a:lstStyle/>
+          <a:p>
+            <a:pPr>
+              <a:lnSpc>
+                <a:spcPct val="110000"/>
+              </a:lnSpc>
+            </a:pPr>
+            <a:r>
+              <a:rPr lang="bg-BG" sz="3100" dirty="0"/>
+              <a:t>В тялото на </a:t>
+            </a:r>
+            <a:r>
+              <a:rPr lang="en-US" sz="3100" b="1" dirty="0">
+                <a:latin typeface="Consolas" panose="020B0609020204030204" pitchFamily="49" charset="0"/>
+              </a:rPr>
+              <a:t>if-else</a:t>
+            </a:r>
+            <a:r>
+              <a:rPr lang="en-US" sz="3100" dirty="0"/>
+              <a:t> </a:t>
+            </a:r>
+            <a:r>
+              <a:rPr lang="bg-BG" sz="3100" dirty="0"/>
+              <a:t>може да има друг </a:t>
+            </a:r>
+            <a:r>
+              <a:rPr lang="en-US" sz="3100" b="1" dirty="0">
+                <a:latin typeface="Consolas" panose="020B0609020204030204" pitchFamily="49" charset="0"/>
+              </a:rPr>
+              <a:t>if-else</a:t>
+            </a:r>
+            <a:r>
+              <a:rPr lang="en-US" sz="3100" dirty="0"/>
+              <a:t>:</a:t>
+            </a:r>
+          </a:p>
+          <a:p>
+            <a:pPr>
+              <a:lnSpc>
+                <a:spcPct val="110000"/>
+              </a:lnSpc>
+            </a:pPr>
+            <a:endParaRPr lang="bg-BG" sz="3100" dirty="0"/>
+          </a:p>
+          <a:p>
+            <a:pPr>
+              <a:lnSpc>
+                <a:spcPct val="110000"/>
+              </a:lnSpc>
+            </a:pPr>
+            <a:endParaRPr lang="bg-BG" sz="3100" dirty="0"/>
+          </a:p>
+          <a:p>
+            <a:pPr lvl="2">
+              <a:lnSpc>
+                <a:spcPct val="110000"/>
+              </a:lnSpc>
+            </a:pPr>
+            <a:endParaRPr lang="en-US" sz="3100" dirty="0"/>
+          </a:p>
+        </p:txBody>
+      </p:sp>
+      <p:sp>
+        <p:nvSpPr>
+          <p:cNvPr id="4" name="Title 3"/>
+          <p:cNvSpPr>
+            <a:spLocks noGrp="1"/>
+          </p:cNvSpPr>
+          <p:nvPr>
+            <p:ph type="title"/>
+          </p:nvPr>
+        </p:nvSpPr>
+        <p:spPr/>
+        <p:txBody>
+          <a:bodyPr>
+            <a:normAutofit/>
+          </a:bodyPr>
+          <a:lstStyle/>
+          <a:p>
+            <a:r>
+              <a:rPr lang="bg-BG" sz="4000" dirty="0"/>
+              <a:t>Вложени условни конструкции</a:t>
+            </a:r>
+            <a:r>
+              <a:rPr lang="en-US" sz="2800" dirty="0"/>
+              <a:t> </a:t>
+            </a:r>
+            <a:endParaRPr lang="en-US" sz="3200" dirty="0"/>
+          </a:p>
+        </p:txBody>
+      </p:sp>
+      <p:sp>
+        <p:nvSpPr>
+          <p:cNvPr id="14" name="Rectangle 5">
+            <a:extLst>
+              <a:ext uri="{FF2B5EF4-FFF2-40B4-BE49-F238E27FC236}">
+                <a16:creationId xmlns:a16="http://schemas.microsoft.com/office/drawing/2014/main" id="{9499704D-414D-43C6-B7E0-80D135275361}"/>
+              </a:ext>
+            </a:extLst>
+          </p:cNvPr>
+          <p:cNvSpPr>
+            <a:spLocks noChangeArrowheads="1"/>
+          </p:cNvSpPr>
+          <p:nvPr/>
+        </p:nvSpPr>
+        <p:spPr bwMode="auto">
+          <a:xfrm>
+            <a:off x="984313" y="1899000"/>
+            <a:ext cx="10223377" cy="4378122"/>
+          </a:xfrm>
+          <a:prstGeom prst="rect">
+            <a:avLst/>
+          </a:prstGeom>
+          <a:solidFill>
+            <a:schemeClr val="accent5">
+              <a:lumMod val="40000"/>
+              <a:lumOff val="60000"/>
+              <a:alpha val="20000"/>
+            </a:schemeClr>
+          </a:solidFill>
+          <a:ln w="12700">
+            <a:solidFill>
+              <a:schemeClr val="accent5">
+                <a:lumMod val="60000"/>
+                <a:lumOff val="40000"/>
+              </a:schemeClr>
+            </a:solidFill>
+          </a:ln>
+        </p:spPr>
+        <p:txBody>
+          <a:bodyPr wrap="square">
+            <a:spAutoFit/>
+          </a:bodyPr>
+          <a:lstStyle/>
+          <a:p>
+            <a:pPr eaLnBrk="0" hangingPunct="0">
+              <a:lnSpc>
+                <a:spcPct val="120000"/>
+              </a:lnSpc>
+              <a:buClr>
+                <a:schemeClr val="accent5">
+                  <a:lumMod val="40000"/>
+                  <a:lumOff val="60000"/>
+                </a:schemeClr>
+              </a:buClr>
+              <a:buSzPct val="70000"/>
+            </a:pPr>
+            <a:r>
+              <a:rPr lang="en-US" sz="2599" b="1" noProof="1">
+                <a:latin typeface="Consolas" pitchFamily="49" charset="0"/>
+                <a:cs typeface="Consolas" pitchFamily="49" charset="0"/>
+              </a:rPr>
+              <a:t>int a = 5, b = 7;</a:t>
+            </a:r>
+            <a:endParaRPr lang="bg-BG" sz="2599" b="1" noProof="1">
+              <a:solidFill>
+                <a:schemeClr val="bg1"/>
+              </a:solidFill>
+              <a:latin typeface="Consolas" pitchFamily="49" charset="0"/>
+              <a:cs typeface="Consolas" pitchFamily="49" charset="0"/>
+            </a:endParaRPr>
+          </a:p>
+          <a:p>
+            <a:pPr eaLnBrk="0" hangingPunct="0">
+              <a:lnSpc>
+                <a:spcPct val="120000"/>
+              </a:lnSpc>
+              <a:buClr>
+                <a:schemeClr val="accent5">
+                  <a:lumMod val="40000"/>
+                  <a:lumOff val="60000"/>
+                </a:schemeClr>
+              </a:buClr>
+              <a:buSzPct val="70000"/>
+            </a:pPr>
+            <a:r>
+              <a:rPr lang="en-US" sz="2599" b="1" noProof="1">
+                <a:solidFill>
+                  <a:schemeClr val="bg1"/>
+                </a:solidFill>
+                <a:latin typeface="Consolas" pitchFamily="49" charset="0"/>
+                <a:cs typeface="Consolas" pitchFamily="49" charset="0"/>
+              </a:rPr>
+              <a:t>if</a:t>
+            </a:r>
+            <a:r>
+              <a:rPr lang="en-US" sz="2599" b="1" noProof="1">
+                <a:latin typeface="Consolas" pitchFamily="49" charset="0"/>
+                <a:cs typeface="Consolas" pitchFamily="49" charset="0"/>
+              </a:rPr>
+              <a:t> (a &gt; 0)</a:t>
+            </a:r>
+          </a:p>
+          <a:p>
+            <a:pPr eaLnBrk="0" hangingPunct="0">
+              <a:lnSpc>
+                <a:spcPct val="120000"/>
+              </a:lnSpc>
+              <a:buClr>
+                <a:schemeClr val="accent5">
+                  <a:lumMod val="40000"/>
+                  <a:lumOff val="60000"/>
+                </a:schemeClr>
+              </a:buClr>
+              <a:buSzPct val="70000"/>
+            </a:pPr>
+            <a:r>
+              <a:rPr lang="en-US" sz="2599" b="1" noProof="1">
+                <a:latin typeface="Consolas" pitchFamily="49" charset="0"/>
+                <a:cs typeface="Consolas" pitchFamily="49" charset="0"/>
+              </a:rPr>
+              <a:t>{</a:t>
+            </a:r>
+            <a:endParaRPr lang="bg-BG" sz="2599" b="1" noProof="1">
+              <a:latin typeface="Consolas" pitchFamily="49" charset="0"/>
+              <a:cs typeface="Consolas" pitchFamily="49" charset="0"/>
+            </a:endParaRPr>
+          </a:p>
+          <a:p>
+            <a:pPr eaLnBrk="0" hangingPunct="0">
+              <a:lnSpc>
+                <a:spcPct val="120000"/>
+              </a:lnSpc>
+              <a:buClr>
+                <a:schemeClr val="accent5">
+                  <a:lumMod val="40000"/>
+                  <a:lumOff val="60000"/>
+                </a:schemeClr>
+              </a:buClr>
+              <a:buSzPct val="70000"/>
+            </a:pPr>
+            <a:r>
+              <a:rPr lang="en-US" sz="2599" b="1" noProof="1">
+                <a:latin typeface="Consolas" pitchFamily="49" charset="0"/>
+                <a:cs typeface="Consolas" pitchFamily="49" charset="0"/>
+              </a:rPr>
+              <a:t>    Console.WriteLine("a is positive");</a:t>
+            </a:r>
+          </a:p>
+          <a:p>
+            <a:pPr eaLnBrk="0" hangingPunct="0">
+              <a:lnSpc>
+                <a:spcPct val="120000"/>
+              </a:lnSpc>
+              <a:buClr>
+                <a:schemeClr val="accent5">
+                  <a:lumMod val="40000"/>
+                  <a:lumOff val="60000"/>
+                </a:schemeClr>
+              </a:buClr>
+              <a:buSzPct val="70000"/>
+            </a:pPr>
+            <a:r>
+              <a:rPr lang="en-US" sz="2599" b="1" noProof="1">
+                <a:latin typeface="Consolas" pitchFamily="49" charset="0"/>
+                <a:cs typeface="Consolas" pitchFamily="49" charset="0"/>
+              </a:rPr>
+              <a:t>  </a:t>
+            </a:r>
+            <a:r>
+              <a:rPr lang="bg-BG" sz="2599" b="1" noProof="1">
+                <a:latin typeface="Consolas" pitchFamily="49" charset="0"/>
+                <a:cs typeface="Consolas" pitchFamily="49" charset="0"/>
+              </a:rPr>
+              <a:t> </a:t>
+            </a:r>
+            <a:r>
+              <a:rPr lang="en-US" sz="2599" b="1" noProof="1">
+                <a:latin typeface="Consolas" pitchFamily="49" charset="0"/>
+                <a:cs typeface="Consolas" pitchFamily="49" charset="0"/>
+              </a:rPr>
+              <a:t> </a:t>
+            </a:r>
+            <a:r>
+              <a:rPr lang="en-US" sz="2599" b="1" noProof="1">
+                <a:solidFill>
+                  <a:schemeClr val="bg1"/>
+                </a:solidFill>
+                <a:latin typeface="Consolas" pitchFamily="49" charset="0"/>
+                <a:cs typeface="Consolas" pitchFamily="49" charset="0"/>
+              </a:rPr>
+              <a:t>if</a:t>
+            </a:r>
+            <a:r>
+              <a:rPr lang="en-US" sz="2599" b="1" noProof="1">
+                <a:latin typeface="Consolas" pitchFamily="49" charset="0"/>
+                <a:cs typeface="Consolas" pitchFamily="49" charset="0"/>
+              </a:rPr>
+              <a:t> (b &gt; 0)</a:t>
+            </a:r>
+          </a:p>
+          <a:p>
+            <a:pPr eaLnBrk="0" hangingPunct="0">
+              <a:lnSpc>
+                <a:spcPct val="120000"/>
+              </a:lnSpc>
+              <a:buClr>
+                <a:schemeClr val="accent5">
+                  <a:lumMod val="40000"/>
+                  <a:lumOff val="60000"/>
+                </a:schemeClr>
+              </a:buClr>
+              <a:buSzPct val="70000"/>
+            </a:pPr>
+            <a:r>
+              <a:rPr lang="en-US" sz="2599" b="1" noProof="1">
+                <a:latin typeface="Consolas" pitchFamily="49" charset="0"/>
+                <a:cs typeface="Consolas" pitchFamily="49" charset="0"/>
+              </a:rPr>
+              <a:t>   </a:t>
+            </a:r>
+            <a:r>
+              <a:rPr lang="bg-BG" sz="2599" b="1" noProof="1">
+                <a:latin typeface="Consolas" pitchFamily="49" charset="0"/>
+                <a:cs typeface="Consolas" pitchFamily="49" charset="0"/>
+              </a:rPr>
+              <a:t> </a:t>
+            </a:r>
+            <a:r>
+              <a:rPr lang="en-US" sz="2599" b="1" noProof="1">
+                <a:latin typeface="Consolas" pitchFamily="49" charset="0"/>
+                <a:cs typeface="Consolas" pitchFamily="49" charset="0"/>
+              </a:rPr>
+              <a:t>    Console.WriteLine("b is also a positive");</a:t>
+            </a:r>
+          </a:p>
+          <a:p>
+            <a:pPr eaLnBrk="0" hangingPunct="0">
+              <a:lnSpc>
+                <a:spcPct val="120000"/>
+              </a:lnSpc>
+              <a:buClr>
+                <a:schemeClr val="accent5">
+                  <a:lumMod val="40000"/>
+                  <a:lumOff val="60000"/>
+                </a:schemeClr>
+              </a:buClr>
+              <a:buSzPct val="70000"/>
+            </a:pPr>
+            <a:r>
+              <a:rPr lang="en-US" sz="2599" b="1" noProof="1">
+                <a:latin typeface="Consolas" pitchFamily="49" charset="0"/>
+                <a:cs typeface="Consolas" pitchFamily="49" charset="0"/>
+              </a:rPr>
+              <a:t>    </a:t>
+            </a:r>
+            <a:r>
+              <a:rPr lang="en-US" sz="2599" b="1" noProof="1">
+                <a:solidFill>
+                  <a:schemeClr val="bg1"/>
+                </a:solidFill>
+                <a:latin typeface="Consolas" pitchFamily="49" charset="0"/>
+                <a:cs typeface="Consolas" pitchFamily="49" charset="0"/>
+              </a:rPr>
+              <a:t>else</a:t>
+            </a:r>
+          </a:p>
+          <a:p>
+            <a:pPr eaLnBrk="0" hangingPunct="0">
+              <a:lnSpc>
+                <a:spcPct val="120000"/>
+              </a:lnSpc>
+              <a:buClr>
+                <a:schemeClr val="accent5">
+                  <a:lumMod val="40000"/>
+                  <a:lumOff val="60000"/>
+                </a:schemeClr>
+              </a:buClr>
+              <a:buSzPct val="70000"/>
+            </a:pPr>
+            <a:r>
+              <a:rPr lang="en-US" sz="2599" b="1" noProof="1">
+                <a:latin typeface="Consolas" pitchFamily="49" charset="0"/>
+                <a:cs typeface="Consolas" pitchFamily="49" charset="0"/>
+              </a:rPr>
+              <a:t> </a:t>
+            </a:r>
+            <a:r>
+              <a:rPr lang="bg-BG" sz="2599" b="1" noProof="1">
+                <a:latin typeface="Consolas" pitchFamily="49" charset="0"/>
+                <a:cs typeface="Consolas" pitchFamily="49" charset="0"/>
+              </a:rPr>
+              <a:t>  </a:t>
+            </a:r>
+            <a:r>
+              <a:rPr lang="en-US" sz="2599" b="1" noProof="1">
+                <a:latin typeface="Consolas" pitchFamily="49" charset="0"/>
+                <a:cs typeface="Consolas" pitchFamily="49" charset="0"/>
+              </a:rPr>
+              <a:t>     Console.WriteLine("b is zero or negative");</a:t>
+            </a:r>
+          </a:p>
+          <a:p>
+            <a:pPr eaLnBrk="0" hangingPunct="0">
+              <a:lnSpc>
+                <a:spcPct val="120000"/>
+              </a:lnSpc>
+              <a:buClr>
+                <a:schemeClr val="accent5">
+                  <a:lumMod val="40000"/>
+                  <a:lumOff val="60000"/>
+                </a:schemeClr>
+              </a:buClr>
+              <a:buSzPct val="70000"/>
+            </a:pPr>
+            <a:r>
+              <a:rPr lang="en-US" sz="2599" b="1" noProof="1">
+                <a:latin typeface="Consolas" pitchFamily="49" charset="0"/>
+                <a:cs typeface="Consolas" pitchFamily="49" charset="0"/>
+              </a:rPr>
+              <a:t>}</a:t>
+            </a:r>
+          </a:p>
+        </p:txBody>
+      </p:sp>
+      <p:sp>
+        <p:nvSpPr>
+          <p:cNvPr id="15" name="Rectangle 14">
+            <a:extLst>
+              <a:ext uri="{FF2B5EF4-FFF2-40B4-BE49-F238E27FC236}">
+                <a16:creationId xmlns:a16="http://schemas.microsoft.com/office/drawing/2014/main" id="{EF94B746-A587-49E5-A9BD-2305406835FF}"/>
+              </a:ext>
+            </a:extLst>
+          </p:cNvPr>
+          <p:cNvSpPr/>
+          <p:nvPr/>
+        </p:nvSpPr>
+        <p:spPr>
+          <a:xfrm>
+            <a:off x="1641000" y="3834000"/>
+            <a:ext cx="8865000" cy="1948594"/>
+          </a:xfrm>
+          <a:prstGeom prst="rect">
+            <a:avLst/>
+          </a:prstGeom>
+          <a:noFill/>
+          <a:ln w="57150">
+            <a:solidFill>
+              <a:schemeClr val="tx1"/>
+            </a:solidFill>
+          </a:ln>
+        </p:spPr>
+        <p:style>
+          <a:lnRef idx="2">
+            <a:schemeClr val="accent1">
+              <a:shade val="50000"/>
+            </a:schemeClr>
+          </a:lnRef>
+          <a:fillRef idx="1">
+            <a:schemeClr val="accent1"/>
+          </a:fillRef>
+          <a:effectRef idx="0">
+            <a:schemeClr val="accent1"/>
+          </a:effectRef>
+          <a:fontRef idx="minor">
+            <a:schemeClr val="lt1"/>
+          </a:fontRef>
+        </p:style>
+        <p:txBody>
+          <a:bodyPr rtlCol="0" anchor="ctr"/>
+          <a:lstStyle>
+            <a:defPPr>
+              <a:defRPr lang="en-US"/>
+            </a:defPPr>
+            <a:lvl1pPr marL="0" algn="l" defTabSz="1218987" rtl="0" eaLnBrk="1" latinLnBrk="0" hangingPunct="1">
+              <a:defRPr sz="2400" kern="1200">
+                <a:solidFill>
+                  <a:schemeClr val="lt1"/>
+                </a:solidFill>
+                <a:latin typeface="+mn-lt"/>
+                <a:ea typeface="+mn-ea"/>
+                <a:cs typeface="+mn-cs"/>
+              </a:defRPr>
+            </a:lvl1pPr>
+            <a:lvl2pPr marL="609493" algn="l" defTabSz="1218987" rtl="0" eaLnBrk="1" latinLnBrk="0" hangingPunct="1">
+              <a:defRPr sz="2400" kern="1200">
+                <a:solidFill>
+                  <a:schemeClr val="lt1"/>
+                </a:solidFill>
+                <a:latin typeface="+mn-lt"/>
+                <a:ea typeface="+mn-ea"/>
+                <a:cs typeface="+mn-cs"/>
+              </a:defRPr>
+            </a:lvl2pPr>
+            <a:lvl3pPr marL="1218987" algn="l" defTabSz="1218987" rtl="0" eaLnBrk="1" latinLnBrk="0" hangingPunct="1">
+              <a:defRPr sz="2400" kern="1200">
+                <a:solidFill>
+                  <a:schemeClr val="lt1"/>
+                </a:solidFill>
+                <a:latin typeface="+mn-lt"/>
+                <a:ea typeface="+mn-ea"/>
+                <a:cs typeface="+mn-cs"/>
+              </a:defRPr>
+            </a:lvl3pPr>
+            <a:lvl4pPr marL="1828480" algn="l" defTabSz="1218987" rtl="0" eaLnBrk="1" latinLnBrk="0" hangingPunct="1">
+              <a:defRPr sz="2400" kern="1200">
+                <a:solidFill>
+                  <a:schemeClr val="lt1"/>
+                </a:solidFill>
+                <a:latin typeface="+mn-lt"/>
+                <a:ea typeface="+mn-ea"/>
+                <a:cs typeface="+mn-cs"/>
+              </a:defRPr>
+            </a:lvl4pPr>
+            <a:lvl5pPr marL="2437973" algn="l" defTabSz="1218987" rtl="0" eaLnBrk="1" latinLnBrk="0" hangingPunct="1">
+              <a:defRPr sz="2400" kern="1200">
+                <a:solidFill>
+                  <a:schemeClr val="lt1"/>
+                </a:solidFill>
+                <a:latin typeface="+mn-lt"/>
+                <a:ea typeface="+mn-ea"/>
+                <a:cs typeface="+mn-cs"/>
+              </a:defRPr>
+            </a:lvl5pPr>
+            <a:lvl6pPr marL="3047467" algn="l" defTabSz="1218987" rtl="0" eaLnBrk="1" latinLnBrk="0" hangingPunct="1">
+              <a:defRPr sz="2400" kern="1200">
+                <a:solidFill>
+                  <a:schemeClr val="lt1"/>
+                </a:solidFill>
+                <a:latin typeface="+mn-lt"/>
+                <a:ea typeface="+mn-ea"/>
+                <a:cs typeface="+mn-cs"/>
+              </a:defRPr>
+            </a:lvl6pPr>
+            <a:lvl7pPr marL="3656960" algn="l" defTabSz="1218987" rtl="0" eaLnBrk="1" latinLnBrk="0" hangingPunct="1">
+              <a:defRPr sz="2400" kern="1200">
+                <a:solidFill>
+                  <a:schemeClr val="lt1"/>
+                </a:solidFill>
+                <a:latin typeface="+mn-lt"/>
+                <a:ea typeface="+mn-ea"/>
+                <a:cs typeface="+mn-cs"/>
+              </a:defRPr>
+            </a:lvl7pPr>
+            <a:lvl8pPr marL="4266453" algn="l" defTabSz="1218987" rtl="0" eaLnBrk="1" latinLnBrk="0" hangingPunct="1">
+              <a:defRPr sz="2400" kern="1200">
+                <a:solidFill>
+                  <a:schemeClr val="lt1"/>
+                </a:solidFill>
+                <a:latin typeface="+mn-lt"/>
+                <a:ea typeface="+mn-ea"/>
+                <a:cs typeface="+mn-cs"/>
+              </a:defRPr>
+            </a:lvl8pPr>
+            <a:lvl9pPr marL="4875947" algn="l" defTabSz="1218987" rtl="0" eaLnBrk="1" latinLnBrk="0" hangingPunct="1">
+              <a:defRPr sz="2400" kern="1200">
+                <a:solidFill>
+                  <a:schemeClr val="lt1"/>
+                </a:solidFill>
+                <a:latin typeface="+mn-lt"/>
+                <a:ea typeface="+mn-ea"/>
+                <a:cs typeface="+mn-cs"/>
+              </a:defRPr>
+            </a:lvl9pPr>
+          </a:lstStyle>
+          <a:p>
+            <a:pPr algn="ctr"/>
+            <a:endParaRPr lang="en-US" sz="2799" dirty="0">
+              <a:solidFill>
+                <a:schemeClr val="tx1"/>
+              </a:solidFill>
+            </a:endParaRPr>
+          </a:p>
+        </p:txBody>
+      </p:sp>
+      <p:sp>
+        <p:nvSpPr>
+          <p:cNvPr id="16" name="AutoShape 7">
+            <a:extLst>
+              <a:ext uri="{FF2B5EF4-FFF2-40B4-BE49-F238E27FC236}">
+                <a16:creationId xmlns:a16="http://schemas.microsoft.com/office/drawing/2014/main" id="{718AAAED-B166-416D-B57D-98183816BB1A}"/>
+              </a:ext>
+            </a:extLst>
+          </p:cNvPr>
+          <p:cNvSpPr>
+            <a:spLocks noChangeArrowheads="1"/>
+          </p:cNvSpPr>
+          <p:nvPr/>
+        </p:nvSpPr>
+        <p:spPr bwMode="auto">
+          <a:xfrm>
+            <a:off x="6096000" y="5982741"/>
+            <a:ext cx="4508134" cy="524259"/>
+          </a:xfrm>
+          <a:prstGeom prst="wedgeRoundRectCallout">
+            <a:avLst>
+              <a:gd name="adj1" fmla="val -59811"/>
+              <a:gd name="adj2" fmla="val -57464"/>
+              <a:gd name="adj3" fmla="val 16667"/>
+            </a:avLst>
+          </a:prstGeom>
+          <a:solidFill>
+            <a:schemeClr val="tx2">
+              <a:alpha val="80000"/>
+            </a:schemeClr>
+          </a:solidFill>
+          <a:ln w="19050">
+            <a:solidFill>
+              <a:schemeClr val="tx1">
+                <a:lumMod val="50000"/>
+                <a:alpha val="80000"/>
+              </a:schemeClr>
+            </a:solidFill>
+          </a:ln>
+        </p:spPr>
+        <p:style>
+          <a:lnRef idx="2">
+            <a:schemeClr val="accent1">
+              <a:shade val="50000"/>
+            </a:schemeClr>
+          </a:lnRef>
+          <a:fillRef idx="1">
+            <a:schemeClr val="accent1"/>
+          </a:fillRef>
+          <a:effectRef idx="0">
+            <a:schemeClr val="accent1"/>
+          </a:effectRef>
+          <a:fontRef idx="minor">
+            <a:schemeClr val="lt1"/>
+          </a:fontRef>
+        </p:style>
+        <p:txBody>
+          <a:bodyPr rot="0" spcFirstLastPara="0" vertOverflow="overflow" horzOverflow="overflow" vert="horz" wrap="square" lIns="91440" tIns="45720" rIns="91440" bIns="45720" numCol="1" spcCol="0" rtlCol="0" fromWordArt="0" anchor="ctr" anchorCtr="0" forceAA="0" compatLnSpc="1">
+            <a:prstTxWarp prst="textNoShape">
+              <a:avLst/>
+            </a:prstTxWarp>
+            <a:noAutofit/>
+          </a:bodyPr>
+          <a:lstStyle/>
+          <a:p>
+            <a:pPr algn="ctr"/>
+            <a:r>
+              <a:rPr lang="bg-BG" sz="2800" b="1" dirty="0">
+                <a:solidFill>
+                  <a:srgbClr val="FFFFFF"/>
+                </a:solidFill>
+              </a:rPr>
+              <a:t>Вложена </a:t>
+            </a:r>
+            <a:r>
+              <a:rPr lang="en-US" sz="2800" b="1" dirty="0">
+                <a:solidFill>
+                  <a:srgbClr val="FFFFFF"/>
+                </a:solidFill>
+              </a:rPr>
+              <a:t>if</a:t>
+            </a:r>
+            <a:r>
+              <a:rPr lang="bg-BG" sz="2800" b="1" dirty="0">
+                <a:solidFill>
+                  <a:srgbClr val="FFFFFF"/>
+                </a:solidFill>
+              </a:rPr>
+              <a:t> конструкция</a:t>
+            </a:r>
+          </a:p>
+        </p:txBody>
+      </p:sp>
+      <p:sp>
+        <p:nvSpPr>
+          <p:cNvPr id="8" name="Slide Number">
+            <a:extLst>
+              <a:ext uri="{FF2B5EF4-FFF2-40B4-BE49-F238E27FC236}">
+                <a16:creationId xmlns:a16="http://schemas.microsoft.com/office/drawing/2014/main" id="{9B30055A-616E-4888-ACAF-B4CBF845797F}"/>
+              </a:ext>
+            </a:extLst>
+          </p:cNvPr>
+          <p:cNvSpPr>
+            <a:spLocks noGrp="1"/>
+          </p:cNvSpPr>
+          <p:nvPr>
+            <p:ph type="sldNum" sz="quarter" idx="5"/>
+          </p:nvPr>
+        </p:nvSpPr>
+        <p:spPr>
+          <a:xfrm>
+            <a:off x="11753030" y="6507000"/>
+            <a:ext cx="367414" cy="297000"/>
+          </a:xfrm>
+          <a:prstGeom prst="rect">
+            <a:avLst/>
+          </a:prstGeom>
+        </p:spPr>
+        <p:txBody>
+          <a:bodyPr vert="horz" lIns="91440" tIns="45720" rIns="91440" bIns="45720" rtlCol="0" anchor="b"/>
+          <a:lstStyle>
+            <a:lvl1pPr algn="r">
+              <a:defRPr sz="1000"/>
+            </a:lvl1pPr>
+          </a:lstStyle>
+          <a:p>
+            <a:fld id="{2BF067CD-8E6B-4360-9AA8-C5DF2A48A6D1}" type="slidenum">
+              <a:rPr lang="en-US" noProof="0" smtClean="0"/>
+              <a:pPr/>
+              <a:t>33</a:t>
+            </a:fld>
+            <a:endParaRPr lang="en-US" noProof="0" dirty="0"/>
+          </a:p>
+        </p:txBody>
+      </p:sp>
+    </p:spTree>
+    <p:extLst>
+      <p:ext uri="{BB962C8B-B14F-4D97-AF65-F5344CB8AC3E}">
+        <p14:creationId xmlns:p14="http://schemas.microsoft.com/office/powerpoint/2010/main" val="2170557760"/>
+      </p:ext>
+    </p:extLst>
+  </p:cSld>
+  <p:clrMapOvr>
+    <a:masterClrMapping/>
+  </p:clrMapOvr>
+  <mc:AlternateContent xmlns:mc="http://schemas.openxmlformats.org/markup-compatibility/2006" xmlns:p14="http://schemas.microsoft.com/office/powerpoint/2010/main">
+    <mc:Choice Requires="p14">
+      <p:transition p14:dur="0"/>
+    </mc:Choice>
+    <mc:Fallback xmlns="">
+      <p:transition/>
+    </mc:Fallback>
+  </mc:AlternateContent>
+  <p:timing>
+    <p:tnLst>
+      <p:par>
+        <p:cTn id="1" dur="indefinite" restart="never" nodeType="tmRoot">
+          <p:childTnLst>
+            <p:seq concurrent="1" nextAc="seek">
+              <p:cTn id="2" dur="indefinite" nodeType="mainSeq">
+                <p:childTnLst>
+                  <p:par>
+                    <p:cTn id="3" fill="hold">
+                      <p:stCondLst>
+                        <p:cond delay="indefinite"/>
+                      </p:stCondLst>
+                      <p:childTnLst>
+                        <p:par>
+                          <p:cTn id="4" fill="hold">
+                            <p:stCondLst>
+                              <p:cond delay="0"/>
+                            </p:stCondLst>
+                            <p:childTnLst>
+                              <p:par>
+                                <p:cTn id="5" presetID="1" presetClass="entr" presetSubtype="0" fill="hold" nodeType="clickEffect">
+                                  <p:stCondLst>
+                                    <p:cond delay="0"/>
+                                  </p:stCondLst>
+                                  <p:childTnLst>
+                                    <p:set>
+                                      <p:cBhvr>
+                                        <p:cTn id="6" dur="1" fill="hold">
+                                          <p:stCondLst>
+                                            <p:cond delay="0"/>
+                                          </p:stCondLst>
+                                        </p:cTn>
+                                        <p:tgtEl>
+                                          <p:spTgt spid="14">
+                                            <p:txEl>
+                                              <p:pRg st="3" end="3"/>
+                                            </p:txEl>
+                                          </p:spTgt>
+                                        </p:tgtEl>
+                                        <p:attrNameLst>
+                                          <p:attrName>style.visibility</p:attrName>
+                                        </p:attrNameLst>
+                                      </p:cBhvr>
+                                      <p:to>
+                                        <p:strVal val="visible"/>
+                                      </p:to>
+                                    </p:set>
+                                  </p:childTnLst>
+                                </p:cTn>
+                              </p:par>
+                            </p:childTnLst>
+                          </p:cTn>
+                        </p:par>
+                      </p:childTnLst>
+                    </p:cTn>
+                  </p:par>
+                  <p:par>
+                    <p:cTn id="7" fill="hold">
+                      <p:stCondLst>
+                        <p:cond delay="indefinite"/>
+                      </p:stCondLst>
+                      <p:childTnLst>
+                        <p:par>
+                          <p:cTn id="8" fill="hold">
+                            <p:stCondLst>
+                              <p:cond delay="0"/>
+                            </p:stCondLst>
+                            <p:childTnLst>
+                              <p:par>
+                                <p:cTn id="9" presetID="1" presetClass="entr" presetSubtype="0" fill="hold" nodeType="clickEffect">
+                                  <p:stCondLst>
+                                    <p:cond delay="0"/>
+                                  </p:stCondLst>
+                                  <p:childTnLst>
+                                    <p:set>
+                                      <p:cBhvr>
+                                        <p:cTn id="10" dur="1" fill="hold">
+                                          <p:stCondLst>
+                                            <p:cond delay="0"/>
+                                          </p:stCondLst>
+                                        </p:cTn>
+                                        <p:tgtEl>
+                                          <p:spTgt spid="14">
+                                            <p:txEl>
+                                              <p:pRg st="4" end="4"/>
+                                            </p:txEl>
+                                          </p:spTgt>
+                                        </p:tgtEl>
+                                        <p:attrNameLst>
+                                          <p:attrName>style.visibility</p:attrName>
+                                        </p:attrNameLst>
+                                      </p:cBhvr>
+                                      <p:to>
+                                        <p:strVal val="visible"/>
+                                      </p:to>
+                                    </p:set>
+                                  </p:childTnLst>
+                                </p:cTn>
+                              </p:par>
+                              <p:par>
+                                <p:cTn id="11" presetID="1" presetClass="entr" presetSubtype="0" fill="hold" nodeType="withEffect">
+                                  <p:stCondLst>
+                                    <p:cond delay="0"/>
+                                  </p:stCondLst>
+                                  <p:childTnLst>
+                                    <p:set>
+                                      <p:cBhvr>
+                                        <p:cTn id="12" dur="1" fill="hold">
+                                          <p:stCondLst>
+                                            <p:cond delay="0"/>
+                                          </p:stCondLst>
+                                        </p:cTn>
+                                        <p:tgtEl>
+                                          <p:spTgt spid="14">
+                                            <p:txEl>
+                                              <p:pRg st="5" end="5"/>
+                                            </p:txEl>
+                                          </p:spTgt>
+                                        </p:tgtEl>
+                                        <p:attrNameLst>
+                                          <p:attrName>style.visibility</p:attrName>
+                                        </p:attrNameLst>
+                                      </p:cBhvr>
+                                      <p:to>
+                                        <p:strVal val="visible"/>
+                                      </p:to>
+                                    </p:set>
+                                  </p:childTnLst>
+                                </p:cTn>
+                              </p:par>
+                              <p:par>
+                                <p:cTn id="13" presetID="1" presetClass="entr" presetSubtype="0" fill="hold" nodeType="withEffect">
+                                  <p:stCondLst>
+                                    <p:cond delay="0"/>
+                                  </p:stCondLst>
+                                  <p:childTnLst>
+                                    <p:set>
+                                      <p:cBhvr>
+                                        <p:cTn id="14" dur="1" fill="hold">
+                                          <p:stCondLst>
+                                            <p:cond delay="0"/>
+                                          </p:stCondLst>
+                                        </p:cTn>
+                                        <p:tgtEl>
+                                          <p:spTgt spid="14">
+                                            <p:txEl>
+                                              <p:pRg st="6" end="6"/>
+                                            </p:txEl>
+                                          </p:spTgt>
+                                        </p:tgtEl>
+                                        <p:attrNameLst>
+                                          <p:attrName>style.visibility</p:attrName>
+                                        </p:attrNameLst>
+                                      </p:cBhvr>
+                                      <p:to>
+                                        <p:strVal val="visible"/>
+                                      </p:to>
+                                    </p:set>
+                                  </p:childTnLst>
+                                </p:cTn>
+                              </p:par>
+                              <p:par>
+                                <p:cTn id="15" presetID="1" presetClass="entr" presetSubtype="0" fill="hold" nodeType="withEffect">
+                                  <p:stCondLst>
+                                    <p:cond delay="0"/>
+                                  </p:stCondLst>
+                                  <p:childTnLst>
+                                    <p:set>
+                                      <p:cBhvr>
+                                        <p:cTn id="16" dur="1" fill="hold">
+                                          <p:stCondLst>
+                                            <p:cond delay="0"/>
+                                          </p:stCondLst>
+                                        </p:cTn>
+                                        <p:tgtEl>
+                                          <p:spTgt spid="14">
+                                            <p:txEl>
+                                              <p:pRg st="7" end="7"/>
+                                            </p:txEl>
+                                          </p:spTgt>
+                                        </p:tgtEl>
+                                        <p:attrNameLst>
+                                          <p:attrName>style.visibility</p:attrName>
+                                        </p:attrNameLst>
+                                      </p:cBhvr>
+                                      <p:to>
+                                        <p:strVal val="visible"/>
+                                      </p:to>
+                                    </p:set>
+                                  </p:childTnLst>
+                                </p:cTn>
+                              </p:par>
+                            </p:childTnLst>
+                          </p:cTn>
+                        </p:par>
+                      </p:childTnLst>
+                    </p:cTn>
+                  </p:par>
+                  <p:par>
+                    <p:cTn id="17" fill="hold">
+                      <p:stCondLst>
+                        <p:cond delay="indefinite"/>
+                      </p:stCondLst>
+                      <p:childTnLst>
+                        <p:par>
+                          <p:cTn id="18" fill="hold">
+                            <p:stCondLst>
+                              <p:cond delay="0"/>
+                            </p:stCondLst>
+                            <p:childTnLst>
+                              <p:par>
+                                <p:cTn id="19" presetID="1" presetClass="entr" presetSubtype="0" fill="hold" grpId="0" nodeType="clickEffect">
+                                  <p:stCondLst>
+                                    <p:cond delay="0"/>
+                                  </p:stCondLst>
+                                  <p:childTnLst>
+                                    <p:set>
+                                      <p:cBhvr>
+                                        <p:cTn id="20" dur="1" fill="hold">
+                                          <p:stCondLst>
+                                            <p:cond delay="0"/>
+                                          </p:stCondLst>
+                                        </p:cTn>
+                                        <p:tgtEl>
+                                          <p:spTgt spid="15"/>
+                                        </p:tgtEl>
+                                        <p:attrNameLst>
+                                          <p:attrName>style.visibility</p:attrName>
+                                        </p:attrNameLst>
+                                      </p:cBhvr>
+                                      <p:to>
+                                        <p:strVal val="visible"/>
+                                      </p:to>
+                                    </p:set>
+                                  </p:childTnLst>
+                                </p:cTn>
+                              </p:par>
+                              <p:par>
+                                <p:cTn id="21" presetID="1" presetClass="entr" presetSubtype="0" fill="hold" grpId="0" nodeType="withEffect">
+                                  <p:stCondLst>
+                                    <p:cond delay="0"/>
+                                  </p:stCondLst>
+                                  <p:childTnLst>
+                                    <p:set>
+                                      <p:cBhvr>
+                                        <p:cTn id="22" dur="1" fill="hold">
+                                          <p:stCondLst>
+                                            <p:cond delay="0"/>
+                                          </p:stCondLst>
+                                        </p:cTn>
+                                        <p:tgtEl>
+                                          <p:spTgt spid="16"/>
+                                        </p:tgtEl>
+                                        <p:attrNameLst>
+                                          <p:attrName>style.visibility</p:attrName>
+                                        </p:attrNameLst>
+                                      </p:cBhvr>
+                                      <p:to>
+                                        <p:strVal val="visible"/>
+                                      </p:to>
+                                    </p:set>
+                                  </p:childTnLst>
+                                </p:cTn>
+                              </p:par>
+                            </p:childTnLst>
+                          </p:cTn>
+                        </p:par>
+                      </p:childTnLst>
+                    </p:cTn>
+                  </p:par>
+                </p:childTnLst>
+              </p:cTn>
+              <p:prevCondLst>
+                <p:cond evt="onPrev" delay="0">
+                  <p:tgtEl>
+                    <p:sldTgt/>
+                  </p:tgtEl>
+                </p:cond>
+              </p:prevCondLst>
+              <p:nextCondLst>
+                <p:cond evt="onNext" delay="0">
+                  <p:tgtEl>
+                    <p:sldTgt/>
+                  </p:tgtEl>
+                </p:cond>
+              </p:nextCondLst>
+            </p:seq>
+          </p:childTnLst>
+        </p:cTn>
+      </p:par>
+    </p:tnLst>
+    <p:bldLst>
+      <p:bldP spid="15" grpId="0" animBg="1"/>
+      <p:bldP spid="16" grpId="0" animBg="1"/>
+    </p:bldLst>
+  </p:timing>
+</p:sld>
+</file>
+
+<file path=ppt/slides/slide34.xml><?xml version="1.0" encoding="utf-8"?>
+<p:sld xmlns:a="http://schemas.openxmlformats.org/drawingml/2006/main" xmlns:r="http://schemas.openxmlformats.org/officeDocument/2006/relationships" xmlns:p="http://schemas.openxmlformats.org/presentationml/2006/main">
+  <p:cSld>
+    <p:spTree>
+      <p:nvGrpSpPr>
+        <p:cNvPr id="1" name=""/>
+        <p:cNvGrpSpPr/>
+        <p:nvPr/>
+      </p:nvGrpSpPr>
+      <p:grpSpPr>
+        <a:xfrm>
+          <a:off x="0" y="0"/>
+          <a:ext cx="0" cy="0"/>
+          <a:chOff x="0" y="0"/>
+          <a:chExt cx="0" cy="0"/>
+        </a:xfrm>
+      </p:grpSpPr>
       <p:sp>
         <p:nvSpPr>
           <p:cNvPr id="14" name="Text Placeholder 4">
@@ -31327,8 +32662,8 @@
         </p:nvSpPr>
         <p:spPr>
           <a:xfrm>
-            <a:off x="765983" y="1626884"/>
-            <a:ext cx="11053929" cy="4834572"/>
+            <a:off x="772665" y="1640302"/>
+            <a:ext cx="11053929" cy="4804768"/>
           </a:xfrm>
           <a:prstGeom prst="rect">
             <a:avLst/>
@@ -31513,8 +32848,45 @@
                   <a:schemeClr val="bg2"/>
                 </a:solidFill>
               </a:rPr>
-              <a:t>Логически изрази и проверки</a:t>
-            </a:r>
+              <a:t>Логически изрази и проверки:</a:t>
+            </a:r>
+            <a:endParaRPr lang="en-US" sz="3400" dirty="0">
+              <a:solidFill>
+                <a:schemeClr val="bg2"/>
+              </a:solidFill>
+            </a:endParaRPr>
+          </a:p>
+          <a:p>
+            <a:pPr lvl="1" latinLnBrk="0"/>
+            <a:r>
+              <a:rPr lang="en-US" sz="3200" dirty="0">
+                <a:solidFill>
+                  <a:schemeClr val="bg2"/>
+                </a:solidFill>
+              </a:rPr>
+              <a:t>a</a:t>
+            </a:r>
+            <a:r>
+              <a:rPr lang="bg-BG" sz="3200" dirty="0">
+                <a:solidFill>
+                  <a:schemeClr val="bg2"/>
+                </a:solidFill>
+              </a:rPr>
+              <a:t> &lt; </a:t>
+            </a:r>
+            <a:r>
+              <a:rPr lang="en-US" sz="3200" dirty="0">
+                <a:solidFill>
+                  <a:schemeClr val="bg2"/>
+                </a:solidFill>
+              </a:rPr>
+              <a:t>b;     a == 5;      a &gt;= b</a:t>
+            </a:r>
+            <a:endParaRPr lang="bg-BG" sz="3200" dirty="0">
+              <a:solidFill>
+                <a:schemeClr val="bg2"/>
+              </a:solidFill>
+            </a:endParaRPr>
           </a:p>
           <a:p>
             <a:pPr latinLnBrk="0"/>
@@ -31524,7 +32896,7 @@
                   <a:schemeClr val="bg2"/>
                 </a:solidFill>
               </a:rPr>
-              <a:t>Конструкции за проверка на условие –</a:t>
+              <a:t>Конструкции за проверка на условие в </a:t>
             </a:r>
             <a:r>
               <a:rPr lang="en-US" sz="3400" dirty="0">
@@ -31532,10 +32904,17 @@
                   <a:schemeClr val="bg2"/>
                 </a:solidFill>
               </a:rPr>
-              <a:t> </a:t>
-            </a:r>
-            <a:r>
-              <a:rPr lang="en-US" sz="3400" b="1" dirty="0">
+              <a:t>C#:</a:t>
+            </a:r>
+          </a:p>
+          <a:p>
+            <a:pPr lvl="1" latinLnBrk="0">
+              <a:buClr>
+                <a:schemeClr val="bg2"/>
+              </a:buClr>
+            </a:pPr>
+            <a:r>
+              <a:rPr lang="en-US" sz="3200" b="1" dirty="0">
                 <a:solidFill>
                   <a:schemeClr val="bg1">
                     <a:lumMod val="60000"/>
@@ -31547,7 +32926,7 @@
               <a:t>if</a:t>
             </a:r>
             <a:r>
-              <a:rPr lang="en-US" sz="3400" dirty="0">
+              <a:rPr lang="en-US" sz="3200" dirty="0">
                 <a:solidFill>
                   <a:schemeClr val="bg2"/>
                 </a:solidFill>
@@ -31555,7 +32934,7 @@
               <a:t> </a:t>
             </a:r>
             <a:r>
-              <a:rPr lang="bg-BG" sz="3400" dirty="0">
+              <a:rPr lang="bg-BG" sz="3200" dirty="0">
                 <a:solidFill>
                   <a:schemeClr val="bg2"/>
                 </a:solidFill>
@@ -31563,7 +32942,7 @@
               <a:t>и </a:t>
             </a:r>
             <a:r>
-              <a:rPr lang="en-US" sz="3400" b="1" dirty="0">
+              <a:rPr lang="en-US" sz="3200" b="1" dirty="0">
                 <a:solidFill>
                   <a:schemeClr val="bg1">
                     <a:lumMod val="60000"/>
@@ -31573,6 +32952,70 @@
                 <a:latin typeface="Consolas" pitchFamily="49" charset="0"/>
               </a:rPr>
               <a:t>if-else</a:t>
+            </a:r>
+            <a:endParaRPr lang="bg-BG" sz="3200" b="1" dirty="0">
+              <a:solidFill>
+                <a:schemeClr val="bg1">
+                  <a:lumMod val="60000"/>
+                  <a:lumOff val="40000"/>
+                </a:schemeClr>
+              </a:solidFill>
+              <a:latin typeface="Consolas" pitchFamily="49" charset="0"/>
+            </a:endParaRPr>
+          </a:p>
+          <a:p>
+            <a:pPr latinLnBrk="0"/>
+            <a:r>
+              <a:rPr lang="bg-BG" sz="3400" dirty="0">
+                <a:solidFill>
+                  <a:schemeClr val="bg2"/>
+                </a:solidFill>
+              </a:rPr>
+              <a:t>Серии от проверки</a:t>
+            </a:r>
+            <a:r>
+              <a:rPr lang="en-US" sz="3400" dirty="0">
+                <a:solidFill>
+                  <a:schemeClr val="bg2"/>
+                </a:solidFill>
+              </a:rPr>
+              <a:t>: </a:t>
+            </a:r>
+            <a:r>
+              <a:rPr lang="en-US" sz="3400" b="1" dirty="0">
+                <a:solidFill>
+                  <a:schemeClr val="bg1">
+                    <a:lumMod val="60000"/>
+                    <a:lumOff val="40000"/>
+                  </a:schemeClr>
+                </a:solidFill>
+                <a:latin typeface="Consolas" pitchFamily="49" charset="0"/>
+              </a:rPr>
+              <a:t>else</a:t>
+            </a:r>
+            <a:r>
+              <a:rPr lang="bg-BG" sz="3400" b="1" dirty="0">
+                <a:solidFill>
+                  <a:schemeClr val="bg1">
+                    <a:lumMod val="60000"/>
+                    <a:lumOff val="40000"/>
+                  </a:schemeClr>
+                </a:solidFill>
+                <a:latin typeface="Consolas" pitchFamily="49" charset="0"/>
+              </a:rPr>
+              <a:t> </a:t>
+            </a:r>
+            <a:r>
+              <a:rPr lang="en-US" sz="3400" b="1" dirty="0">
+                <a:solidFill>
+                  <a:schemeClr val="bg1">
+                    <a:lumMod val="60000"/>
+                    <a:lumOff val="40000"/>
+                  </a:schemeClr>
+                </a:solidFill>
+                <a:latin typeface="Consolas" pitchFamily="49" charset="0"/>
+              </a:rPr>
+              <a:t>if</a:t>
             </a:r>
             <a:endParaRPr lang="bg-BG" sz="3400" b="1" dirty="0">
               <a:solidFill>
@@ -31592,15 +33035,7 @@
                   <a:schemeClr val="bg2"/>
                 </a:solidFill>
               </a:rPr>
-              <a:t>Серии от проверки -</a:t>
-            </a:r>
-            <a:r>
-              <a:rPr lang="en-US" sz="3400" dirty="0">
-                <a:solidFill>
-                  <a:schemeClr val="bg2"/>
-                </a:solidFill>
-              </a:rPr>
-              <a:t> </a:t>
+              <a:t>Условната конструкция </a:t>
             </a:r>
             <a:r>
               <a:rPr lang="en-US" sz="3400" b="1" dirty="0">
@@ -31610,65 +33045,44 @@
                     <a:lumOff val="40000"/>
                   </a:schemeClr>
                 </a:solidFill>
-                <a:latin typeface="Consolas" pitchFamily="49" charset="0"/>
-              </a:rPr>
-              <a:t>else</a:t>
-            </a:r>
-            <a:r>
-              <a:rPr lang="bg-BG" sz="3400" b="1" dirty="0">
+                <a:latin typeface="Consolas" panose="020B0609020204030204" pitchFamily="49" charset="0"/>
+              </a:rPr>
+              <a:t>switch-case</a:t>
+            </a:r>
+          </a:p>
+          <a:p>
+            <a:pPr latinLnBrk="0">
+              <a:buClr>
+                <a:schemeClr val="bg2"/>
+              </a:buClr>
+            </a:pPr>
+            <a:r>
+              <a:rPr lang="en-US" sz="3400" b="1" dirty="0">
                 <a:solidFill>
                   <a:schemeClr val="bg1">
                     <a:lumMod val="60000"/>
                     <a:lumOff val="40000"/>
                   </a:schemeClr>
                 </a:solidFill>
-                <a:latin typeface="Consolas" pitchFamily="49" charset="0"/>
+                <a:latin typeface="Consolas" panose="020B0609020204030204" pitchFamily="49" charset="0"/>
+              </a:rPr>
+              <a:t>if-else</a:t>
+            </a:r>
+            <a:r>
+              <a:rPr lang="en-US" sz="3400" dirty="0">
+                <a:solidFill>
+                  <a:schemeClr val="bg2"/>
+                </a:solidFill>
               </a:rPr>
               <a:t> </a:t>
             </a:r>
             <a:r>
-              <a:rPr lang="en-US" sz="3400" b="1" dirty="0">
-                <a:solidFill>
-                  <a:schemeClr val="bg1">
-                    <a:lumMod val="60000"/>
-                    <a:lumOff val="40000"/>
-                  </a:schemeClr>
-                </a:solidFill>
-                <a:latin typeface="Consolas" pitchFamily="49" charset="0"/>
-              </a:rPr>
-              <a:t>if</a:t>
-            </a:r>
-            <a:endParaRPr lang="bg-BG" sz="3400" b="1" dirty="0">
-              <a:solidFill>
-                <a:schemeClr val="bg1">
-                  <a:lumMod val="60000"/>
-                  <a:lumOff val="40000"/>
-                </a:schemeClr>
-              </a:solidFill>
-              <a:latin typeface="Consolas" pitchFamily="49" charset="0"/>
-            </a:endParaRPr>
-          </a:p>
-          <a:p>
-            <a:pPr latinLnBrk="0"/>
-            <a:r>
               <a:rPr lang="bg-BG" sz="3400" dirty="0">
                 <a:solidFill>
                   <a:schemeClr val="bg2"/>
                 </a:solidFill>
               </a:rPr>
-              <a:t>Условната конструкция </a:t>
-            </a:r>
-            <a:r>
-              <a:rPr lang="en-US" sz="3400" b="1" dirty="0">
-                <a:solidFill>
-                  <a:schemeClr val="bg1">
-                    <a:lumMod val="60000"/>
-                    <a:lumOff val="40000"/>
-                  </a:schemeClr>
-                </a:solidFill>
-                <a:latin typeface="Consolas" panose="020B0609020204030204" pitchFamily="49" charset="0"/>
-              </a:rPr>
-              <a:t>switch-case</a:t>
+              <a:t>конструкциите могат да се влагат</a:t>
             </a:r>
             <a:endParaRPr lang="bg-BG" sz="3400" b="1" dirty="0">
               <a:solidFill>
@@ -31718,7 +33132,7 @@
             <a:fld id="{2BF067CD-8E6B-4360-9AA8-C5DF2A48A6D1}" type="slidenum">
               <a:rPr lang="en-US" noProof="0" smtClean="0"/>
               <a:pPr/>
-              <a:t>32</a:t>
+              <a:t>34</a:t>
             </a:fld>
             <a:endParaRPr lang="en-US" noProof="0" dirty="0"/>
           </a:p>
@@ -31778,7 +33192,38 @@
                                         <p:tgtEl>
                                           <p:spTgt spid="15">
                                             <p:txEl>
-                                              <p:pRg st="1" end="1"/>
+                                              <p:pRg st="2" end="2"/>
+                                            </p:txEl>
+                                          </p:spTgt>
+                                        </p:tgtEl>
+                                        <p:attrNameLst>
+                                          <p:attrName>style.visibility</p:attrName>
+                                        </p:attrNameLst>
+                                      </p:cBhvr>
+                                      <p:to>
+                                        <p:strVal val="visible"/>
+                                      </p:to>
+                                    </p:set>
+                                  </p:childTnLst>
+                                </p:cTn>
+                              </p:par>
+                              <p:par>
+                                <p:cTn id="7" presetID="1" presetClass="entr" presetSubtype="0" fill="hold" nodeType="withEffect">
+                                  <p:stCondLst>
+                                    <p:cond delay="0"/>
+                                  </p:stCondLst>
+                                  <p:childTnLst>
+                                    <p:set>
+                                      <p:cBhvr>
+                                        <p:cTn id="8" dur="1" fill="hold">
+                                          <p:stCondLst>
+                                            <p:cond delay="0"/>
+                                          </p:stCondLst>
+                                        </p:cTn>
+                                        <p:tgtEl>
+                                          <p:spTgt spid="15">
+                                            <p:txEl>
+                                              <p:pRg st="3" end="3"/>
                                             </p:txEl>
                                           </p:spTgt>
                                         </p:tgtEl>
@@ -31800,26 +33245,26 @@
                     </p:cTn>
                   </p:par>
                   <p:par>
-                    <p:cTn id="7" fill="hold">
+                    <p:cTn id="9" fill="hold">
                       <p:stCondLst>
                         <p:cond delay="indefinite"/>
                       </p:stCondLst>
                       <p:childTnLst>
                         <p:par>
-                          <p:cTn id="8" fill="hold">
+                          <p:cTn id="10" fill="hold">
                             <p:stCondLst>
                               <p:cond delay="0"/>
                             </p:stCondLst>
                             <p:childTnLst>
                               <p:par>
-                                <p:cTn id="9" presetID="1" presetClass="entr" presetSubtype="0" fill="hold" nodeType="clickEffect">
+                                <p:cTn id="11" presetID="1" presetClass="entr" presetSubtype="0" fill="hold" nodeType="clickEffect">
                                   <p:stCondLst>
                                     <p:cond delay="0"/>
                                   </p:stCondLst>
                                   <p:childTnLst>
                                     <p:set>
                                       <p:cBhvr>
-                                        <p:cTn id="10" dur="1" fill="hold">
+                                        <p:cTn id="12" dur="1" fill="hold">
                                           <p:stCondLst>
                                             <p:cond delay="0"/>
                                           </p:stCondLst>
@@ -31827,7 +33272,7 @@
                                         <p:tgtEl>
                                           <p:spTgt spid="15">
                                             <p:txEl>
-                                              <p:pRg st="2" end="2"/>
+                                              <p:pRg st="4" end="4"/>
                                             </p:txEl>
                                           </p:spTgt>
                                         </p:tgtEl>
@@ -31849,26 +33294,26 @@
                     </p:cTn>
                   </p:par>
                   <p:par>
-                    <p:cTn id="11" fill="hold">
+                    <p:cTn id="13" fill="hold">
                       <p:stCondLst>
                         <p:cond delay="indefinite"/>
                       </p:stCondLst>
                       <p:childTnLst>
                         <p:par>
-                          <p:cTn id="12" fill="hold">
+                          <p:cTn id="14" fill="hold">
                             <p:stCondLst>
                               <p:cond delay="0"/>
                             </p:stCondLst>
                             <p:childTnLst>
                               <p:par>
-                                <p:cTn id="13" presetID="1" presetClass="entr" presetSubtype="0" fill="hold" nodeType="clickEffect">
+                                <p:cTn id="15" presetID="1" presetClass="entr" presetSubtype="0" fill="hold" nodeType="clickEffect">
                                   <p:stCondLst>
                                     <p:cond delay="0"/>
                                   </p:stCondLst>
                                   <p:childTnLst>
                                     <p:set>
                                       <p:cBhvr>
-                                        <p:cTn id="14" dur="1" fill="hold">
+                                        <p:cTn id="16" dur="1" fill="hold">
                                           <p:stCondLst>
                                             <p:cond delay="0"/>
                                           </p:stCondLst>
@@ -31876,7 +33321,56 @@
                                         <p:tgtEl>
                                           <p:spTgt spid="15">
                                             <p:txEl>
-                                              <p:pRg st="3" end="3"/>
+                                              <p:pRg st="5" end="5"/>
+                                            </p:txEl>
+                                          </p:spTgt>
+                                        </p:tgtEl>
+                                        <p:attrNameLst>
+                                          <p:attrName>style.visibility</p:attrName>
+                                        </p:attrNameLst>
+                                      </p:cBhvr>
+                                      <p:to>
+                                        <p:strVal val="visible"/>
+                                      </p:to>
+                                    </p:set>
+                                  </p:childTnLst>
+                                </p:cTn>
+                              </p:par>
+                            </p:childTnLst>
+                          </p:cTn>
+                        </p:par>
+                      </p:childTnLst>
+                    </p:cTn>
+                  </p:par>
+                  <p:par>
+                    <p:cTn id="17" fill="hold">
+                      <p:stCondLst>
+                        <p:cond delay="indefinite"/>
+                      </p:stCondLst>
+                      <p:childTnLst>
+                        <p:par>
+                          <p:cTn id="18" fill="hold">
+                            <p:stCondLst>
+                              <p:cond delay="0"/>
+                            </p:stCondLst>
+                            <p:childTnLst>
+                              <p:par>
+                                <p:cTn id="19" presetID="1" presetClass="entr" presetSubtype="0" fill="hold" nodeType="clickEffect">
+                                  <p:stCondLst>
+                                    <p:cond delay="0"/>
+                                  </p:stCondLst>
+                                  <p:childTnLst>
+                                    <p:set>
+                                      <p:cBhvr>
+                                        <p:cTn id="20" dur="1" fill="hold">
+                                          <p:stCondLst>
+                                            <p:cond delay="0"/>
+                                          </p:stCondLst>
+                                        </p:cTn>
+                                        <p:tgtEl>
+                                          <p:spTgt spid="15">
+                                            <p:txEl>
+                                              <p:pRg st="6" end="6"/>
                                             </p:txEl>
                                           </p:spTgt>
                                         </p:tgtEl>
@@ -31922,7 +33416,7 @@
 </p:sld>
 </file>
 
-<file path=ppt/slides/slide33.xml><?xml version="1.0" encoding="utf-8"?>
+<file path=ppt/slides/slide35.xml><?xml version="1.0" encoding="utf-8"?>
 <p:sld xmlns:a="http://schemas.openxmlformats.org/drawingml/2006/main" xmlns:r="http://schemas.openxmlformats.org/officeDocument/2006/relationships" xmlns:p="http://schemas.openxmlformats.org/presentationml/2006/main">
   <p:cSld>
     <p:spTree>
@@ -32001,7 +33495,7 @@
 </p:sld>
 </file>
 
-<file path=ppt/slides/slide34.xml><?xml version="1.0" encoding="utf-8"?>
+<file path=ppt/slides/slide36.xml><?xml version="1.0" encoding="utf-8"?>
 <p:sld xmlns:a="http://schemas.openxmlformats.org/drawingml/2006/main" xmlns:r="http://schemas.openxmlformats.org/officeDocument/2006/relationships" xmlns:p="http://schemas.openxmlformats.org/presentationml/2006/main">
   <p:cSld>
     <p:spTree>
@@ -32265,7 +33759,7 @@
             <a:fld id="{2BF067CD-8E6B-4360-9AA8-C5DF2A48A6D1}" type="slidenum">
               <a:rPr lang="en-US" noProof="0" smtClean="0"/>
               <a:pPr/>
-              <a:t>34</a:t>
+              <a:t>36</a:t>
             </a:fld>
             <a:endParaRPr lang="en-US" noProof="0" dirty="0"/>
           </a:p>
@@ -32292,7 +33786,7 @@
 </p:sld>
 </file>
 
-<file path=ppt/slides/slide35.xml><?xml version="1.0" encoding="utf-8"?>
+<file path=ppt/slides/slide37.xml><?xml version="1.0" encoding="utf-8"?>
 <p:sld xmlns:a="http://schemas.openxmlformats.org/drawingml/2006/main" xmlns:r="http://schemas.openxmlformats.org/officeDocument/2006/relationships" xmlns:p="http://schemas.openxmlformats.org/presentationml/2006/main">
   <p:cSld>
     <p:spTree>
@@ -32598,7 +34092,7 @@
             <a:fld id="{2BF067CD-8E6B-4360-9AA8-C5DF2A48A6D1}" type="slidenum">
               <a:rPr lang="en-US" smtClean="0"/>
               <a:pPr/>
-              <a:t>35</a:t>
+              <a:t>37</a:t>
             </a:fld>
             <a:endParaRPr lang="en-US" dirty="0"/>
           </a:p>
@@ -35276,6 +36770,752 @@
       </p:pic>
       <p:sp>
         <p:nvSpPr>
+          <p:cNvPr id="22" name="Slide Number">
+            <a:extLst>
+              <a:ext uri="{FF2B5EF4-FFF2-40B4-BE49-F238E27FC236}">
+                <a16:creationId xmlns:a16="http://schemas.microsoft.com/office/drawing/2014/main" id="{6A5D077C-E5AF-4C1D-A017-9B9356988C8B}"/>
+              </a:ext>
+            </a:extLst>
+          </p:cNvPr>
+          <p:cNvSpPr txBox="1">
+            <a:spLocks/>
+          </p:cNvSpPr>
+          <p:nvPr/>
+        </p:nvSpPr>
+        <p:spPr>
+          <a:xfrm>
+            <a:off x="11753030" y="6507000"/>
+            <a:ext cx="367414" cy="297000"/>
+          </a:xfrm>
+          <a:prstGeom prst="rect">
+            <a:avLst/>
+          </a:prstGeom>
+        </p:spPr>
+        <p:txBody>
+          <a:bodyPr vert="horz" lIns="91440" tIns="45720" rIns="91440" bIns="45720" rtlCol="0" anchor="b"/>
+          <a:lstStyle>
+            <a:defPPr>
+              <a:defRPr lang="en-US"/>
+            </a:defPPr>
+            <a:lvl1pPr marL="0" algn="r" defTabSz="914400" rtl="0" eaLnBrk="1" latinLnBrk="0" hangingPunct="1">
+              <a:defRPr sz="1000" kern="1200">
+                <a:solidFill>
+                  <a:schemeClr val="tx1"/>
+                </a:solidFill>
+                <a:latin typeface="+mn-lt"/>
+                <a:ea typeface="+mn-ea"/>
+                <a:cs typeface="+mn-cs"/>
+              </a:defRPr>
+            </a:lvl1pPr>
+            <a:lvl2pPr marL="457200" algn="l" defTabSz="914400" rtl="0" eaLnBrk="1" latinLnBrk="0" hangingPunct="1">
+              <a:defRPr sz="1800" kern="1200">
+                <a:solidFill>
+                  <a:schemeClr val="tx1"/>
+                </a:solidFill>
+                <a:latin typeface="+mn-lt"/>
+                <a:ea typeface="+mn-ea"/>
+                <a:cs typeface="+mn-cs"/>
+              </a:defRPr>
+            </a:lvl2pPr>
+            <a:lvl3pPr marL="914400" algn="l" defTabSz="914400" rtl="0" eaLnBrk="1" latinLnBrk="0" hangingPunct="1">
+              <a:defRPr sz="1800" kern="1200">
+                <a:solidFill>
+                  <a:schemeClr val="tx1"/>
+                </a:solidFill>
+                <a:latin typeface="+mn-lt"/>
+                <a:ea typeface="+mn-ea"/>
+                <a:cs typeface="+mn-cs"/>
+              </a:defRPr>
+            </a:lvl3pPr>
+            <a:lvl4pPr marL="1371600" algn="l" defTabSz="914400" rtl="0" eaLnBrk="1" latinLnBrk="0" hangingPunct="1">
+              <a:defRPr sz="1800" kern="1200">
+                <a:solidFill>
+                  <a:schemeClr val="tx1"/>
+                </a:solidFill>
+                <a:latin typeface="+mn-lt"/>
+                <a:ea typeface="+mn-ea"/>
+                <a:cs typeface="+mn-cs"/>
+              </a:defRPr>
+            </a:lvl4pPr>
+            <a:lvl5pPr marL="1828800" algn="l" defTabSz="914400" rtl="0" eaLnBrk="1" latinLnBrk="0" hangingPunct="1">
+              <a:defRPr sz="1800" kern="1200">
+                <a:solidFill>
+                  <a:schemeClr val="tx1"/>
+                </a:solidFill>
+                <a:latin typeface="+mn-lt"/>
+                <a:ea typeface="+mn-ea"/>
+                <a:cs typeface="+mn-cs"/>
+              </a:defRPr>
+            </a:lvl5pPr>
+            <a:lvl6pPr marL="2286000" algn="l" defTabSz="914400" rtl="0" eaLnBrk="1" latinLnBrk="0" hangingPunct="1">
+              <a:defRPr sz="1800" kern="1200">
+                <a:solidFill>
+                  <a:schemeClr val="tx1"/>
+                </a:solidFill>
+                <a:latin typeface="+mn-lt"/>
+                <a:ea typeface="+mn-ea"/>
+                <a:cs typeface="+mn-cs"/>
+              </a:defRPr>
+            </a:lvl6pPr>
+            <a:lvl7pPr marL="2743200" algn="l" defTabSz="914400" rtl="0" eaLnBrk="1" latinLnBrk="0" hangingPunct="1">
+              <a:defRPr sz="1800" kern="1200">
+                <a:solidFill>
+                  <a:schemeClr val="tx1"/>
+                </a:solidFill>
+                <a:latin typeface="+mn-lt"/>
+                <a:ea typeface="+mn-ea"/>
+                <a:cs typeface="+mn-cs"/>
+              </a:defRPr>
+            </a:lvl7pPr>
+            <a:lvl8pPr marL="3200400" algn="l" defTabSz="914400" rtl="0" eaLnBrk="1" latinLnBrk="0" hangingPunct="1">
+              <a:defRPr sz="1800" kern="1200">
+                <a:solidFill>
+                  <a:schemeClr val="tx1"/>
+                </a:solidFill>
+                <a:latin typeface="+mn-lt"/>
+                <a:ea typeface="+mn-ea"/>
+                <a:cs typeface="+mn-cs"/>
+              </a:defRPr>
+            </a:lvl8pPr>
+            <a:lvl9pPr marL="3657600" algn="l" defTabSz="914400" rtl="0" eaLnBrk="1" latinLnBrk="0" hangingPunct="1">
+              <a:defRPr sz="1800" kern="1200">
+                <a:solidFill>
+                  <a:schemeClr val="tx1"/>
+                </a:solidFill>
+                <a:latin typeface="+mn-lt"/>
+                <a:ea typeface="+mn-ea"/>
+                <a:cs typeface="+mn-cs"/>
+              </a:defRPr>
+            </a:lvl9pPr>
+          </a:lstStyle>
+          <a:p>
+            <a:fld id="{2BF067CD-8E6B-4360-9AA8-C5DF2A48A6D1}" type="slidenum">
+              <a:rPr lang="en-US" smtClean="0"/>
+              <a:pPr/>
+              <a:t>5</a:t>
+            </a:fld>
+            <a:endParaRPr lang="en-US" dirty="0"/>
+          </a:p>
+        </p:txBody>
+      </p:sp>
+      <p:sp>
+        <p:nvSpPr>
+          <p:cNvPr id="23" name="Text Placeholder 7">
+            <a:extLst>
+              <a:ext uri="{FF2B5EF4-FFF2-40B4-BE49-F238E27FC236}">
+                <a16:creationId xmlns:a16="http://schemas.microsoft.com/office/drawing/2014/main" id="{9360419A-F876-43DB-8A13-4F493312E117}"/>
+              </a:ext>
+            </a:extLst>
+          </p:cNvPr>
+          <p:cNvSpPr txBox="1">
+            <a:spLocks/>
+          </p:cNvSpPr>
+          <p:nvPr/>
+        </p:nvSpPr>
+        <p:spPr>
+          <a:xfrm>
+            <a:off x="190353" y="1196124"/>
+            <a:ext cx="11815018" cy="5561125"/>
+          </a:xfrm>
+          <a:prstGeom prst="rect">
+            <a:avLst/>
+          </a:prstGeom>
+        </p:spPr>
+        <p:txBody>
+          <a:bodyPr/>
+          <a:lstStyle>
+            <a:lvl1pPr marL="360363" indent="-360363" algn="l" defTabSz="1218438" rtl="0" eaLnBrk="1" latinLnBrk="0" hangingPunct="1">
+              <a:lnSpc>
+                <a:spcPct val="105000"/>
+              </a:lnSpc>
+              <a:spcBef>
+                <a:spcPts val="600"/>
+              </a:spcBef>
+              <a:spcAft>
+                <a:spcPts val="600"/>
+              </a:spcAft>
+              <a:buFont typeface="Wingdings" panose="05000000000000000000" pitchFamily="2" charset="2"/>
+              <a:buChar char="§"/>
+              <a:defRPr sz="3398" kern="1200">
+                <a:solidFill>
+                  <a:schemeClr val="tx1"/>
+                </a:solidFill>
+                <a:latin typeface="+mn-lt"/>
+                <a:ea typeface="+mn-ea"/>
+                <a:cs typeface="+mn-cs"/>
+              </a:defRPr>
+            </a:lvl1pPr>
+            <a:lvl2pPr marL="803275" indent="-360363" algn="l" defTabSz="1218438" rtl="0" eaLnBrk="1" latinLnBrk="0" hangingPunct="1">
+              <a:lnSpc>
+                <a:spcPct val="105000"/>
+              </a:lnSpc>
+              <a:spcBef>
+                <a:spcPts val="600"/>
+              </a:spcBef>
+              <a:spcAft>
+                <a:spcPts val="600"/>
+              </a:spcAft>
+              <a:buFont typeface="Wingdings" panose="05000000000000000000" pitchFamily="2" charset="2"/>
+              <a:buChar char="§"/>
+              <a:defRPr sz="3198" kern="1200">
+                <a:solidFill>
+                  <a:schemeClr val="tx1"/>
+                </a:solidFill>
+                <a:latin typeface="+mn-lt"/>
+                <a:ea typeface="+mn-ea"/>
+                <a:cs typeface="+mn-cs"/>
+              </a:defRPr>
+            </a:lvl2pPr>
+            <a:lvl3pPr marL="1255713" indent="-360363" algn="l" defTabSz="1218438" rtl="0" eaLnBrk="1" latinLnBrk="0" hangingPunct="1">
+              <a:lnSpc>
+                <a:spcPct val="105000"/>
+              </a:lnSpc>
+              <a:spcBef>
+                <a:spcPts val="600"/>
+              </a:spcBef>
+              <a:spcAft>
+                <a:spcPts val="600"/>
+              </a:spcAft>
+              <a:buFont typeface="Wingdings" panose="05000000000000000000" pitchFamily="2" charset="2"/>
+              <a:buChar char="§"/>
+              <a:defRPr sz="2998" kern="1200">
+                <a:solidFill>
+                  <a:schemeClr val="tx1"/>
+                </a:solidFill>
+                <a:latin typeface="+mn-lt"/>
+                <a:ea typeface="+mn-ea"/>
+                <a:cs typeface="+mn-cs"/>
+              </a:defRPr>
+            </a:lvl3pPr>
+            <a:lvl4pPr marL="1700213" indent="-352425" algn="l" defTabSz="1218438" rtl="0" eaLnBrk="1" latinLnBrk="0" hangingPunct="1">
+              <a:lnSpc>
+                <a:spcPct val="105000"/>
+              </a:lnSpc>
+              <a:spcBef>
+                <a:spcPts val="600"/>
+              </a:spcBef>
+              <a:spcAft>
+                <a:spcPts val="600"/>
+              </a:spcAft>
+              <a:buFont typeface="Wingdings" panose="05000000000000000000" pitchFamily="2" charset="2"/>
+              <a:buChar char="§"/>
+              <a:defRPr sz="2798" kern="1200">
+                <a:solidFill>
+                  <a:schemeClr val="tx1"/>
+                </a:solidFill>
+                <a:latin typeface="+mn-lt"/>
+                <a:ea typeface="+mn-ea"/>
+                <a:cs typeface="+mn-cs"/>
+              </a:defRPr>
+            </a:lvl4pPr>
+            <a:lvl5pPr marL="2058988" indent="-266700" algn="l" defTabSz="1218438" rtl="0" eaLnBrk="1" latinLnBrk="0" hangingPunct="1">
+              <a:lnSpc>
+                <a:spcPct val="105000"/>
+              </a:lnSpc>
+              <a:spcBef>
+                <a:spcPts val="600"/>
+              </a:spcBef>
+              <a:spcAft>
+                <a:spcPts val="600"/>
+              </a:spcAft>
+              <a:buFont typeface="Wingdings" panose="05000000000000000000" pitchFamily="2" charset="2"/>
+              <a:buChar char="§"/>
+              <a:defRPr sz="2598" kern="1200">
+                <a:solidFill>
+                  <a:schemeClr val="tx1"/>
+                </a:solidFill>
+                <a:latin typeface="+mn-lt"/>
+                <a:ea typeface="+mn-ea"/>
+                <a:cs typeface="+mn-cs"/>
+              </a:defRPr>
+            </a:lvl5pPr>
+            <a:lvl6pPr marL="3350704" indent="-304610" algn="l" defTabSz="1218438" rtl="0" eaLnBrk="1" latinLnBrk="1" hangingPunct="1">
+              <a:spcBef>
+                <a:spcPct val="20000"/>
+              </a:spcBef>
+              <a:buFont typeface="Arial" pitchFamily="34" charset="0"/>
+              <a:buChar char="•"/>
+              <a:defRPr sz="2665" kern="1200">
+                <a:solidFill>
+                  <a:schemeClr val="tx1"/>
+                </a:solidFill>
+                <a:latin typeface="+mn-lt"/>
+                <a:ea typeface="+mn-ea"/>
+                <a:cs typeface="+mn-cs"/>
+              </a:defRPr>
+            </a:lvl6pPr>
+            <a:lvl7pPr marL="3959924" indent="-304610" algn="l" defTabSz="1218438" rtl="0" eaLnBrk="1" latinLnBrk="1" hangingPunct="1">
+              <a:spcBef>
+                <a:spcPct val="20000"/>
+              </a:spcBef>
+              <a:buFont typeface="Arial" pitchFamily="34" charset="0"/>
+              <a:buChar char="•"/>
+              <a:defRPr sz="2665" kern="1200">
+                <a:solidFill>
+                  <a:schemeClr val="tx1"/>
+                </a:solidFill>
+                <a:latin typeface="+mn-lt"/>
+                <a:ea typeface="+mn-ea"/>
+                <a:cs typeface="+mn-cs"/>
+              </a:defRPr>
+            </a:lvl7pPr>
+            <a:lvl8pPr marL="4569143" indent="-304610" algn="l" defTabSz="1218438" rtl="0" eaLnBrk="1" latinLnBrk="1" hangingPunct="1">
+              <a:spcBef>
+                <a:spcPct val="20000"/>
+              </a:spcBef>
+              <a:buFont typeface="Arial" pitchFamily="34" charset="0"/>
+              <a:buChar char="•"/>
+              <a:defRPr sz="2665" kern="1200">
+                <a:solidFill>
+                  <a:schemeClr val="tx1"/>
+                </a:solidFill>
+                <a:latin typeface="+mn-lt"/>
+                <a:ea typeface="+mn-ea"/>
+                <a:cs typeface="+mn-cs"/>
+              </a:defRPr>
+            </a:lvl8pPr>
+            <a:lvl9pPr marL="5178362" indent="-304610" algn="l" defTabSz="1218438" rtl="0" eaLnBrk="1" latinLnBrk="1" hangingPunct="1">
+              <a:spcBef>
+                <a:spcPct val="20000"/>
+              </a:spcBef>
+              <a:buFont typeface="Arial" pitchFamily="34" charset="0"/>
+              <a:buChar char="•"/>
+              <a:defRPr sz="2665" kern="1200">
+                <a:solidFill>
+                  <a:schemeClr val="tx1"/>
+                </a:solidFill>
+                <a:latin typeface="+mn-lt"/>
+                <a:ea typeface="+mn-ea"/>
+                <a:cs typeface="+mn-cs"/>
+              </a:defRPr>
+            </a:lvl9pPr>
+          </a:lstStyle>
+          <a:p>
+            <a:pPr marL="457063" indent="-457063"/>
+            <a:r>
+              <a:rPr lang="en-US" sz="3599" dirty="0"/>
+              <a:t>В програмирането </a:t>
+            </a:r>
+            <a:r>
+              <a:rPr lang="bg-BG" sz="3599" dirty="0"/>
+              <a:t>можем</a:t>
+            </a:r>
+            <a:r>
+              <a:rPr lang="en-US" sz="3599" dirty="0"/>
+              <a:t> да сравняваме стойности</a:t>
+            </a:r>
+          </a:p>
+          <a:p>
+            <a:pPr marL="1066099" lvl="1" indent="-457063"/>
+            <a:r>
+              <a:rPr lang="en-US" sz="3399" dirty="0"/>
+              <a:t>Резултатът от логическите изрази е </a:t>
+            </a:r>
+            <a:r>
+              <a:rPr lang="en-US" sz="3399" b="1" dirty="0">
+                <a:solidFill>
+                  <a:schemeClr val="bg1"/>
+                </a:solidFill>
+                <a:latin typeface="Consolas" panose="020B0609020204030204" pitchFamily="49" charset="0"/>
+              </a:rPr>
+              <a:t>true</a:t>
+            </a:r>
+            <a:r>
+              <a:rPr lang="en-US" sz="3399" dirty="0"/>
+              <a:t> или </a:t>
+            </a:r>
+            <a:r>
+              <a:rPr lang="en-US" sz="3399" b="1" dirty="0">
+                <a:solidFill>
+                  <a:schemeClr val="bg1"/>
+                </a:solidFill>
+                <a:latin typeface="Consolas" panose="020B0609020204030204" pitchFamily="49" charset="0"/>
+              </a:rPr>
+              <a:t>false</a:t>
+            </a:r>
+          </a:p>
+        </p:txBody>
+      </p:sp>
+      <p:sp>
+        <p:nvSpPr>
+          <p:cNvPr id="24" name="Text Placeholder 12">
+            <a:extLst>
+              <a:ext uri="{FF2B5EF4-FFF2-40B4-BE49-F238E27FC236}">
+                <a16:creationId xmlns:a16="http://schemas.microsoft.com/office/drawing/2014/main" id="{CFC53F4A-CEC3-48C6-9F8D-330C6736AB37}"/>
+              </a:ext>
+            </a:extLst>
+          </p:cNvPr>
+          <p:cNvSpPr txBox="1">
+            <a:spLocks/>
+          </p:cNvSpPr>
+          <p:nvPr/>
+        </p:nvSpPr>
+        <p:spPr>
+          <a:xfrm>
+            <a:off x="876000" y="2676886"/>
+            <a:ext cx="7214695" cy="3890910"/>
+          </a:xfrm>
+          <a:prstGeom prst="rect">
+            <a:avLst/>
+          </a:prstGeom>
+          <a:solidFill>
+            <a:schemeClr val="accent5">
+              <a:lumMod val="40000"/>
+              <a:lumOff val="60000"/>
+              <a:alpha val="20000"/>
+            </a:schemeClr>
+          </a:solidFill>
+          <a:ln w="12700">
+            <a:solidFill>
+              <a:schemeClr val="tx1">
+                <a:lumMod val="50000"/>
+              </a:schemeClr>
+            </a:solidFill>
+          </a:ln>
+        </p:spPr>
+        <p:txBody>
+          <a:bodyPr vert="horz" wrap="square" lIns="144000" tIns="108000" rIns="144000" bIns="108000" rtlCol="0">
+            <a:spAutoFit/>
+          </a:bodyPr>
+          <a:lstStyle>
+            <a:lvl1pPr marL="360363" indent="-360363" algn="l" defTabSz="1218438" rtl="0" eaLnBrk="1" latinLnBrk="0" hangingPunct="1">
+              <a:lnSpc>
+                <a:spcPct val="110000"/>
+              </a:lnSpc>
+              <a:spcBef>
+                <a:spcPts val="0"/>
+              </a:spcBef>
+              <a:spcAft>
+                <a:spcPts val="0"/>
+              </a:spcAft>
+              <a:buFont typeface="Wingdings" panose="05000000000000000000" pitchFamily="2" charset="2"/>
+              <a:buNone/>
+              <a:defRPr lang="en-US" sz="2800" b="1" kern="1200" smtClean="0">
+                <a:solidFill>
+                  <a:schemeClr val="tx1"/>
+                </a:solidFill>
+                <a:latin typeface="Consolas" pitchFamily="49" charset="0"/>
+                <a:ea typeface="+mn-ea"/>
+                <a:cs typeface="+mn-cs"/>
+              </a:defRPr>
+            </a:lvl1pPr>
+            <a:lvl2pPr marL="803275" indent="-360363" algn="l" defTabSz="1218438" rtl="0" eaLnBrk="1" latinLnBrk="0" hangingPunct="1">
+              <a:lnSpc>
+                <a:spcPct val="105000"/>
+              </a:lnSpc>
+              <a:spcBef>
+                <a:spcPts val="600"/>
+              </a:spcBef>
+              <a:spcAft>
+                <a:spcPts val="600"/>
+              </a:spcAft>
+              <a:buFont typeface="Wingdings" panose="05000000000000000000" pitchFamily="2" charset="2"/>
+              <a:buChar char="§"/>
+              <a:defRPr lang="en-US" sz="3198" kern="1200" smtClean="0">
+                <a:solidFill>
+                  <a:schemeClr val="tx1"/>
+                </a:solidFill>
+                <a:latin typeface="+mn-lt"/>
+                <a:ea typeface="+mn-ea"/>
+                <a:cs typeface="+mn-cs"/>
+              </a:defRPr>
+            </a:lvl2pPr>
+            <a:lvl3pPr marL="1255713" indent="-360363" algn="l" defTabSz="1218438" rtl="0" eaLnBrk="1" latinLnBrk="0" hangingPunct="1">
+              <a:lnSpc>
+                <a:spcPct val="105000"/>
+              </a:lnSpc>
+              <a:spcBef>
+                <a:spcPts val="600"/>
+              </a:spcBef>
+              <a:spcAft>
+                <a:spcPts val="600"/>
+              </a:spcAft>
+              <a:buFont typeface="Wingdings" panose="05000000000000000000" pitchFamily="2" charset="2"/>
+              <a:buChar char="§"/>
+              <a:defRPr lang="en-US" sz="2998" kern="1200" smtClean="0">
+                <a:solidFill>
+                  <a:schemeClr val="tx1"/>
+                </a:solidFill>
+                <a:latin typeface="+mn-lt"/>
+                <a:ea typeface="+mn-ea"/>
+                <a:cs typeface="+mn-cs"/>
+              </a:defRPr>
+            </a:lvl3pPr>
+            <a:lvl4pPr marL="1700213" indent="-352425" algn="l" defTabSz="1218438" rtl="0" eaLnBrk="1" latinLnBrk="0" hangingPunct="1">
+              <a:lnSpc>
+                <a:spcPct val="105000"/>
+              </a:lnSpc>
+              <a:spcBef>
+                <a:spcPts val="600"/>
+              </a:spcBef>
+              <a:spcAft>
+                <a:spcPts val="600"/>
+              </a:spcAft>
+              <a:buFont typeface="Wingdings" panose="05000000000000000000" pitchFamily="2" charset="2"/>
+              <a:buChar char="§"/>
+              <a:defRPr lang="en-US" sz="2798" kern="1200" smtClean="0">
+                <a:solidFill>
+                  <a:schemeClr val="tx1"/>
+                </a:solidFill>
+                <a:latin typeface="+mn-lt"/>
+                <a:ea typeface="+mn-ea"/>
+                <a:cs typeface="+mn-cs"/>
+              </a:defRPr>
+            </a:lvl4pPr>
+            <a:lvl5pPr marL="2058988" indent="-266700" algn="l" defTabSz="1218438" rtl="0" eaLnBrk="1" latinLnBrk="0" hangingPunct="1">
+              <a:lnSpc>
+                <a:spcPct val="105000"/>
+              </a:lnSpc>
+              <a:spcBef>
+                <a:spcPts val="600"/>
+              </a:spcBef>
+              <a:spcAft>
+                <a:spcPts val="600"/>
+              </a:spcAft>
+              <a:buFont typeface="Wingdings" panose="05000000000000000000" pitchFamily="2" charset="2"/>
+              <a:buChar char="§"/>
+              <a:defRPr lang="en-US" sz="2598" kern="1200">
+                <a:solidFill>
+                  <a:schemeClr val="tx1"/>
+                </a:solidFill>
+                <a:latin typeface="+mn-lt"/>
+                <a:ea typeface="+mn-ea"/>
+                <a:cs typeface="+mn-cs"/>
+              </a:defRPr>
+            </a:lvl5pPr>
+            <a:lvl6pPr marL="3350704" indent="-304610" algn="l" defTabSz="1218438" rtl="0" eaLnBrk="1" latinLnBrk="1" hangingPunct="1">
+              <a:spcBef>
+                <a:spcPct val="20000"/>
+              </a:spcBef>
+              <a:buFont typeface="Arial" pitchFamily="34" charset="0"/>
+              <a:buChar char="•"/>
+              <a:defRPr sz="2665" kern="1200">
+                <a:solidFill>
+                  <a:schemeClr val="tx1"/>
+                </a:solidFill>
+                <a:latin typeface="+mn-lt"/>
+                <a:ea typeface="+mn-ea"/>
+                <a:cs typeface="+mn-cs"/>
+              </a:defRPr>
+            </a:lvl6pPr>
+            <a:lvl7pPr marL="3959924" indent="-304610" algn="l" defTabSz="1218438" rtl="0" eaLnBrk="1" latinLnBrk="1" hangingPunct="1">
+              <a:spcBef>
+                <a:spcPct val="20000"/>
+              </a:spcBef>
+              <a:buFont typeface="Arial" pitchFamily="34" charset="0"/>
+              <a:buChar char="•"/>
+              <a:defRPr sz="2665" kern="1200">
+                <a:solidFill>
+                  <a:schemeClr val="tx1"/>
+                </a:solidFill>
+                <a:latin typeface="+mn-lt"/>
+                <a:ea typeface="+mn-ea"/>
+                <a:cs typeface="+mn-cs"/>
+              </a:defRPr>
+            </a:lvl7pPr>
+            <a:lvl8pPr marL="4569143" indent="-304610" algn="l" defTabSz="1218438" rtl="0" eaLnBrk="1" latinLnBrk="1" hangingPunct="1">
+              <a:spcBef>
+                <a:spcPct val="20000"/>
+              </a:spcBef>
+              <a:buFont typeface="Arial" pitchFamily="34" charset="0"/>
+              <a:buChar char="•"/>
+              <a:defRPr sz="2665" kern="1200">
+                <a:solidFill>
+                  <a:schemeClr val="tx1"/>
+                </a:solidFill>
+                <a:latin typeface="+mn-lt"/>
+                <a:ea typeface="+mn-ea"/>
+                <a:cs typeface="+mn-cs"/>
+              </a:defRPr>
+            </a:lvl8pPr>
+            <a:lvl9pPr marL="5178362" indent="-304610" algn="l" defTabSz="1218438" rtl="0" eaLnBrk="1" latinLnBrk="1" hangingPunct="1">
+              <a:spcBef>
+                <a:spcPct val="20000"/>
+              </a:spcBef>
+              <a:buFont typeface="Arial" pitchFamily="34" charset="0"/>
+              <a:buChar char="•"/>
+              <a:defRPr sz="2665" kern="1200">
+                <a:solidFill>
+                  <a:schemeClr val="tx1"/>
+                </a:solidFill>
+                <a:latin typeface="+mn-lt"/>
+                <a:ea typeface="+mn-ea"/>
+                <a:cs typeface="+mn-cs"/>
+              </a:defRPr>
+            </a:lvl9pPr>
+          </a:lstStyle>
+          <a:p>
+            <a:pPr eaLnBrk="0" hangingPunct="0">
+              <a:lnSpc>
+                <a:spcPct val="100000"/>
+              </a:lnSpc>
+              <a:spcAft>
+                <a:spcPts val="800"/>
+              </a:spcAft>
+              <a:buClr>
+                <a:schemeClr val="accent5">
+                  <a:lumMod val="40000"/>
+                  <a:lumOff val="60000"/>
+                </a:schemeClr>
+              </a:buClr>
+              <a:buSzPct val="70000"/>
+            </a:pPr>
+            <a:r>
+              <a:rPr lang="en-GB" sz="2400" dirty="0"/>
+              <a:t>int a = 5;</a:t>
+            </a:r>
+          </a:p>
+          <a:p>
+            <a:pPr eaLnBrk="0" hangingPunct="0">
+              <a:lnSpc>
+                <a:spcPct val="100000"/>
+              </a:lnSpc>
+              <a:spcAft>
+                <a:spcPts val="800"/>
+              </a:spcAft>
+              <a:buClr>
+                <a:schemeClr val="accent5">
+                  <a:lumMod val="40000"/>
+                  <a:lumOff val="60000"/>
+                </a:schemeClr>
+              </a:buClr>
+              <a:buSzPct val="70000"/>
+            </a:pPr>
+            <a:r>
+              <a:rPr lang="en-GB" sz="2400" dirty="0"/>
+              <a:t>int b = 10;</a:t>
+            </a:r>
+          </a:p>
+          <a:p>
+            <a:pPr eaLnBrk="0" hangingPunct="0">
+              <a:lnSpc>
+                <a:spcPct val="100000"/>
+              </a:lnSpc>
+              <a:spcAft>
+                <a:spcPts val="800"/>
+              </a:spcAft>
+              <a:buClr>
+                <a:schemeClr val="accent5">
+                  <a:lumMod val="40000"/>
+                  <a:lumOff val="60000"/>
+                </a:schemeClr>
+              </a:buClr>
+              <a:buSzPct val="70000"/>
+            </a:pPr>
+            <a:r>
+              <a:rPr lang="en-GB" sz="2400" dirty="0"/>
+              <a:t>Console.WriteLine(a &lt; b); </a:t>
+            </a:r>
+          </a:p>
+          <a:p>
+            <a:pPr eaLnBrk="0" hangingPunct="0">
+              <a:lnSpc>
+                <a:spcPct val="100000"/>
+              </a:lnSpc>
+              <a:spcAft>
+                <a:spcPts val="800"/>
+              </a:spcAft>
+              <a:buClr>
+                <a:schemeClr val="accent5">
+                  <a:lumMod val="40000"/>
+                  <a:lumOff val="60000"/>
+                </a:schemeClr>
+              </a:buClr>
+              <a:buSzPct val="70000"/>
+            </a:pPr>
+            <a:r>
+              <a:rPr lang="en-GB" sz="2400" dirty="0"/>
+              <a:t>Console.WriteLine(a &gt; 0); </a:t>
+            </a:r>
+          </a:p>
+          <a:p>
+            <a:pPr eaLnBrk="0" hangingPunct="0">
+              <a:lnSpc>
+                <a:spcPct val="100000"/>
+              </a:lnSpc>
+              <a:spcAft>
+                <a:spcPts val="800"/>
+              </a:spcAft>
+              <a:buClr>
+                <a:schemeClr val="accent5">
+                  <a:lumMod val="40000"/>
+                  <a:lumOff val="60000"/>
+                </a:schemeClr>
+              </a:buClr>
+              <a:buSzPct val="70000"/>
+            </a:pPr>
+            <a:r>
+              <a:rPr lang="en-GB" sz="2400" dirty="0"/>
+              <a:t>Console.WriteLine(a &gt; 100);     </a:t>
+            </a:r>
+          </a:p>
+          <a:p>
+            <a:pPr eaLnBrk="0" hangingPunct="0">
+              <a:lnSpc>
+                <a:spcPct val="100000"/>
+              </a:lnSpc>
+              <a:spcAft>
+                <a:spcPts val="800"/>
+              </a:spcAft>
+              <a:buClr>
+                <a:schemeClr val="accent5">
+                  <a:lumMod val="40000"/>
+                  <a:lumOff val="60000"/>
+                </a:schemeClr>
+              </a:buClr>
+              <a:buSzPct val="70000"/>
+            </a:pPr>
+            <a:r>
+              <a:rPr lang="en-GB" sz="2400" dirty="0"/>
+              <a:t>Console.WriteLine(a &lt; a); </a:t>
+            </a:r>
+          </a:p>
+          <a:p>
+            <a:pPr eaLnBrk="0" hangingPunct="0">
+              <a:lnSpc>
+                <a:spcPct val="100000"/>
+              </a:lnSpc>
+              <a:spcAft>
+                <a:spcPts val="800"/>
+              </a:spcAft>
+              <a:buClr>
+                <a:schemeClr val="accent5">
+                  <a:lumMod val="40000"/>
+                  <a:lumOff val="60000"/>
+                </a:schemeClr>
+              </a:buClr>
+              <a:buSzPct val="70000"/>
+            </a:pPr>
+            <a:r>
+              <a:rPr lang="en-GB" sz="2400" dirty="0"/>
+              <a:t>Console.WriteLine(a &lt;= 5); </a:t>
+            </a:r>
+          </a:p>
+          <a:p>
+            <a:pPr eaLnBrk="0" hangingPunct="0">
+              <a:lnSpc>
+                <a:spcPct val="100000"/>
+              </a:lnSpc>
+              <a:spcAft>
+                <a:spcPts val="800"/>
+              </a:spcAft>
+              <a:buClr>
+                <a:schemeClr val="accent5">
+                  <a:lumMod val="40000"/>
+                  <a:lumOff val="60000"/>
+                </a:schemeClr>
+              </a:buClr>
+              <a:buSzPct val="70000"/>
+            </a:pPr>
+            <a:r>
+              <a:rPr lang="en-GB" sz="2400" dirty="0"/>
+              <a:t>Console.WriteLine(b == 2 * a); </a:t>
+            </a:r>
+          </a:p>
+        </p:txBody>
+      </p:sp>
+      <p:sp>
+        <p:nvSpPr>
           <p:cNvPr id="16" name="TextBox 15">
             <a:extLst>
               <a:ext uri="{FF2B5EF4-FFF2-40B4-BE49-F238E27FC236}">
@@ -35824,752 +38064,6 @@
                 </a:solidFill>
               </a:rPr>
               <a:t>// true</a:t>
-            </a:r>
-          </a:p>
-        </p:txBody>
-      </p:sp>
-      <p:sp>
-        <p:nvSpPr>
-          <p:cNvPr id="22" name="Slide Number">
-            <a:extLst>
-              <a:ext uri="{FF2B5EF4-FFF2-40B4-BE49-F238E27FC236}">
-                <a16:creationId xmlns:a16="http://schemas.microsoft.com/office/drawing/2014/main" id="{6A5D077C-E5AF-4C1D-A017-9B9356988C8B}"/>
-              </a:ext>
-            </a:extLst>
-          </p:cNvPr>
-          <p:cNvSpPr txBox="1">
-            <a:spLocks/>
-          </p:cNvSpPr>
-          <p:nvPr/>
-        </p:nvSpPr>
-        <p:spPr>
-          <a:xfrm>
-            <a:off x="11753030" y="6507000"/>
-            <a:ext cx="367414" cy="297000"/>
-          </a:xfrm>
-          <a:prstGeom prst="rect">
-            <a:avLst/>
-          </a:prstGeom>
-        </p:spPr>
-        <p:txBody>
-          <a:bodyPr vert="horz" lIns="91440" tIns="45720" rIns="91440" bIns="45720" rtlCol="0" anchor="b"/>
-          <a:lstStyle>
-            <a:defPPr>
-              <a:defRPr lang="en-US"/>
-            </a:defPPr>
-            <a:lvl1pPr marL="0" algn="r" defTabSz="914400" rtl="0" eaLnBrk="1" latinLnBrk="0" hangingPunct="1">
-              <a:defRPr sz="1000" kern="1200">
-                <a:solidFill>
-                  <a:schemeClr val="tx1"/>
-                </a:solidFill>
-                <a:latin typeface="+mn-lt"/>
-                <a:ea typeface="+mn-ea"/>
-                <a:cs typeface="+mn-cs"/>
-              </a:defRPr>
-            </a:lvl1pPr>
-            <a:lvl2pPr marL="457200" algn="l" defTabSz="914400" rtl="0" eaLnBrk="1" latinLnBrk="0" hangingPunct="1">
-              <a:defRPr sz="1800" kern="1200">
-                <a:solidFill>
-                  <a:schemeClr val="tx1"/>
-                </a:solidFill>
-                <a:latin typeface="+mn-lt"/>
-                <a:ea typeface="+mn-ea"/>
-                <a:cs typeface="+mn-cs"/>
-              </a:defRPr>
-            </a:lvl2pPr>
-            <a:lvl3pPr marL="914400" algn="l" defTabSz="914400" rtl="0" eaLnBrk="1" latinLnBrk="0" hangingPunct="1">
-              <a:defRPr sz="1800" kern="1200">
-                <a:solidFill>
-                  <a:schemeClr val="tx1"/>
-                </a:solidFill>
-                <a:latin typeface="+mn-lt"/>
-                <a:ea typeface="+mn-ea"/>
-                <a:cs typeface="+mn-cs"/>
-              </a:defRPr>
-            </a:lvl3pPr>
-            <a:lvl4pPr marL="1371600" algn="l" defTabSz="914400" rtl="0" eaLnBrk="1" latinLnBrk="0" hangingPunct="1">
-              <a:defRPr sz="1800" kern="1200">
-                <a:solidFill>
-                  <a:schemeClr val="tx1"/>
-                </a:solidFill>
-                <a:latin typeface="+mn-lt"/>
-                <a:ea typeface="+mn-ea"/>
-                <a:cs typeface="+mn-cs"/>
-              </a:defRPr>
-            </a:lvl4pPr>
-            <a:lvl5pPr marL="1828800" algn="l" defTabSz="914400" rtl="0" eaLnBrk="1" latinLnBrk="0" hangingPunct="1">
-              <a:defRPr sz="1800" kern="1200">
-                <a:solidFill>
-                  <a:schemeClr val="tx1"/>
-                </a:solidFill>
-                <a:latin typeface="+mn-lt"/>
-                <a:ea typeface="+mn-ea"/>
-                <a:cs typeface="+mn-cs"/>
-              </a:defRPr>
-            </a:lvl5pPr>
-            <a:lvl6pPr marL="2286000" algn="l" defTabSz="914400" rtl="0" eaLnBrk="1" latinLnBrk="0" hangingPunct="1">
-              <a:defRPr sz="1800" kern="1200">
-                <a:solidFill>
-                  <a:schemeClr val="tx1"/>
-                </a:solidFill>
-                <a:latin typeface="+mn-lt"/>
-                <a:ea typeface="+mn-ea"/>
-                <a:cs typeface="+mn-cs"/>
-              </a:defRPr>
-            </a:lvl6pPr>
-            <a:lvl7pPr marL="2743200" algn="l" defTabSz="914400" rtl="0" eaLnBrk="1" latinLnBrk="0" hangingPunct="1">
-              <a:defRPr sz="1800" kern="1200">
-                <a:solidFill>
-                  <a:schemeClr val="tx1"/>
-                </a:solidFill>
-                <a:latin typeface="+mn-lt"/>
-                <a:ea typeface="+mn-ea"/>
-                <a:cs typeface="+mn-cs"/>
-              </a:defRPr>
-            </a:lvl7pPr>
-            <a:lvl8pPr marL="3200400" algn="l" defTabSz="914400" rtl="0" eaLnBrk="1" latinLnBrk="0" hangingPunct="1">
-              <a:defRPr sz="1800" kern="1200">
-                <a:solidFill>
-                  <a:schemeClr val="tx1"/>
-                </a:solidFill>
-                <a:latin typeface="+mn-lt"/>
-                <a:ea typeface="+mn-ea"/>
-                <a:cs typeface="+mn-cs"/>
-              </a:defRPr>
-            </a:lvl8pPr>
-            <a:lvl9pPr marL="3657600" algn="l" defTabSz="914400" rtl="0" eaLnBrk="1" latinLnBrk="0" hangingPunct="1">
-              <a:defRPr sz="1800" kern="1200">
-                <a:solidFill>
-                  <a:schemeClr val="tx1"/>
-                </a:solidFill>
-                <a:latin typeface="+mn-lt"/>
-                <a:ea typeface="+mn-ea"/>
-                <a:cs typeface="+mn-cs"/>
-              </a:defRPr>
-            </a:lvl9pPr>
-          </a:lstStyle>
-          <a:p>
-            <a:fld id="{2BF067CD-8E6B-4360-9AA8-C5DF2A48A6D1}" type="slidenum">
-              <a:rPr lang="en-US" smtClean="0"/>
-              <a:pPr/>
-              <a:t>5</a:t>
-            </a:fld>
-            <a:endParaRPr lang="en-US" dirty="0"/>
-          </a:p>
-        </p:txBody>
-      </p:sp>
-      <p:sp>
-        <p:nvSpPr>
-          <p:cNvPr id="23" name="Text Placeholder 7">
-            <a:extLst>
-              <a:ext uri="{FF2B5EF4-FFF2-40B4-BE49-F238E27FC236}">
-                <a16:creationId xmlns:a16="http://schemas.microsoft.com/office/drawing/2014/main" id="{9360419A-F876-43DB-8A13-4F493312E117}"/>
-              </a:ext>
-            </a:extLst>
-          </p:cNvPr>
-          <p:cNvSpPr txBox="1">
-            <a:spLocks/>
-          </p:cNvSpPr>
-          <p:nvPr/>
-        </p:nvSpPr>
-        <p:spPr>
-          <a:xfrm>
-            <a:off x="190353" y="1196124"/>
-            <a:ext cx="11815018" cy="5561125"/>
-          </a:xfrm>
-          <a:prstGeom prst="rect">
-            <a:avLst/>
-          </a:prstGeom>
-        </p:spPr>
-        <p:txBody>
-          <a:bodyPr/>
-          <a:lstStyle>
-            <a:lvl1pPr marL="360363" indent="-360363" algn="l" defTabSz="1218438" rtl="0" eaLnBrk="1" latinLnBrk="0" hangingPunct="1">
-              <a:lnSpc>
-                <a:spcPct val="105000"/>
-              </a:lnSpc>
-              <a:spcBef>
-                <a:spcPts val="600"/>
-              </a:spcBef>
-              <a:spcAft>
-                <a:spcPts val="600"/>
-              </a:spcAft>
-              <a:buFont typeface="Wingdings" panose="05000000000000000000" pitchFamily="2" charset="2"/>
-              <a:buChar char="§"/>
-              <a:defRPr sz="3398" kern="1200">
-                <a:solidFill>
-                  <a:schemeClr val="tx1"/>
-                </a:solidFill>
-                <a:latin typeface="+mn-lt"/>
-                <a:ea typeface="+mn-ea"/>
-                <a:cs typeface="+mn-cs"/>
-              </a:defRPr>
-            </a:lvl1pPr>
-            <a:lvl2pPr marL="803275" indent="-360363" algn="l" defTabSz="1218438" rtl="0" eaLnBrk="1" latinLnBrk="0" hangingPunct="1">
-              <a:lnSpc>
-                <a:spcPct val="105000"/>
-              </a:lnSpc>
-              <a:spcBef>
-                <a:spcPts val="600"/>
-              </a:spcBef>
-              <a:spcAft>
-                <a:spcPts val="600"/>
-              </a:spcAft>
-              <a:buFont typeface="Wingdings" panose="05000000000000000000" pitchFamily="2" charset="2"/>
-              <a:buChar char="§"/>
-              <a:defRPr sz="3198" kern="1200">
-                <a:solidFill>
-                  <a:schemeClr val="tx1"/>
-                </a:solidFill>
-                <a:latin typeface="+mn-lt"/>
-                <a:ea typeface="+mn-ea"/>
-                <a:cs typeface="+mn-cs"/>
-              </a:defRPr>
-            </a:lvl2pPr>
-            <a:lvl3pPr marL="1255713" indent="-360363" algn="l" defTabSz="1218438" rtl="0" eaLnBrk="1" latinLnBrk="0" hangingPunct="1">
-              <a:lnSpc>
-                <a:spcPct val="105000"/>
-              </a:lnSpc>
-              <a:spcBef>
-                <a:spcPts val="600"/>
-              </a:spcBef>
-              <a:spcAft>
-                <a:spcPts val="600"/>
-              </a:spcAft>
-              <a:buFont typeface="Wingdings" panose="05000000000000000000" pitchFamily="2" charset="2"/>
-              <a:buChar char="§"/>
-              <a:defRPr sz="2998" kern="1200">
-                <a:solidFill>
-                  <a:schemeClr val="tx1"/>
-                </a:solidFill>
-                <a:latin typeface="+mn-lt"/>
-                <a:ea typeface="+mn-ea"/>
-                <a:cs typeface="+mn-cs"/>
-              </a:defRPr>
-            </a:lvl3pPr>
-            <a:lvl4pPr marL="1700213" indent="-352425" algn="l" defTabSz="1218438" rtl="0" eaLnBrk="1" latinLnBrk="0" hangingPunct="1">
-              <a:lnSpc>
-                <a:spcPct val="105000"/>
-              </a:lnSpc>
-              <a:spcBef>
-                <a:spcPts val="600"/>
-              </a:spcBef>
-              <a:spcAft>
-                <a:spcPts val="600"/>
-              </a:spcAft>
-              <a:buFont typeface="Wingdings" panose="05000000000000000000" pitchFamily="2" charset="2"/>
-              <a:buChar char="§"/>
-              <a:defRPr sz="2798" kern="1200">
-                <a:solidFill>
-                  <a:schemeClr val="tx1"/>
-                </a:solidFill>
-                <a:latin typeface="+mn-lt"/>
-                <a:ea typeface="+mn-ea"/>
-                <a:cs typeface="+mn-cs"/>
-              </a:defRPr>
-            </a:lvl4pPr>
-            <a:lvl5pPr marL="2058988" indent="-266700" algn="l" defTabSz="1218438" rtl="0" eaLnBrk="1" latinLnBrk="0" hangingPunct="1">
-              <a:lnSpc>
-                <a:spcPct val="105000"/>
-              </a:lnSpc>
-              <a:spcBef>
-                <a:spcPts val="600"/>
-              </a:spcBef>
-              <a:spcAft>
-                <a:spcPts val="600"/>
-              </a:spcAft>
-              <a:buFont typeface="Wingdings" panose="05000000000000000000" pitchFamily="2" charset="2"/>
-              <a:buChar char="§"/>
-              <a:defRPr sz="2598" kern="1200">
-                <a:solidFill>
-                  <a:schemeClr val="tx1"/>
-                </a:solidFill>
-                <a:latin typeface="+mn-lt"/>
-                <a:ea typeface="+mn-ea"/>
-                <a:cs typeface="+mn-cs"/>
-              </a:defRPr>
-            </a:lvl5pPr>
-            <a:lvl6pPr marL="3350704" indent="-304610" algn="l" defTabSz="1218438" rtl="0" eaLnBrk="1" latinLnBrk="1" hangingPunct="1">
-              <a:spcBef>
-                <a:spcPct val="20000"/>
-              </a:spcBef>
-              <a:buFont typeface="Arial" pitchFamily="34" charset="0"/>
-              <a:buChar char="•"/>
-              <a:defRPr sz="2665" kern="1200">
-                <a:solidFill>
-                  <a:schemeClr val="tx1"/>
-                </a:solidFill>
-                <a:latin typeface="+mn-lt"/>
-                <a:ea typeface="+mn-ea"/>
-                <a:cs typeface="+mn-cs"/>
-              </a:defRPr>
-            </a:lvl6pPr>
-            <a:lvl7pPr marL="3959924" indent="-304610" algn="l" defTabSz="1218438" rtl="0" eaLnBrk="1" latinLnBrk="1" hangingPunct="1">
-              <a:spcBef>
-                <a:spcPct val="20000"/>
-              </a:spcBef>
-              <a:buFont typeface="Arial" pitchFamily="34" charset="0"/>
-              <a:buChar char="•"/>
-              <a:defRPr sz="2665" kern="1200">
-                <a:solidFill>
-                  <a:schemeClr val="tx1"/>
-                </a:solidFill>
-                <a:latin typeface="+mn-lt"/>
-                <a:ea typeface="+mn-ea"/>
-                <a:cs typeface="+mn-cs"/>
-              </a:defRPr>
-            </a:lvl7pPr>
-            <a:lvl8pPr marL="4569143" indent="-304610" algn="l" defTabSz="1218438" rtl="0" eaLnBrk="1" latinLnBrk="1" hangingPunct="1">
-              <a:spcBef>
-                <a:spcPct val="20000"/>
-              </a:spcBef>
-              <a:buFont typeface="Arial" pitchFamily="34" charset="0"/>
-              <a:buChar char="•"/>
-              <a:defRPr sz="2665" kern="1200">
-                <a:solidFill>
-                  <a:schemeClr val="tx1"/>
-                </a:solidFill>
-                <a:latin typeface="+mn-lt"/>
-                <a:ea typeface="+mn-ea"/>
-                <a:cs typeface="+mn-cs"/>
-              </a:defRPr>
-            </a:lvl8pPr>
-            <a:lvl9pPr marL="5178362" indent="-304610" algn="l" defTabSz="1218438" rtl="0" eaLnBrk="1" latinLnBrk="1" hangingPunct="1">
-              <a:spcBef>
-                <a:spcPct val="20000"/>
-              </a:spcBef>
-              <a:buFont typeface="Arial" pitchFamily="34" charset="0"/>
-              <a:buChar char="•"/>
-              <a:defRPr sz="2665" kern="1200">
-                <a:solidFill>
-                  <a:schemeClr val="tx1"/>
-                </a:solidFill>
-                <a:latin typeface="+mn-lt"/>
-                <a:ea typeface="+mn-ea"/>
-                <a:cs typeface="+mn-cs"/>
-              </a:defRPr>
-            </a:lvl9pPr>
-          </a:lstStyle>
-          <a:p>
-            <a:pPr marL="457063" indent="-457063"/>
-            <a:r>
-              <a:rPr lang="en-US" sz="3599" dirty="0"/>
-              <a:t>В програмирането </a:t>
-            </a:r>
-            <a:r>
-              <a:rPr lang="bg-BG" sz="3599" dirty="0"/>
-              <a:t>можем</a:t>
-            </a:r>
-            <a:r>
-              <a:rPr lang="en-US" sz="3599" dirty="0"/>
-              <a:t> да сравняваме стойности</a:t>
-            </a:r>
-          </a:p>
-          <a:p>
-            <a:pPr marL="1066099" lvl="1" indent="-457063"/>
-            <a:r>
-              <a:rPr lang="en-US" sz="3399" dirty="0"/>
-              <a:t>Резултатът от логическите изрази е </a:t>
-            </a:r>
-            <a:r>
-              <a:rPr lang="en-US" sz="3399" b="1" dirty="0">
-                <a:solidFill>
-                  <a:schemeClr val="bg1"/>
-                </a:solidFill>
-                <a:latin typeface="Consolas" panose="020B0609020204030204" pitchFamily="49" charset="0"/>
-              </a:rPr>
-              <a:t>true</a:t>
-            </a:r>
-            <a:r>
-              <a:rPr lang="en-US" sz="3399" dirty="0"/>
-              <a:t> или </a:t>
-            </a:r>
-            <a:r>
-              <a:rPr lang="en-US" sz="3399" b="1" dirty="0">
-                <a:solidFill>
-                  <a:schemeClr val="bg1"/>
-                </a:solidFill>
-                <a:latin typeface="Consolas" panose="020B0609020204030204" pitchFamily="49" charset="0"/>
-              </a:rPr>
-              <a:t>false</a:t>
-            </a:r>
-          </a:p>
-        </p:txBody>
-      </p:sp>
-      <p:sp>
-        <p:nvSpPr>
-          <p:cNvPr id="24" name="Text Placeholder 12">
-            <a:extLst>
-              <a:ext uri="{FF2B5EF4-FFF2-40B4-BE49-F238E27FC236}">
-                <a16:creationId xmlns:a16="http://schemas.microsoft.com/office/drawing/2014/main" id="{CFC53F4A-CEC3-48C6-9F8D-330C6736AB37}"/>
-              </a:ext>
-            </a:extLst>
-          </p:cNvPr>
-          <p:cNvSpPr txBox="1">
-            <a:spLocks/>
-          </p:cNvSpPr>
-          <p:nvPr/>
-        </p:nvSpPr>
-        <p:spPr>
-          <a:xfrm>
-            <a:off x="876000" y="2676886"/>
-            <a:ext cx="5407475" cy="3890910"/>
-          </a:xfrm>
-          <a:prstGeom prst="rect">
-            <a:avLst/>
-          </a:prstGeom>
-          <a:solidFill>
-            <a:schemeClr val="accent5">
-              <a:lumMod val="40000"/>
-              <a:lumOff val="60000"/>
-              <a:alpha val="20000"/>
-            </a:schemeClr>
-          </a:solidFill>
-          <a:ln w="12700">
-            <a:solidFill>
-              <a:schemeClr val="tx1">
-                <a:lumMod val="50000"/>
-              </a:schemeClr>
-            </a:solidFill>
-          </a:ln>
-        </p:spPr>
-        <p:txBody>
-          <a:bodyPr vert="horz" wrap="square" lIns="144000" tIns="108000" rIns="144000" bIns="108000" rtlCol="0">
-            <a:spAutoFit/>
-          </a:bodyPr>
-          <a:lstStyle>
-            <a:lvl1pPr marL="360363" indent="-360363" algn="l" defTabSz="1218438" rtl="0" eaLnBrk="1" latinLnBrk="0" hangingPunct="1">
-              <a:lnSpc>
-                <a:spcPct val="110000"/>
-              </a:lnSpc>
-              <a:spcBef>
-                <a:spcPts val="0"/>
-              </a:spcBef>
-              <a:spcAft>
-                <a:spcPts val="0"/>
-              </a:spcAft>
-              <a:buFont typeface="Wingdings" panose="05000000000000000000" pitchFamily="2" charset="2"/>
-              <a:buNone/>
-              <a:defRPr lang="en-US" sz="2800" b="1" kern="1200" smtClean="0">
-                <a:solidFill>
-                  <a:schemeClr val="tx1"/>
-                </a:solidFill>
-                <a:latin typeface="Consolas" pitchFamily="49" charset="0"/>
-                <a:ea typeface="+mn-ea"/>
-                <a:cs typeface="+mn-cs"/>
-              </a:defRPr>
-            </a:lvl1pPr>
-            <a:lvl2pPr marL="803275" indent="-360363" algn="l" defTabSz="1218438" rtl="0" eaLnBrk="1" latinLnBrk="0" hangingPunct="1">
-              <a:lnSpc>
-                <a:spcPct val="105000"/>
-              </a:lnSpc>
-              <a:spcBef>
-                <a:spcPts val="600"/>
-              </a:spcBef>
-              <a:spcAft>
-                <a:spcPts val="600"/>
-              </a:spcAft>
-              <a:buFont typeface="Wingdings" panose="05000000000000000000" pitchFamily="2" charset="2"/>
-              <a:buChar char="§"/>
-              <a:defRPr lang="en-US" sz="3198" kern="1200" smtClean="0">
-                <a:solidFill>
-                  <a:schemeClr val="tx1"/>
-                </a:solidFill>
-                <a:latin typeface="+mn-lt"/>
-                <a:ea typeface="+mn-ea"/>
-                <a:cs typeface="+mn-cs"/>
-              </a:defRPr>
-            </a:lvl2pPr>
-            <a:lvl3pPr marL="1255713" indent="-360363" algn="l" defTabSz="1218438" rtl="0" eaLnBrk="1" latinLnBrk="0" hangingPunct="1">
-              <a:lnSpc>
-                <a:spcPct val="105000"/>
-              </a:lnSpc>
-              <a:spcBef>
-                <a:spcPts val="600"/>
-              </a:spcBef>
-              <a:spcAft>
-                <a:spcPts val="600"/>
-              </a:spcAft>
-              <a:buFont typeface="Wingdings" panose="05000000000000000000" pitchFamily="2" charset="2"/>
-              <a:buChar char="§"/>
-              <a:defRPr lang="en-US" sz="2998" kern="1200" smtClean="0">
-                <a:solidFill>
-                  <a:schemeClr val="tx1"/>
-                </a:solidFill>
-                <a:latin typeface="+mn-lt"/>
-                <a:ea typeface="+mn-ea"/>
-                <a:cs typeface="+mn-cs"/>
-              </a:defRPr>
-            </a:lvl3pPr>
-            <a:lvl4pPr marL="1700213" indent="-352425" algn="l" defTabSz="1218438" rtl="0" eaLnBrk="1" latinLnBrk="0" hangingPunct="1">
-              <a:lnSpc>
-                <a:spcPct val="105000"/>
-              </a:lnSpc>
-              <a:spcBef>
-                <a:spcPts val="600"/>
-              </a:spcBef>
-              <a:spcAft>
-                <a:spcPts val="600"/>
-              </a:spcAft>
-              <a:buFont typeface="Wingdings" panose="05000000000000000000" pitchFamily="2" charset="2"/>
-              <a:buChar char="§"/>
-              <a:defRPr lang="en-US" sz="2798" kern="1200" smtClean="0">
-                <a:solidFill>
-                  <a:schemeClr val="tx1"/>
-                </a:solidFill>
-                <a:latin typeface="+mn-lt"/>
-                <a:ea typeface="+mn-ea"/>
-                <a:cs typeface="+mn-cs"/>
-              </a:defRPr>
-            </a:lvl4pPr>
-            <a:lvl5pPr marL="2058988" indent="-266700" algn="l" defTabSz="1218438" rtl="0" eaLnBrk="1" latinLnBrk="0" hangingPunct="1">
-              <a:lnSpc>
-                <a:spcPct val="105000"/>
-              </a:lnSpc>
-              <a:spcBef>
-                <a:spcPts val="600"/>
-              </a:spcBef>
-              <a:spcAft>
-                <a:spcPts val="600"/>
-              </a:spcAft>
-              <a:buFont typeface="Wingdings" panose="05000000000000000000" pitchFamily="2" charset="2"/>
-              <a:buChar char="§"/>
-              <a:defRPr lang="en-US" sz="2598" kern="1200">
-                <a:solidFill>
-                  <a:schemeClr val="tx1"/>
-                </a:solidFill>
-                <a:latin typeface="+mn-lt"/>
-                <a:ea typeface="+mn-ea"/>
-                <a:cs typeface="+mn-cs"/>
-              </a:defRPr>
-            </a:lvl5pPr>
-            <a:lvl6pPr marL="3350704" indent="-304610" algn="l" defTabSz="1218438" rtl="0" eaLnBrk="1" latinLnBrk="1" hangingPunct="1">
-              <a:spcBef>
-                <a:spcPct val="20000"/>
-              </a:spcBef>
-              <a:buFont typeface="Arial" pitchFamily="34" charset="0"/>
-              <a:buChar char="•"/>
-              <a:defRPr sz="2665" kern="1200">
-                <a:solidFill>
-                  <a:schemeClr val="tx1"/>
-                </a:solidFill>
-                <a:latin typeface="+mn-lt"/>
-                <a:ea typeface="+mn-ea"/>
-                <a:cs typeface="+mn-cs"/>
-              </a:defRPr>
-            </a:lvl6pPr>
-            <a:lvl7pPr marL="3959924" indent="-304610" algn="l" defTabSz="1218438" rtl="0" eaLnBrk="1" latinLnBrk="1" hangingPunct="1">
-              <a:spcBef>
-                <a:spcPct val="20000"/>
-              </a:spcBef>
-              <a:buFont typeface="Arial" pitchFamily="34" charset="0"/>
-              <a:buChar char="•"/>
-              <a:defRPr sz="2665" kern="1200">
-                <a:solidFill>
-                  <a:schemeClr val="tx1"/>
-                </a:solidFill>
-                <a:latin typeface="+mn-lt"/>
-                <a:ea typeface="+mn-ea"/>
-                <a:cs typeface="+mn-cs"/>
-              </a:defRPr>
-            </a:lvl7pPr>
-            <a:lvl8pPr marL="4569143" indent="-304610" algn="l" defTabSz="1218438" rtl="0" eaLnBrk="1" latinLnBrk="1" hangingPunct="1">
-              <a:spcBef>
-                <a:spcPct val="20000"/>
-              </a:spcBef>
-              <a:buFont typeface="Arial" pitchFamily="34" charset="0"/>
-              <a:buChar char="•"/>
-              <a:defRPr sz="2665" kern="1200">
-                <a:solidFill>
-                  <a:schemeClr val="tx1"/>
-                </a:solidFill>
-                <a:latin typeface="+mn-lt"/>
-                <a:ea typeface="+mn-ea"/>
-                <a:cs typeface="+mn-cs"/>
-              </a:defRPr>
-            </a:lvl8pPr>
-            <a:lvl9pPr marL="5178362" indent="-304610" algn="l" defTabSz="1218438" rtl="0" eaLnBrk="1" latinLnBrk="1" hangingPunct="1">
-              <a:spcBef>
-                <a:spcPct val="20000"/>
-              </a:spcBef>
-              <a:buFont typeface="Arial" pitchFamily="34" charset="0"/>
-              <a:buChar char="•"/>
-              <a:defRPr sz="2665" kern="1200">
-                <a:solidFill>
-                  <a:schemeClr val="tx1"/>
-                </a:solidFill>
-                <a:latin typeface="+mn-lt"/>
-                <a:ea typeface="+mn-ea"/>
-                <a:cs typeface="+mn-cs"/>
-              </a:defRPr>
-            </a:lvl9pPr>
-          </a:lstStyle>
-          <a:p>
-            <a:pPr eaLnBrk="0" hangingPunct="0">
-              <a:lnSpc>
-                <a:spcPct val="100000"/>
-              </a:lnSpc>
-              <a:spcAft>
-                <a:spcPts val="800"/>
-              </a:spcAft>
-              <a:buClr>
-                <a:schemeClr val="accent5">
-                  <a:lumMod val="40000"/>
-                  <a:lumOff val="60000"/>
-                </a:schemeClr>
-              </a:buClr>
-              <a:buSzPct val="70000"/>
-            </a:pPr>
-            <a:r>
-              <a:rPr lang="en-GB" sz="2400" dirty="0"/>
-              <a:t>int a = 5;</a:t>
-            </a:r>
-          </a:p>
-          <a:p>
-            <a:pPr eaLnBrk="0" hangingPunct="0">
-              <a:lnSpc>
-                <a:spcPct val="100000"/>
-              </a:lnSpc>
-              <a:spcAft>
-                <a:spcPts val="800"/>
-              </a:spcAft>
-              <a:buClr>
-                <a:schemeClr val="accent5">
-                  <a:lumMod val="40000"/>
-                  <a:lumOff val="60000"/>
-                </a:schemeClr>
-              </a:buClr>
-              <a:buSzPct val="70000"/>
-            </a:pPr>
-            <a:r>
-              <a:rPr lang="en-GB" sz="2400" dirty="0"/>
-              <a:t>int b = 10;</a:t>
-            </a:r>
-          </a:p>
-          <a:p>
-            <a:pPr eaLnBrk="0" hangingPunct="0">
-              <a:lnSpc>
-                <a:spcPct val="100000"/>
-              </a:lnSpc>
-              <a:spcAft>
-                <a:spcPts val="800"/>
-              </a:spcAft>
-              <a:buClr>
-                <a:schemeClr val="accent5">
-                  <a:lumMod val="40000"/>
-                  <a:lumOff val="60000"/>
-                </a:schemeClr>
-              </a:buClr>
-              <a:buSzPct val="70000"/>
-            </a:pPr>
-            <a:r>
-              <a:rPr lang="en-GB" sz="2400" dirty="0"/>
-              <a:t>Console.WriteLine(a &lt; b); </a:t>
-            </a:r>
-          </a:p>
-          <a:p>
-            <a:pPr eaLnBrk="0" hangingPunct="0">
-              <a:lnSpc>
-                <a:spcPct val="100000"/>
-              </a:lnSpc>
-              <a:spcAft>
-                <a:spcPts val="800"/>
-              </a:spcAft>
-              <a:buClr>
-                <a:schemeClr val="accent5">
-                  <a:lumMod val="40000"/>
-                  <a:lumOff val="60000"/>
-                </a:schemeClr>
-              </a:buClr>
-              <a:buSzPct val="70000"/>
-            </a:pPr>
-            <a:r>
-              <a:rPr lang="en-GB" sz="2400" dirty="0"/>
-              <a:t>Console.WriteLine(a &gt; 0); </a:t>
-            </a:r>
-          </a:p>
-          <a:p>
-            <a:pPr eaLnBrk="0" hangingPunct="0">
-              <a:lnSpc>
-                <a:spcPct val="100000"/>
-              </a:lnSpc>
-              <a:spcAft>
-                <a:spcPts val="800"/>
-              </a:spcAft>
-              <a:buClr>
-                <a:schemeClr val="accent5">
-                  <a:lumMod val="40000"/>
-                  <a:lumOff val="60000"/>
-                </a:schemeClr>
-              </a:buClr>
-              <a:buSzPct val="70000"/>
-            </a:pPr>
-            <a:r>
-              <a:rPr lang="en-GB" sz="2400" dirty="0"/>
-              <a:t>Console.WriteLine(a &gt; 100);     </a:t>
-            </a:r>
-          </a:p>
-          <a:p>
-            <a:pPr eaLnBrk="0" hangingPunct="0">
-              <a:lnSpc>
-                <a:spcPct val="100000"/>
-              </a:lnSpc>
-              <a:spcAft>
-                <a:spcPts val="800"/>
-              </a:spcAft>
-              <a:buClr>
-                <a:schemeClr val="accent5">
-                  <a:lumMod val="40000"/>
-                  <a:lumOff val="60000"/>
-                </a:schemeClr>
-              </a:buClr>
-              <a:buSzPct val="70000"/>
-            </a:pPr>
-            <a:r>
-              <a:rPr lang="en-GB" sz="2400" dirty="0"/>
-              <a:t>Console.WriteLine(a &lt; a); </a:t>
-            </a:r>
-          </a:p>
-          <a:p>
-            <a:pPr eaLnBrk="0" hangingPunct="0">
-              <a:lnSpc>
-                <a:spcPct val="100000"/>
-              </a:lnSpc>
-              <a:spcAft>
-                <a:spcPts val="800"/>
-              </a:spcAft>
-              <a:buClr>
-                <a:schemeClr val="accent5">
-                  <a:lumMod val="40000"/>
-                  <a:lumOff val="60000"/>
-                </a:schemeClr>
-              </a:buClr>
-              <a:buSzPct val="70000"/>
-            </a:pPr>
-            <a:r>
-              <a:rPr lang="en-GB" sz="2400" dirty="0"/>
-              <a:t>Console.WriteLine(a &lt;= 5); </a:t>
-            </a:r>
-          </a:p>
-          <a:p>
-            <a:pPr eaLnBrk="0" hangingPunct="0">
-              <a:lnSpc>
-                <a:spcPct val="100000"/>
-              </a:lnSpc>
-              <a:spcAft>
-                <a:spcPts val="800"/>
-              </a:spcAft>
-              <a:buClr>
-                <a:schemeClr val="accent5">
-                  <a:lumMod val="40000"/>
-                  <a:lumOff val="60000"/>
-                </a:schemeClr>
-              </a:buClr>
-              <a:buSzPct val="70000"/>
-            </a:pPr>
-            <a:r>
-              <a:rPr lang="en-GB" sz="2400" dirty="0"/>
-              <a:t>Console.WriteLine(b == 2 * a); </a:t>
             </a:r>
           </a:p>
         </p:txBody>
@@ -37344,13 +38838,13 @@
       </p:par>
     </p:tnLst>
     <p:bldLst>
+      <p:bldP spid="24" grpId="0" uiExpand="1" build="allAtOnce" animBg="1"/>
       <p:bldP spid="16" grpId="0"/>
       <p:bldP spid="17" grpId="0"/>
       <p:bldP spid="18" grpId="0"/>
       <p:bldP spid="19" grpId="0"/>
       <p:bldP spid="20" grpId="0"/>
       <p:bldP spid="21" grpId="0"/>
-      <p:bldP spid="24" grpId="0" uiExpand="1" build="allAtOnce" animBg="1"/>
     </p:bldLst>
   </p:timing>
 </p:sld>
@@ -37604,7 +39098,7 @@
         </p:nvSpPr>
         <p:spPr>
           <a:xfrm>
-            <a:off x="837983" y="4501678"/>
+            <a:off x="837983" y="4411947"/>
             <a:ext cx="6937486" cy="1947307"/>
           </a:xfrm>
           <a:prstGeom prst="rect">
@@ -37915,7 +39409,7 @@
         <p:spPr>
           <a:xfrm>
             <a:off x="837983" y="2162299"/>
-            <a:ext cx="6937486" cy="1921153"/>
+            <a:ext cx="6937486" cy="1613556"/>
           </a:xfrm>
           <a:prstGeom prst="rect">
             <a:avLst/>
@@ -38159,7 +39653,7 @@
             </a:r>
             <a:r>
               <a:rPr lang="en-GB" sz="2799" dirty="0"/>
-              <a:t> b); </a:t>
+              <a:t> b);</a:t>
             </a:r>
           </a:p>
         </p:txBody>
@@ -38415,13 +39909,13 @@
         </p:nvSpPr>
         <p:spPr bwMode="auto">
           <a:xfrm>
-            <a:off x="7265924" y="4463731"/>
+            <a:off x="7491000" y="4252866"/>
             <a:ext cx="3150076" cy="1055333"/>
           </a:xfrm>
           <a:prstGeom prst="wedgeRoundRectCallout">
             <a:avLst>
-              <a:gd name="adj1" fmla="val -57003"/>
-              <a:gd name="adj2" fmla="val 42587"/>
+              <a:gd name="adj1" fmla="val -67013"/>
+              <a:gd name="adj2" fmla="val 53543"/>
               <a:gd name="adj3" fmla="val 16667"/>
             </a:avLst>
           </a:prstGeom>

</xml_diff>

<commit_message>
Updated Judge links for "03.1. Conditional Statements - Basics" slides
</commit_message>
<xml_diff>
--- a/Courses/Software-Sciences/Module-1-OOP-New/03.1-Conditional-Statements-Basics/03.1-Conditional-Statements-Basics.pptx
+++ b/Courses/Software-Sciences/Module-1-OOP-New/03.1-Conditional-Statements-Basics/03.1-Conditional-Statements-Basics.pptx
@@ -331,7 +331,7 @@
           <a:p>
             <a:fld id="{4E087215-0C8F-4762-A664-737A353EC9A4}" type="datetimeFigureOut">
               <a:rPr lang="bg-BG" smtClean="0"/>
-              <a:t>9.2.2023 г.</a:t>
+              <a:t>4.05.23 г.</a:t>
             </a:fld>
             <a:endParaRPr lang="bg-BG" dirty="0"/>
           </a:p>
@@ -522,7 +522,7 @@
           <a:p>
             <a:fld id="{72D84649-876A-46C9-8472-14CB09C070D8}" type="datetimeFigureOut">
               <a:rPr lang="en-US" smtClean="0"/>
-              <a:t>9-Feb-23</a:t>
+              <a:t>5/4/23</a:t>
             </a:fld>
             <a:endParaRPr lang="en-US" dirty="0"/>
           </a:p>
@@ -24921,7 +24921,7 @@
                 </a:solidFill>
                 <a:hlinkClick r:id="rId2"/>
               </a:rPr>
-              <a:t>https://judge.softuni.org/Contests/Practice/Index/3895#5</a:t>
+              <a:t>https://judge.softuni.org/Contests/Practice/Index/3895#9</a:t>
             </a:r>
             <a:endParaRPr lang="en-US" sz="1999" u="sng" dirty="0">
               <a:solidFill>
@@ -28069,7 +28069,7 @@
                 </a:solidFill>
                 <a:hlinkClick r:id="rId2"/>
               </a:rPr>
-              <a:t>https://judge.softuni.org/Contests/Practice/Index/3895#6</a:t>
+              <a:t>https://judge.softuni.org/Contests/Practice/Index/3895#10</a:t>
             </a:r>
             <a:endParaRPr lang="en-US" sz="1999" u="sng" dirty="0">
               <a:solidFill>
@@ -30546,7 +30546,7 @@
                 </a:solidFill>
                 <a:hlinkClick r:id="rId3"/>
               </a:rPr>
-              <a:t>https://judge.softuni.org/Contests/Practice/Index/3895#7</a:t>
+              <a:t>https://judge.softuni.org/Contests/Practice/Index/3895#11</a:t>
             </a:r>
             <a:endParaRPr lang="en-US" sz="1999" u="sng" dirty="0">
               <a:solidFill>

</xml_diff>

<commit_message>
Fixed judge links for conditional statements - basics
</commit_message>
<xml_diff>
--- a/Courses/Software-Sciences/Module-1-OOP-New/03.1-Conditional-Statements-Basics/03.1-Conditional-Statements-Basics.pptx
+++ b/Courses/Software-Sciences/Module-1-OOP-New/03.1-Conditional-Statements-Basics/03.1-Conditional-Statements-Basics.pptx
@@ -24921,7 +24921,7 @@
                 </a:solidFill>
                 <a:hlinkClick r:id="rId2"/>
               </a:rPr>
-              <a:t>https://judge.softuni.org/Contests/Practice/Index/3895#9</a:t>
+              <a:t>https://judge.softuni.org/Contests/Practice/Index/3895#6</a:t>
             </a:r>
             <a:endParaRPr lang="en-US" sz="1999" u="sng" dirty="0">
               <a:solidFill>
@@ -28069,7 +28069,7 @@
                 </a:solidFill>
                 <a:hlinkClick r:id="rId2"/>
               </a:rPr>
-              <a:t>https://judge.softuni.org/Contests/Practice/Index/3895#10</a:t>
+              <a:t>https://judge.softuni.org/Contests/Practice/Index/3895#7</a:t>
             </a:r>
             <a:endParaRPr lang="en-US" sz="1999" u="sng" dirty="0">
               <a:solidFill>
@@ -30546,7 +30546,7 @@
                 </a:solidFill>
                 <a:hlinkClick r:id="rId3"/>
               </a:rPr>
-              <a:t>https://judge.softuni.org/Contests/Practice/Index/3895#11</a:t>
+              <a:t>https://judge.softuni.org/Contests/Practice/Index/3895#8</a:t>
             </a:r>
             <a:endParaRPr lang="en-US" sz="1999" u="sng" dirty="0">
               <a:solidFill>

</xml_diff>